<commit_message>
more notes for group work
</commit_message>
<xml_diff>
--- a/02 - Case Studies and Acquiring Data/data -- discussion.pptx
+++ b/02 - Case Studies and Acquiring Data/data -- discussion.pptx
@@ -5,7 +5,7 @@
     <p:sldMasterId id="2147483648" r:id="rId1"/>
   </p:sldMasterIdLst>
   <p:notesMasterIdLst>
-    <p:notesMasterId r:id="rId11"/>
+    <p:notesMasterId r:id="rId14"/>
   </p:notesMasterIdLst>
   <p:sldIdLst>
     <p:sldId id="256" r:id="rId2"/>
@@ -14,9 +14,12 @@
     <p:sldId id="295" r:id="rId5"/>
     <p:sldId id="282" r:id="rId6"/>
     <p:sldId id="261" r:id="rId7"/>
-    <p:sldId id="297" r:id="rId8"/>
-    <p:sldId id="298" r:id="rId9"/>
-    <p:sldId id="294" r:id="rId10"/>
+    <p:sldId id="299" r:id="rId8"/>
+    <p:sldId id="300" r:id="rId9"/>
+    <p:sldId id="297" r:id="rId10"/>
+    <p:sldId id="301" r:id="rId11"/>
+    <p:sldId id="298" r:id="rId12"/>
+    <p:sldId id="294" r:id="rId13"/>
   </p:sldIdLst>
   <p:sldSz cx="12192000" cy="6858000"/>
   <p:notesSz cx="6858000" cy="9144000"/>
@@ -12071,6 +12074,396 @@
 </p:sld>
 </file>
 
+<file path=ppt/slides/slide10.xml><?xml version="1.0" encoding="utf-8"?>
+<p:sld xmlns:a="http://schemas.openxmlformats.org/drawingml/2006/main" xmlns:r="http://schemas.openxmlformats.org/officeDocument/2006/relationships" xmlns:p="http://schemas.openxmlformats.org/presentationml/2006/main">
+  <p:cSld>
+    <p:spTree>
+      <p:nvGrpSpPr>
+        <p:cNvPr id="1" name=""/>
+        <p:cNvGrpSpPr/>
+        <p:nvPr/>
+      </p:nvGrpSpPr>
+      <p:grpSpPr>
+        <a:xfrm>
+          <a:off x="0" y="0"/>
+          <a:ext cx="0" cy="0"/>
+          <a:chOff x="0" y="0"/>
+          <a:chExt cx="0" cy="0"/>
+        </a:xfrm>
+      </p:grpSpPr>
+      <p:sp>
+        <p:nvSpPr>
+          <p:cNvPr id="4" name="Text Placeholder 3">
+            <a:extLst>
+              <a:ext uri="{FF2B5EF4-FFF2-40B4-BE49-F238E27FC236}">
+                <a16:creationId xmlns:a16="http://schemas.microsoft.com/office/drawing/2014/main" id="{5E600BA7-FA45-884F-9820-9E5F2CB7AA48}"/>
+              </a:ext>
+            </a:extLst>
+          </p:cNvPr>
+          <p:cNvSpPr>
+            <a:spLocks noGrp="1"/>
+          </p:cNvSpPr>
+          <p:nvPr>
+            <p:ph type="body" idx="1"/>
+          </p:nvPr>
+        </p:nvSpPr>
+        <p:spPr>
+          <a:xfrm>
+            <a:off x="415650" y="2724664"/>
+            <a:ext cx="11360700" cy="1408672"/>
+          </a:xfrm>
+        </p:spPr>
+        <p:txBody>
+          <a:bodyPr/>
+          <a:lstStyle/>
+          <a:p>
+            <a:pPr marL="76200" indent="0" algn="ctr">
+              <a:buNone/>
+            </a:pPr>
+            <a:r>
+              <a:rPr lang="en-US" sz="4800" dirty="0"/>
+              <a:t>How could record linkage choices and methods impact bias and fairness?</a:t>
+            </a:r>
+          </a:p>
+        </p:txBody>
+      </p:sp>
+      <p:sp>
+        <p:nvSpPr>
+          <p:cNvPr id="3" name="Title 1">
+            <a:extLst>
+              <a:ext uri="{FF2B5EF4-FFF2-40B4-BE49-F238E27FC236}">
+                <a16:creationId xmlns:a16="http://schemas.microsoft.com/office/drawing/2014/main" id="{9CDFC252-FA93-E641-BB21-4E80983D7592}"/>
+              </a:ext>
+            </a:extLst>
+          </p:cNvPr>
+          <p:cNvSpPr>
+            <a:spLocks noGrp="1"/>
+          </p:cNvSpPr>
+          <p:nvPr>
+            <p:ph type="title"/>
+          </p:nvPr>
+        </p:nvSpPr>
+        <p:spPr>
+          <a:xfrm>
+            <a:off x="415600" y="593367"/>
+            <a:ext cx="11360700" cy="763500"/>
+          </a:xfrm>
+        </p:spPr>
+        <p:txBody>
+          <a:bodyPr/>
+          <a:lstStyle/>
+          <a:p>
+            <a:pPr algn="ctr"/>
+            <a:r>
+              <a:rPr lang="en-US" dirty="0"/>
+              <a:t>DISCUSSION QUESTION</a:t>
+            </a:r>
+          </a:p>
+        </p:txBody>
+      </p:sp>
+    </p:spTree>
+    <p:extLst>
+      <p:ext uri="{BB962C8B-B14F-4D97-AF65-F5344CB8AC3E}">
+        <p14:creationId xmlns:p14="http://schemas.microsoft.com/office/powerpoint/2010/main" val="1358956084"/>
+      </p:ext>
+    </p:extLst>
+  </p:cSld>
+  <p:clrMapOvr>
+    <a:masterClrMapping/>
+  </p:clrMapOvr>
+</p:sld>
+</file>
+
+<file path=ppt/slides/slide11.xml><?xml version="1.0" encoding="utf-8"?>
+<p:sld xmlns:a="http://schemas.openxmlformats.org/drawingml/2006/main" xmlns:r="http://schemas.openxmlformats.org/officeDocument/2006/relationships" xmlns:p="http://schemas.openxmlformats.org/presentationml/2006/main">
+  <p:cSld>
+    <p:spTree>
+      <p:nvGrpSpPr>
+        <p:cNvPr id="1" name=""/>
+        <p:cNvGrpSpPr/>
+        <p:nvPr/>
+      </p:nvGrpSpPr>
+      <p:grpSpPr>
+        <a:xfrm>
+          <a:off x="0" y="0"/>
+          <a:ext cx="0" cy="0"/>
+          <a:chOff x="0" y="0"/>
+          <a:chExt cx="0" cy="0"/>
+        </a:xfrm>
+      </p:grpSpPr>
+      <p:sp>
+        <p:nvSpPr>
+          <p:cNvPr id="4" name="Text Placeholder 3">
+            <a:extLst>
+              <a:ext uri="{FF2B5EF4-FFF2-40B4-BE49-F238E27FC236}">
+                <a16:creationId xmlns:a16="http://schemas.microsoft.com/office/drawing/2014/main" id="{5E600BA7-FA45-884F-9820-9E5F2CB7AA48}"/>
+              </a:ext>
+            </a:extLst>
+          </p:cNvPr>
+          <p:cNvSpPr>
+            <a:spLocks noGrp="1"/>
+          </p:cNvSpPr>
+          <p:nvPr>
+            <p:ph type="body" idx="1"/>
+          </p:nvPr>
+        </p:nvSpPr>
+        <p:spPr>
+          <a:xfrm>
+            <a:off x="415650" y="2131539"/>
+            <a:ext cx="11360700" cy="3539969"/>
+          </a:xfrm>
+        </p:spPr>
+        <p:txBody>
+          <a:bodyPr/>
+          <a:lstStyle/>
+          <a:p>
+            <a:pPr marL="76200" indent="0" algn="ctr">
+              <a:buNone/>
+            </a:pPr>
+            <a:r>
+              <a:rPr lang="en-US" sz="4800" dirty="0"/>
+              <a:t>What are some experiences </a:t>
+            </a:r>
+          </a:p>
+          <a:p>
+            <a:pPr marL="76200" indent="0" algn="ctr">
+              <a:buNone/>
+            </a:pPr>
+            <a:r>
+              <a:rPr lang="en-US" sz="4800" dirty="0"/>
+              <a:t>and challenges you’ve </a:t>
+            </a:r>
+          </a:p>
+          <a:p>
+            <a:pPr marL="76200" indent="0" algn="ctr">
+              <a:buNone/>
+            </a:pPr>
+            <a:r>
+              <a:rPr lang="en-US" sz="4800" dirty="0"/>
+              <a:t>encountered with acquiring data </a:t>
+            </a:r>
+          </a:p>
+          <a:p>
+            <a:pPr marL="76200" indent="0" algn="ctr">
+              <a:buNone/>
+            </a:pPr>
+            <a:r>
+              <a:rPr lang="en-US" sz="4800" dirty="0"/>
+              <a:t>(for research, consulting, </a:t>
+            </a:r>
+            <a:r>
+              <a:rPr lang="en-US" sz="4800" dirty="0" err="1"/>
+              <a:t>etc</a:t>
+            </a:r>
+            <a:r>
+              <a:rPr lang="en-US" sz="4800" dirty="0"/>
+              <a:t>)?</a:t>
+            </a:r>
+          </a:p>
+        </p:txBody>
+      </p:sp>
+      <p:sp>
+        <p:nvSpPr>
+          <p:cNvPr id="3" name="Title 1">
+            <a:extLst>
+              <a:ext uri="{FF2B5EF4-FFF2-40B4-BE49-F238E27FC236}">
+                <a16:creationId xmlns:a16="http://schemas.microsoft.com/office/drawing/2014/main" id="{9CDFC252-FA93-E641-BB21-4E80983D7592}"/>
+              </a:ext>
+            </a:extLst>
+          </p:cNvPr>
+          <p:cNvSpPr>
+            <a:spLocks noGrp="1"/>
+          </p:cNvSpPr>
+          <p:nvPr>
+            <p:ph type="title"/>
+          </p:nvPr>
+        </p:nvSpPr>
+        <p:spPr>
+          <a:xfrm>
+            <a:off x="415600" y="593367"/>
+            <a:ext cx="11360700" cy="763500"/>
+          </a:xfrm>
+        </p:spPr>
+        <p:txBody>
+          <a:bodyPr/>
+          <a:lstStyle/>
+          <a:p>
+            <a:pPr algn="ctr"/>
+            <a:r>
+              <a:rPr lang="en-US" dirty="0"/>
+              <a:t>DISCUSSION QUESTION</a:t>
+            </a:r>
+          </a:p>
+        </p:txBody>
+      </p:sp>
+    </p:spTree>
+    <p:extLst>
+      <p:ext uri="{BB962C8B-B14F-4D97-AF65-F5344CB8AC3E}">
+        <p14:creationId xmlns:p14="http://schemas.microsoft.com/office/powerpoint/2010/main" val="1461123831"/>
+      </p:ext>
+    </p:extLst>
+  </p:cSld>
+  <p:clrMapOvr>
+    <a:masterClrMapping/>
+  </p:clrMapOvr>
+</p:sld>
+</file>
+
+<file path=ppt/slides/slide12.xml><?xml version="1.0" encoding="utf-8"?>
+<p:sld xmlns:a="http://schemas.openxmlformats.org/drawingml/2006/main" xmlns:r="http://schemas.openxmlformats.org/officeDocument/2006/relationships" xmlns:p="http://schemas.openxmlformats.org/presentationml/2006/main">
+  <p:cSld>
+    <p:spTree>
+      <p:nvGrpSpPr>
+        <p:cNvPr id="1" name=""/>
+        <p:cNvGrpSpPr/>
+        <p:nvPr/>
+      </p:nvGrpSpPr>
+      <p:grpSpPr>
+        <a:xfrm>
+          <a:off x="0" y="0"/>
+          <a:ext cx="0" cy="0"/>
+          <a:chOff x="0" y="0"/>
+          <a:chExt cx="0" cy="0"/>
+        </a:xfrm>
+      </p:grpSpPr>
+      <p:sp>
+        <p:nvSpPr>
+          <p:cNvPr id="3" name="Title 2">
+            <a:extLst>
+              <a:ext uri="{FF2B5EF4-FFF2-40B4-BE49-F238E27FC236}">
+                <a16:creationId xmlns:a16="http://schemas.microsoft.com/office/drawing/2014/main" id="{9323871C-7CA8-1448-8FFC-1AE6E1838941}"/>
+              </a:ext>
+            </a:extLst>
+          </p:cNvPr>
+          <p:cNvSpPr>
+            <a:spLocks noGrp="1"/>
+          </p:cNvSpPr>
+          <p:nvPr>
+            <p:ph type="title"/>
+          </p:nvPr>
+        </p:nvSpPr>
+        <p:spPr/>
+        <p:txBody>
+          <a:bodyPr/>
+          <a:lstStyle/>
+          <a:p>
+            <a:r>
+              <a:rPr lang="en-US" dirty="0"/>
+              <a:t>Things to remember</a:t>
+            </a:r>
+          </a:p>
+        </p:txBody>
+      </p:sp>
+      <p:sp>
+        <p:nvSpPr>
+          <p:cNvPr id="4" name="Text Placeholder 3">
+            <a:extLst>
+              <a:ext uri="{FF2B5EF4-FFF2-40B4-BE49-F238E27FC236}">
+                <a16:creationId xmlns:a16="http://schemas.microsoft.com/office/drawing/2014/main" id="{5E600BA7-FA45-884F-9820-9E5F2CB7AA48}"/>
+              </a:ext>
+            </a:extLst>
+          </p:cNvPr>
+          <p:cNvSpPr>
+            <a:spLocks noGrp="1"/>
+          </p:cNvSpPr>
+          <p:nvPr>
+            <p:ph type="body" idx="1"/>
+          </p:nvPr>
+        </p:nvSpPr>
+        <p:spPr/>
+        <p:txBody>
+          <a:bodyPr/>
+          <a:lstStyle/>
+          <a:p>
+            <a:r>
+              <a:rPr lang="en-US" dirty="0"/>
+              <a:t>Make sure and check that you can access your project data today</a:t>
+            </a:r>
+          </a:p>
+          <a:p>
+            <a:r>
+              <a:rPr lang="en-US" dirty="0"/>
+              <a:t>What’s coming next week:</a:t>
+            </a:r>
+          </a:p>
+          <a:p>
+            <a:pPr lvl="1"/>
+            <a:r>
+              <a:rPr lang="en-US" dirty="0"/>
+              <a:t>Assignment</a:t>
+            </a:r>
+          </a:p>
+          <a:p>
+            <a:pPr lvl="2">
+              <a:lnSpc>
+                <a:spcPct val="100000"/>
+              </a:lnSpc>
+              <a:spcBef>
+                <a:spcPts val="500"/>
+              </a:spcBef>
+            </a:pPr>
+            <a:r>
+              <a:rPr lang="en-US" dirty="0"/>
+              <a:t>Weekly review</a:t>
+            </a:r>
+          </a:p>
+          <a:p>
+            <a:pPr lvl="2">
+              <a:lnSpc>
+                <a:spcPct val="100000"/>
+              </a:lnSpc>
+              <a:spcBef>
+                <a:spcPts val="500"/>
+              </a:spcBef>
+            </a:pPr>
+            <a:r>
+              <a:rPr lang="en-US" dirty="0"/>
+              <a:t>ACS Data loading</a:t>
+            </a:r>
+          </a:p>
+          <a:p>
+            <a:pPr lvl="1">
+              <a:lnSpc>
+                <a:spcPct val="100000"/>
+              </a:lnSpc>
+              <a:spcBef>
+                <a:spcPts val="500"/>
+              </a:spcBef>
+            </a:pPr>
+            <a:r>
+              <a:rPr lang="en-US" dirty="0"/>
+              <a:t>Readings</a:t>
+            </a:r>
+          </a:p>
+          <a:p>
+            <a:r>
+              <a:rPr lang="en-US" dirty="0"/>
+              <a:t>Make sure to read </a:t>
+            </a:r>
+            <a:r>
+              <a:rPr lang="en-US" b="1" dirty="0"/>
+              <a:t>project proposal </a:t>
+            </a:r>
+            <a:r>
+              <a:rPr lang="en-US" dirty="0"/>
+              <a:t>preparation guidelines</a:t>
+            </a:r>
+          </a:p>
+        </p:txBody>
+      </p:sp>
+    </p:spTree>
+    <p:extLst>
+      <p:ext uri="{BB962C8B-B14F-4D97-AF65-F5344CB8AC3E}">
+        <p14:creationId xmlns:p14="http://schemas.microsoft.com/office/powerpoint/2010/main" val="748443292"/>
+      </p:ext>
+    </p:extLst>
+  </p:cSld>
+  <p:clrMapOvr>
+    <a:masterClrMapping/>
+  </p:clrMapOvr>
+</p:sld>
+</file>
+
 <file path=ppt/slides/slide2.xml><?xml version="1.0" encoding="utf-8"?>
 <p:sld xmlns:a="http://schemas.openxmlformats.org/drawingml/2006/main" xmlns:r="http://schemas.openxmlformats.org/officeDocument/2006/relationships" xmlns:p="http://schemas.openxmlformats.org/presentationml/2006/main">
   <p:cSld>
@@ -12710,6 +13103,257 @@
       </p:grpSpPr>
       <p:sp>
         <p:nvSpPr>
+          <p:cNvPr id="8194" name="Rectangle 2"/>
+          <p:cNvSpPr>
+            <a:spLocks noGrp="1" noChangeArrowheads="1"/>
+          </p:cNvSpPr>
+          <p:nvPr>
+            <p:ph type="title"/>
+          </p:nvPr>
+        </p:nvSpPr>
+        <p:spPr/>
+        <p:txBody>
+          <a:bodyPr/>
+          <a:lstStyle/>
+          <a:p>
+            <a:r>
+              <a:rPr lang="en-US" altLang="en-US" dirty="0"/>
+              <a:t> Working with Your Project Team</a:t>
+            </a:r>
+          </a:p>
+        </p:txBody>
+      </p:sp>
+      <p:sp>
+        <p:nvSpPr>
+          <p:cNvPr id="8195" name="Rectangle 3"/>
+          <p:cNvSpPr>
+            <a:spLocks noGrp="1" noChangeArrowheads="1"/>
+          </p:cNvSpPr>
+          <p:nvPr>
+            <p:ph type="body" idx="1"/>
+          </p:nvPr>
+        </p:nvSpPr>
+        <p:spPr>
+          <a:xfrm>
+            <a:off x="207750" y="1548990"/>
+            <a:ext cx="11776400" cy="4555200"/>
+          </a:xfrm>
+        </p:spPr>
+        <p:txBody>
+          <a:bodyPr/>
+          <a:lstStyle/>
+          <a:p>
+            <a:pPr>
+              <a:lnSpc>
+                <a:spcPct val="150000"/>
+              </a:lnSpc>
+            </a:pPr>
+            <a:r>
+              <a:rPr lang="en-US" altLang="en-US" dirty="0"/>
+              <a:t>We’re providing class time to make it easier to coordinate with your group and get feedback from peers and instructors, but you won’t be able to complete the project just in this allotted time</a:t>
+            </a:r>
+            <a:br>
+              <a:rPr lang="en-US" altLang="en-US" dirty="0"/>
+            </a:br>
+            <a:endParaRPr lang="en-US" altLang="en-US" dirty="0"/>
+          </a:p>
+          <a:p>
+            <a:pPr>
+              <a:lnSpc>
+                <a:spcPct val="150000"/>
+              </a:lnSpc>
+            </a:pPr>
+            <a:r>
+              <a:rPr lang="en-US" altLang="en-US" dirty="0"/>
+              <a:t>Tools for coordination:</a:t>
+            </a:r>
+          </a:p>
+          <a:p>
+            <a:pPr lvl="1">
+              <a:lnSpc>
+                <a:spcPct val="150000"/>
+              </a:lnSpc>
+            </a:pPr>
+            <a:r>
+              <a:rPr lang="en-US" altLang="en-US" dirty="0"/>
+              <a:t>Slack: we’ve created group-level and project-level channels. Additionally, feel free to use group DMs and video calls with your group to coordinate as well.</a:t>
+            </a:r>
+          </a:p>
+          <a:p>
+            <a:pPr lvl="1">
+              <a:lnSpc>
+                <a:spcPct val="150000"/>
+              </a:lnSpc>
+            </a:pPr>
+            <a:r>
+              <a:rPr lang="en-US" altLang="en-US" dirty="0"/>
+              <a:t>Many good free options for task tracking/management: </a:t>
+            </a:r>
+            <a:r>
+              <a:rPr lang="en-US" altLang="en-US" dirty="0" err="1"/>
+              <a:t>github</a:t>
+            </a:r>
+            <a:r>
+              <a:rPr lang="en-US" altLang="en-US" dirty="0"/>
+              <a:t> issues or project boards, </a:t>
+            </a:r>
+            <a:r>
+              <a:rPr lang="en-US" altLang="en-US" dirty="0" err="1"/>
+              <a:t>trello</a:t>
+            </a:r>
+            <a:r>
+              <a:rPr lang="en-US" altLang="en-US" dirty="0"/>
+              <a:t>, etc.</a:t>
+            </a:r>
+          </a:p>
+        </p:txBody>
+      </p:sp>
+    </p:spTree>
+    <p:extLst>
+      <p:ext uri="{BB962C8B-B14F-4D97-AF65-F5344CB8AC3E}">
+        <p14:creationId xmlns:p14="http://schemas.microsoft.com/office/powerpoint/2010/main" val="2143740766"/>
+      </p:ext>
+    </p:extLst>
+  </p:cSld>
+  <p:clrMapOvr>
+    <a:masterClrMapping/>
+  </p:clrMapOvr>
+</p:sld>
+</file>
+
+<file path=ppt/slides/slide8.xml><?xml version="1.0" encoding="utf-8"?>
+<p:sld xmlns:a="http://schemas.openxmlformats.org/drawingml/2006/main" xmlns:r="http://schemas.openxmlformats.org/officeDocument/2006/relationships" xmlns:p="http://schemas.openxmlformats.org/presentationml/2006/main">
+  <p:cSld>
+    <p:spTree>
+      <p:nvGrpSpPr>
+        <p:cNvPr id="1" name=""/>
+        <p:cNvGrpSpPr/>
+        <p:nvPr/>
+      </p:nvGrpSpPr>
+      <p:grpSpPr>
+        <a:xfrm>
+          <a:off x="0" y="0"/>
+          <a:ext cx="0" cy="0"/>
+          <a:chOff x="0" y="0"/>
+          <a:chExt cx="0" cy="0"/>
+        </a:xfrm>
+      </p:grpSpPr>
+      <p:sp>
+        <p:nvSpPr>
+          <p:cNvPr id="8194" name="Rectangle 2"/>
+          <p:cNvSpPr>
+            <a:spLocks noGrp="1" noChangeArrowheads="1"/>
+          </p:cNvSpPr>
+          <p:nvPr>
+            <p:ph type="title"/>
+          </p:nvPr>
+        </p:nvSpPr>
+        <p:spPr/>
+        <p:txBody>
+          <a:bodyPr/>
+          <a:lstStyle/>
+          <a:p>
+            <a:r>
+              <a:rPr lang="en-US" altLang="en-US" dirty="0"/>
+              <a:t> Working with Your Project Team</a:t>
+            </a:r>
+          </a:p>
+        </p:txBody>
+      </p:sp>
+      <p:sp>
+        <p:nvSpPr>
+          <p:cNvPr id="8195" name="Rectangle 3"/>
+          <p:cNvSpPr>
+            <a:spLocks noGrp="1" noChangeArrowheads="1"/>
+          </p:cNvSpPr>
+          <p:nvPr>
+            <p:ph type="body" idx="1"/>
+          </p:nvPr>
+        </p:nvSpPr>
+        <p:spPr>
+          <a:xfrm>
+            <a:off x="207750" y="1548990"/>
+            <a:ext cx="11776400" cy="4555200"/>
+          </a:xfrm>
+        </p:spPr>
+        <p:txBody>
+          <a:bodyPr/>
+          <a:lstStyle/>
+          <a:p>
+            <a:pPr>
+              <a:lnSpc>
+                <a:spcPct val="150000"/>
+              </a:lnSpc>
+            </a:pPr>
+            <a:r>
+              <a:rPr lang="en-US" altLang="en-US" dirty="0"/>
+              <a:t>Active participation in the group work throughout the entire semester is required by all the team members, and a very large component of your grade</a:t>
+            </a:r>
+            <a:br>
+              <a:rPr lang="en-US" altLang="en-US" dirty="0"/>
+            </a:br>
+            <a:endParaRPr lang="en-US" altLang="en-US" dirty="0"/>
+          </a:p>
+          <a:p>
+            <a:pPr>
+              <a:lnSpc>
+                <a:spcPct val="150000"/>
+              </a:lnSpc>
+            </a:pPr>
+            <a:r>
+              <a:rPr lang="en-US" altLang="en-US" dirty="0"/>
+              <a:t>Collaboration is encouraged, both within and across teams! Learning from each others’ strengths is a big benefit of group work, and you should feel free to discuss strategies and approaches with other teams (i.e., it’s not a competition)</a:t>
+            </a:r>
+            <a:br>
+              <a:rPr lang="en-US" altLang="en-US" dirty="0"/>
+            </a:br>
+            <a:endParaRPr lang="en-US" altLang="en-US" dirty="0"/>
+          </a:p>
+          <a:p>
+            <a:pPr>
+              <a:lnSpc>
+                <a:spcPct val="150000"/>
+              </a:lnSpc>
+            </a:pPr>
+            <a:r>
+              <a:rPr lang="en-US" altLang="en-US" dirty="0"/>
+              <a:t>Pacing your work is important. You won’t be able to do everything the week before the final report, and if everyone tries to, you’ll break the server.</a:t>
+            </a:r>
+          </a:p>
+        </p:txBody>
+      </p:sp>
+    </p:spTree>
+    <p:extLst>
+      <p:ext uri="{BB962C8B-B14F-4D97-AF65-F5344CB8AC3E}">
+        <p14:creationId xmlns:p14="http://schemas.microsoft.com/office/powerpoint/2010/main" val="2457927461"/>
+      </p:ext>
+    </p:extLst>
+  </p:cSld>
+  <p:clrMapOvr>
+    <a:masterClrMapping/>
+  </p:clrMapOvr>
+</p:sld>
+</file>
+
+<file path=ppt/slides/slide9.xml><?xml version="1.0" encoding="utf-8"?>
+<p:sld xmlns:a="http://schemas.openxmlformats.org/drawingml/2006/main" xmlns:r="http://schemas.openxmlformats.org/officeDocument/2006/relationships" xmlns:p="http://schemas.openxmlformats.org/presentationml/2006/main">
+  <p:cSld>
+    <p:spTree>
+      <p:nvGrpSpPr>
+        <p:cNvPr id="1" name=""/>
+        <p:cNvGrpSpPr/>
+        <p:nvPr/>
+      </p:nvGrpSpPr>
+      <p:grpSpPr>
+        <a:xfrm>
+          <a:off x="0" y="0"/>
+          <a:ext cx="0" cy="0"/>
+          <a:chOff x="0" y="0"/>
+          <a:chExt cx="0" cy="0"/>
+        </a:xfrm>
+      </p:grpSpPr>
+      <p:sp>
+        <p:nvSpPr>
           <p:cNvPr id="4" name="Text Placeholder 3">
             <a:extLst>
               <a:ext uri="{FF2B5EF4-FFF2-40B4-BE49-F238E27FC236}">
@@ -12726,8 +13370,8 @@
         </p:nvSpPr>
         <p:spPr>
           <a:xfrm>
-            <a:off x="415650" y="2724664"/>
-            <a:ext cx="11360700" cy="1408672"/>
+            <a:off x="210065" y="2724664"/>
+            <a:ext cx="11566285" cy="1408672"/>
           </a:xfrm>
         </p:spPr>
         <p:txBody>
@@ -12739,7 +13383,7 @@
             </a:pPr>
             <a:r>
               <a:rPr lang="en-US" sz="4800" dirty="0"/>
-              <a:t>How could record linkage choices and methods impact bias and fairness?</a:t>
+              <a:t>Past experiences with project groups or questions/feedback about this semester?</a:t>
             </a:r>
           </a:p>
         </p:txBody>
@@ -12782,296 +13426,6 @@
     <p:extLst>
       <p:ext uri="{BB962C8B-B14F-4D97-AF65-F5344CB8AC3E}">
         <p14:creationId xmlns:p14="http://schemas.microsoft.com/office/powerpoint/2010/main" val="1608946016"/>
-      </p:ext>
-    </p:extLst>
-  </p:cSld>
-  <p:clrMapOvr>
-    <a:masterClrMapping/>
-  </p:clrMapOvr>
-</p:sld>
-</file>
-
-<file path=ppt/slides/slide8.xml><?xml version="1.0" encoding="utf-8"?>
-<p:sld xmlns:a="http://schemas.openxmlformats.org/drawingml/2006/main" xmlns:r="http://schemas.openxmlformats.org/officeDocument/2006/relationships" xmlns:p="http://schemas.openxmlformats.org/presentationml/2006/main">
-  <p:cSld>
-    <p:spTree>
-      <p:nvGrpSpPr>
-        <p:cNvPr id="1" name=""/>
-        <p:cNvGrpSpPr/>
-        <p:nvPr/>
-      </p:nvGrpSpPr>
-      <p:grpSpPr>
-        <a:xfrm>
-          <a:off x="0" y="0"/>
-          <a:ext cx="0" cy="0"/>
-          <a:chOff x="0" y="0"/>
-          <a:chExt cx="0" cy="0"/>
-        </a:xfrm>
-      </p:grpSpPr>
-      <p:sp>
-        <p:nvSpPr>
-          <p:cNvPr id="4" name="Text Placeholder 3">
-            <a:extLst>
-              <a:ext uri="{FF2B5EF4-FFF2-40B4-BE49-F238E27FC236}">
-                <a16:creationId xmlns:a16="http://schemas.microsoft.com/office/drawing/2014/main" id="{5E600BA7-FA45-884F-9820-9E5F2CB7AA48}"/>
-              </a:ext>
-            </a:extLst>
-          </p:cNvPr>
-          <p:cNvSpPr>
-            <a:spLocks noGrp="1"/>
-          </p:cNvSpPr>
-          <p:nvPr>
-            <p:ph type="body" idx="1"/>
-          </p:nvPr>
-        </p:nvSpPr>
-        <p:spPr>
-          <a:xfrm>
-            <a:off x="415650" y="2131539"/>
-            <a:ext cx="11360700" cy="3539969"/>
-          </a:xfrm>
-        </p:spPr>
-        <p:txBody>
-          <a:bodyPr/>
-          <a:lstStyle/>
-          <a:p>
-            <a:pPr marL="76200" indent="0" algn="ctr">
-              <a:buNone/>
-            </a:pPr>
-            <a:r>
-              <a:rPr lang="en-US" sz="4800" dirty="0"/>
-              <a:t>What are some experiences </a:t>
-            </a:r>
-          </a:p>
-          <a:p>
-            <a:pPr marL="76200" indent="0" algn="ctr">
-              <a:buNone/>
-            </a:pPr>
-            <a:r>
-              <a:rPr lang="en-US" sz="4800" dirty="0"/>
-              <a:t>and challenges you’ve </a:t>
-            </a:r>
-          </a:p>
-          <a:p>
-            <a:pPr marL="76200" indent="0" algn="ctr">
-              <a:buNone/>
-            </a:pPr>
-            <a:r>
-              <a:rPr lang="en-US" sz="4800" dirty="0"/>
-              <a:t>encountered with acquiring data </a:t>
-            </a:r>
-          </a:p>
-          <a:p>
-            <a:pPr marL="76200" indent="0" algn="ctr">
-              <a:buNone/>
-            </a:pPr>
-            <a:r>
-              <a:rPr lang="en-US" sz="4800" dirty="0"/>
-              <a:t>(for research, consulting, </a:t>
-            </a:r>
-            <a:r>
-              <a:rPr lang="en-US" sz="4800" dirty="0" err="1"/>
-              <a:t>etc</a:t>
-            </a:r>
-            <a:r>
-              <a:rPr lang="en-US" sz="4800" dirty="0"/>
-              <a:t>)?</a:t>
-            </a:r>
-          </a:p>
-        </p:txBody>
-      </p:sp>
-      <p:sp>
-        <p:nvSpPr>
-          <p:cNvPr id="3" name="Title 1">
-            <a:extLst>
-              <a:ext uri="{FF2B5EF4-FFF2-40B4-BE49-F238E27FC236}">
-                <a16:creationId xmlns:a16="http://schemas.microsoft.com/office/drawing/2014/main" id="{9CDFC252-FA93-E641-BB21-4E80983D7592}"/>
-              </a:ext>
-            </a:extLst>
-          </p:cNvPr>
-          <p:cNvSpPr>
-            <a:spLocks noGrp="1"/>
-          </p:cNvSpPr>
-          <p:nvPr>
-            <p:ph type="title"/>
-          </p:nvPr>
-        </p:nvSpPr>
-        <p:spPr>
-          <a:xfrm>
-            <a:off x="415600" y="593367"/>
-            <a:ext cx="11360700" cy="763500"/>
-          </a:xfrm>
-        </p:spPr>
-        <p:txBody>
-          <a:bodyPr/>
-          <a:lstStyle/>
-          <a:p>
-            <a:pPr algn="ctr"/>
-            <a:r>
-              <a:rPr lang="en-US" dirty="0"/>
-              <a:t>DISCUSSION QUESTION</a:t>
-            </a:r>
-          </a:p>
-        </p:txBody>
-      </p:sp>
-    </p:spTree>
-    <p:extLst>
-      <p:ext uri="{BB962C8B-B14F-4D97-AF65-F5344CB8AC3E}">
-        <p14:creationId xmlns:p14="http://schemas.microsoft.com/office/powerpoint/2010/main" val="1461123831"/>
-      </p:ext>
-    </p:extLst>
-  </p:cSld>
-  <p:clrMapOvr>
-    <a:masterClrMapping/>
-  </p:clrMapOvr>
-</p:sld>
-</file>
-
-<file path=ppt/slides/slide9.xml><?xml version="1.0" encoding="utf-8"?>
-<p:sld xmlns:a="http://schemas.openxmlformats.org/drawingml/2006/main" xmlns:r="http://schemas.openxmlformats.org/officeDocument/2006/relationships" xmlns:p="http://schemas.openxmlformats.org/presentationml/2006/main">
-  <p:cSld>
-    <p:spTree>
-      <p:nvGrpSpPr>
-        <p:cNvPr id="1" name=""/>
-        <p:cNvGrpSpPr/>
-        <p:nvPr/>
-      </p:nvGrpSpPr>
-      <p:grpSpPr>
-        <a:xfrm>
-          <a:off x="0" y="0"/>
-          <a:ext cx="0" cy="0"/>
-          <a:chOff x="0" y="0"/>
-          <a:chExt cx="0" cy="0"/>
-        </a:xfrm>
-      </p:grpSpPr>
-      <p:sp>
-        <p:nvSpPr>
-          <p:cNvPr id="3" name="Title 2">
-            <a:extLst>
-              <a:ext uri="{FF2B5EF4-FFF2-40B4-BE49-F238E27FC236}">
-                <a16:creationId xmlns:a16="http://schemas.microsoft.com/office/drawing/2014/main" id="{9323871C-7CA8-1448-8FFC-1AE6E1838941}"/>
-              </a:ext>
-            </a:extLst>
-          </p:cNvPr>
-          <p:cNvSpPr>
-            <a:spLocks noGrp="1"/>
-          </p:cNvSpPr>
-          <p:nvPr>
-            <p:ph type="title"/>
-          </p:nvPr>
-        </p:nvSpPr>
-        <p:spPr/>
-        <p:txBody>
-          <a:bodyPr/>
-          <a:lstStyle/>
-          <a:p>
-            <a:r>
-              <a:rPr lang="en-US" dirty="0"/>
-              <a:t>Things to remember</a:t>
-            </a:r>
-          </a:p>
-        </p:txBody>
-      </p:sp>
-      <p:sp>
-        <p:nvSpPr>
-          <p:cNvPr id="4" name="Text Placeholder 3">
-            <a:extLst>
-              <a:ext uri="{FF2B5EF4-FFF2-40B4-BE49-F238E27FC236}">
-                <a16:creationId xmlns:a16="http://schemas.microsoft.com/office/drawing/2014/main" id="{5E600BA7-FA45-884F-9820-9E5F2CB7AA48}"/>
-              </a:ext>
-            </a:extLst>
-          </p:cNvPr>
-          <p:cNvSpPr>
-            <a:spLocks noGrp="1"/>
-          </p:cNvSpPr>
-          <p:nvPr>
-            <p:ph type="body" idx="1"/>
-          </p:nvPr>
-        </p:nvSpPr>
-        <p:spPr/>
-        <p:txBody>
-          <a:bodyPr/>
-          <a:lstStyle/>
-          <a:p>
-            <a:r>
-              <a:rPr lang="en-US" dirty="0"/>
-              <a:t>Make sure and check that you can access your project data today</a:t>
-            </a:r>
-          </a:p>
-          <a:p>
-            <a:r>
-              <a:rPr lang="en-US" dirty="0"/>
-              <a:t>What’s coming next week:</a:t>
-            </a:r>
-          </a:p>
-          <a:p>
-            <a:pPr lvl="1"/>
-            <a:r>
-              <a:rPr lang="en-US" dirty="0"/>
-              <a:t>Assignment</a:t>
-            </a:r>
-          </a:p>
-          <a:p>
-            <a:pPr lvl="2">
-              <a:lnSpc>
-                <a:spcPct val="100000"/>
-              </a:lnSpc>
-              <a:spcBef>
-                <a:spcPts val="500"/>
-              </a:spcBef>
-            </a:pPr>
-            <a:r>
-              <a:rPr lang="en-US" dirty="0"/>
-              <a:t>Weekly review</a:t>
-            </a:r>
-          </a:p>
-          <a:p>
-            <a:pPr lvl="2">
-              <a:lnSpc>
-                <a:spcPct val="100000"/>
-              </a:lnSpc>
-              <a:spcBef>
-                <a:spcPts val="500"/>
-              </a:spcBef>
-            </a:pPr>
-            <a:r>
-              <a:rPr lang="en-US" dirty="0"/>
-              <a:t>ACS Data loading</a:t>
-            </a:r>
-          </a:p>
-          <a:p>
-            <a:pPr lvl="1">
-              <a:lnSpc>
-                <a:spcPct val="100000"/>
-              </a:lnSpc>
-              <a:spcBef>
-                <a:spcPts val="500"/>
-              </a:spcBef>
-            </a:pPr>
-            <a:r>
-              <a:rPr lang="en-US" dirty="0"/>
-              <a:t>Readings</a:t>
-            </a:r>
-          </a:p>
-          <a:p>
-            <a:r>
-              <a:rPr lang="en-US" dirty="0"/>
-              <a:t>Make sure to read </a:t>
-            </a:r>
-            <a:r>
-              <a:rPr lang="en-US" b="1" dirty="0"/>
-              <a:t>project proposal </a:t>
-            </a:r>
-            <a:r>
-              <a:rPr lang="en-US" dirty="0"/>
-              <a:t>preparation guidelines</a:t>
-            </a:r>
-          </a:p>
-        </p:txBody>
-      </p:sp>
-    </p:spTree>
-    <p:extLst>
-      <p:ext uri="{BB962C8B-B14F-4D97-AF65-F5344CB8AC3E}">
-        <p14:creationId xmlns:p14="http://schemas.microsoft.com/office/powerpoint/2010/main" val="748443292"/>
       </p:ext>
     </p:extLst>
   </p:cSld>

</xml_diff>

<commit_message>
data discussion slide order
</commit_message>
<xml_diff>
--- a/02 - Case Studies and Acquiring Data/data -- discussion.pptx
+++ b/02 - Case Studies and Acquiring Data/data -- discussion.pptx
@@ -17,8 +17,8 @@
     <p:sldId id="299" r:id="rId8"/>
     <p:sldId id="300" r:id="rId9"/>
     <p:sldId id="297" r:id="rId10"/>
-    <p:sldId id="301" r:id="rId11"/>
-    <p:sldId id="298" r:id="rId12"/>
+    <p:sldId id="298" r:id="rId11"/>
+    <p:sldId id="301" r:id="rId12"/>
     <p:sldId id="294" r:id="rId13"/>
   </p:sldIdLst>
   <p:sldSz cx="12192000" cy="6858000"/>
@@ -257,7 +257,7 @@
       <p15:sldGuideLst xmlns:p15="http://schemas.microsoft.com/office/powerpoint/2012/main"/>
     </p:ext>
     <p:ext uri="http://customooxmlschemas.google.com/">
-      <go:slidesCustomData xmlns="" xmlns:mc="http://schemas.openxmlformats.org/markup-compatibility/2006" xmlns:mv="urn:schemas-microsoft-com:mac:vml" xmlns:c="http://schemas.openxmlformats.org/drawingml/2006/chart" xmlns:dgm="http://schemas.openxmlformats.org/drawingml/2006/diagram" xmlns:o="urn:schemas-microsoft-com:office:office" xmlns:v="urn:schemas-microsoft-com:vml" xmlns:pvml="urn:schemas-microsoft-com:office:powerpoint" xmlns:com="http://schemas.openxmlformats.org/drawingml/2006/compatibility" xmlns:p14="http://schemas.microsoft.com/office/powerpoint/2010/main" xmlns:p15="http://schemas.microsoft.com/office/powerpoint/2012/main" xmlns:go="http://customooxmlschemas.google.com/" r:id="rId30" roundtripDataSignature="AMtx7mjFyVUGRZWio+dc9dxzYsimUxNJbg=="/>
+      <go:slidesCustomData xmlns:go="http://customooxmlschemas.google.com/" xmlns:p15="http://schemas.microsoft.com/office/powerpoint/2012/main" xmlns:p14="http://schemas.microsoft.com/office/powerpoint/2010/main" xmlns:com="http://schemas.openxmlformats.org/drawingml/2006/compatibility" xmlns:pvml="urn:schemas-microsoft-com:office:powerpoint" xmlns:v="urn:schemas-microsoft-com:vml" xmlns:o="urn:schemas-microsoft-com:office:office" xmlns:dgm="http://schemas.openxmlformats.org/drawingml/2006/diagram" xmlns:c="http://schemas.openxmlformats.org/drawingml/2006/chart" xmlns:mv="urn:schemas-microsoft-com:mac:vml" xmlns:mc="http://schemas.openxmlformats.org/markup-compatibility/2006" xmlns="" r:id="rId30" roundtripDataSignature="AMtx7mjFyVUGRZWio+dc9dxzYsimUxNJbg=="/>
     </p:ext>
   </p:extLst>
 </p:presentation>
@@ -12109,106 +12109,6 @@
         </p:nvSpPr>
         <p:spPr>
           <a:xfrm>
-            <a:off x="415650" y="2724664"/>
-            <a:ext cx="11360700" cy="1408672"/>
-          </a:xfrm>
-        </p:spPr>
-        <p:txBody>
-          <a:bodyPr/>
-          <a:lstStyle/>
-          <a:p>
-            <a:pPr marL="76200" indent="0" algn="ctr">
-              <a:buNone/>
-            </a:pPr>
-            <a:r>
-              <a:rPr lang="en-US" sz="4800" dirty="0"/>
-              <a:t>How could record linkage choices and methods impact bias and fairness?</a:t>
-            </a:r>
-          </a:p>
-        </p:txBody>
-      </p:sp>
-      <p:sp>
-        <p:nvSpPr>
-          <p:cNvPr id="3" name="Title 1">
-            <a:extLst>
-              <a:ext uri="{FF2B5EF4-FFF2-40B4-BE49-F238E27FC236}">
-                <a16:creationId xmlns:a16="http://schemas.microsoft.com/office/drawing/2014/main" id="{9CDFC252-FA93-E641-BB21-4E80983D7592}"/>
-              </a:ext>
-            </a:extLst>
-          </p:cNvPr>
-          <p:cNvSpPr>
-            <a:spLocks noGrp="1"/>
-          </p:cNvSpPr>
-          <p:nvPr>
-            <p:ph type="title"/>
-          </p:nvPr>
-        </p:nvSpPr>
-        <p:spPr>
-          <a:xfrm>
-            <a:off x="415600" y="593367"/>
-            <a:ext cx="11360700" cy="763500"/>
-          </a:xfrm>
-        </p:spPr>
-        <p:txBody>
-          <a:bodyPr/>
-          <a:lstStyle/>
-          <a:p>
-            <a:pPr algn="ctr"/>
-            <a:r>
-              <a:rPr lang="en-US" dirty="0"/>
-              <a:t>DISCUSSION QUESTION</a:t>
-            </a:r>
-          </a:p>
-        </p:txBody>
-      </p:sp>
-    </p:spTree>
-    <p:extLst>
-      <p:ext uri="{BB962C8B-B14F-4D97-AF65-F5344CB8AC3E}">
-        <p14:creationId xmlns:p14="http://schemas.microsoft.com/office/powerpoint/2010/main" val="1358956084"/>
-      </p:ext>
-    </p:extLst>
-  </p:cSld>
-  <p:clrMapOvr>
-    <a:masterClrMapping/>
-  </p:clrMapOvr>
-</p:sld>
-</file>
-
-<file path=ppt/slides/slide11.xml><?xml version="1.0" encoding="utf-8"?>
-<p:sld xmlns:a="http://schemas.openxmlformats.org/drawingml/2006/main" xmlns:r="http://schemas.openxmlformats.org/officeDocument/2006/relationships" xmlns:p="http://schemas.openxmlformats.org/presentationml/2006/main">
-  <p:cSld>
-    <p:spTree>
-      <p:nvGrpSpPr>
-        <p:cNvPr id="1" name=""/>
-        <p:cNvGrpSpPr/>
-        <p:nvPr/>
-      </p:nvGrpSpPr>
-      <p:grpSpPr>
-        <a:xfrm>
-          <a:off x="0" y="0"/>
-          <a:ext cx="0" cy="0"/>
-          <a:chOff x="0" y="0"/>
-          <a:chExt cx="0" cy="0"/>
-        </a:xfrm>
-      </p:grpSpPr>
-      <p:sp>
-        <p:nvSpPr>
-          <p:cNvPr id="4" name="Text Placeholder 3">
-            <a:extLst>
-              <a:ext uri="{FF2B5EF4-FFF2-40B4-BE49-F238E27FC236}">
-                <a16:creationId xmlns:a16="http://schemas.microsoft.com/office/drawing/2014/main" id="{5E600BA7-FA45-884F-9820-9E5F2CB7AA48}"/>
-              </a:ext>
-            </a:extLst>
-          </p:cNvPr>
-          <p:cNvSpPr>
-            <a:spLocks noGrp="1"/>
-          </p:cNvSpPr>
-          <p:nvPr>
-            <p:ph type="body" idx="1"/>
-          </p:nvPr>
-        </p:nvSpPr>
-        <p:spPr>
-          <a:xfrm>
             <a:off x="415650" y="2131539"/>
             <a:ext cx="11360700" cy="3539969"/>
           </a:xfrm>
@@ -12300,6 +12200,106 @@
     <p:extLst>
       <p:ext uri="{BB962C8B-B14F-4D97-AF65-F5344CB8AC3E}">
         <p14:creationId xmlns:p14="http://schemas.microsoft.com/office/powerpoint/2010/main" val="1461123831"/>
+      </p:ext>
+    </p:extLst>
+  </p:cSld>
+  <p:clrMapOvr>
+    <a:masterClrMapping/>
+  </p:clrMapOvr>
+</p:sld>
+</file>
+
+<file path=ppt/slides/slide11.xml><?xml version="1.0" encoding="utf-8"?>
+<p:sld xmlns:a="http://schemas.openxmlformats.org/drawingml/2006/main" xmlns:r="http://schemas.openxmlformats.org/officeDocument/2006/relationships" xmlns:p="http://schemas.openxmlformats.org/presentationml/2006/main">
+  <p:cSld>
+    <p:spTree>
+      <p:nvGrpSpPr>
+        <p:cNvPr id="1" name=""/>
+        <p:cNvGrpSpPr/>
+        <p:nvPr/>
+      </p:nvGrpSpPr>
+      <p:grpSpPr>
+        <a:xfrm>
+          <a:off x="0" y="0"/>
+          <a:ext cx="0" cy="0"/>
+          <a:chOff x="0" y="0"/>
+          <a:chExt cx="0" cy="0"/>
+        </a:xfrm>
+      </p:grpSpPr>
+      <p:sp>
+        <p:nvSpPr>
+          <p:cNvPr id="4" name="Text Placeholder 3">
+            <a:extLst>
+              <a:ext uri="{FF2B5EF4-FFF2-40B4-BE49-F238E27FC236}">
+                <a16:creationId xmlns:a16="http://schemas.microsoft.com/office/drawing/2014/main" id="{5E600BA7-FA45-884F-9820-9E5F2CB7AA48}"/>
+              </a:ext>
+            </a:extLst>
+          </p:cNvPr>
+          <p:cNvSpPr>
+            <a:spLocks noGrp="1"/>
+          </p:cNvSpPr>
+          <p:nvPr>
+            <p:ph type="body" idx="1"/>
+          </p:nvPr>
+        </p:nvSpPr>
+        <p:spPr>
+          <a:xfrm>
+            <a:off x="415650" y="2724664"/>
+            <a:ext cx="11360700" cy="1408672"/>
+          </a:xfrm>
+        </p:spPr>
+        <p:txBody>
+          <a:bodyPr/>
+          <a:lstStyle/>
+          <a:p>
+            <a:pPr marL="76200" indent="0" algn="ctr">
+              <a:buNone/>
+            </a:pPr>
+            <a:r>
+              <a:rPr lang="en-US" sz="4800" dirty="0"/>
+              <a:t>How could record linkage choices and methods impact bias and fairness?</a:t>
+            </a:r>
+          </a:p>
+        </p:txBody>
+      </p:sp>
+      <p:sp>
+        <p:nvSpPr>
+          <p:cNvPr id="3" name="Title 1">
+            <a:extLst>
+              <a:ext uri="{FF2B5EF4-FFF2-40B4-BE49-F238E27FC236}">
+                <a16:creationId xmlns:a16="http://schemas.microsoft.com/office/drawing/2014/main" id="{9CDFC252-FA93-E641-BB21-4E80983D7592}"/>
+              </a:ext>
+            </a:extLst>
+          </p:cNvPr>
+          <p:cNvSpPr>
+            <a:spLocks noGrp="1"/>
+          </p:cNvSpPr>
+          <p:nvPr>
+            <p:ph type="title"/>
+          </p:nvPr>
+        </p:nvSpPr>
+        <p:spPr>
+          <a:xfrm>
+            <a:off x="415600" y="593367"/>
+            <a:ext cx="11360700" cy="763500"/>
+          </a:xfrm>
+        </p:spPr>
+        <p:txBody>
+          <a:bodyPr/>
+          <a:lstStyle/>
+          <a:p>
+            <a:pPr algn="ctr"/>
+            <a:r>
+              <a:rPr lang="en-US" dirty="0"/>
+              <a:t>DISCUSSION QUESTION</a:t>
+            </a:r>
+          </a:p>
+        </p:txBody>
+      </p:sp>
+    </p:spTree>
+    <p:extLst>
+      <p:ext uri="{BB962C8B-B14F-4D97-AF65-F5344CB8AC3E}">
+        <p14:creationId xmlns:p14="http://schemas.microsoft.com/office/powerpoint/2010/main" val="1358956084"/>
       </p:ext>
     </p:extLst>
   </p:cSld>

</xml_diff>

<commit_message>
more tech infra diagram updates
</commit_message>
<xml_diff>
--- a/02 - Case Studies and Acquiring Data/data -- discussion.pptx
+++ b/02 - Case Studies and Acquiring Data/data -- discussion.pptx
@@ -5,7 +5,7 @@
     <p:sldMasterId id="2147483648" r:id="rId1"/>
   </p:sldMasterIdLst>
   <p:notesMasterIdLst>
-    <p:notesMasterId r:id="rId25"/>
+    <p:notesMasterId r:id="rId23"/>
   </p:notesMasterIdLst>
   <p:sldIdLst>
     <p:sldId id="256" r:id="rId2"/>
@@ -16,21 +16,19 @@
     <p:sldId id="312" r:id="rId7"/>
     <p:sldId id="313" r:id="rId8"/>
     <p:sldId id="314" r:id="rId9"/>
-    <p:sldId id="309" r:id="rId10"/>
-    <p:sldId id="305" r:id="rId11"/>
-    <p:sldId id="307" r:id="rId12"/>
-    <p:sldId id="308" r:id="rId13"/>
-    <p:sldId id="302" r:id="rId14"/>
-    <p:sldId id="295" r:id="rId15"/>
-    <p:sldId id="282" r:id="rId16"/>
-    <p:sldId id="261" r:id="rId17"/>
-    <p:sldId id="299" r:id="rId18"/>
-    <p:sldId id="300" r:id="rId19"/>
-    <p:sldId id="297" r:id="rId20"/>
-    <p:sldId id="315" r:id="rId21"/>
-    <p:sldId id="298" r:id="rId22"/>
-    <p:sldId id="301" r:id="rId23"/>
-    <p:sldId id="294" r:id="rId24"/>
+    <p:sldId id="316" r:id="rId10"/>
+    <p:sldId id="317" r:id="rId11"/>
+    <p:sldId id="302" r:id="rId12"/>
+    <p:sldId id="295" r:id="rId13"/>
+    <p:sldId id="282" r:id="rId14"/>
+    <p:sldId id="261" r:id="rId15"/>
+    <p:sldId id="299" r:id="rId16"/>
+    <p:sldId id="300" r:id="rId17"/>
+    <p:sldId id="297" r:id="rId18"/>
+    <p:sldId id="315" r:id="rId19"/>
+    <p:sldId id="298" r:id="rId20"/>
+    <p:sldId id="301" r:id="rId21"/>
+    <p:sldId id="294" r:id="rId22"/>
   </p:sldIdLst>
   <p:sldSz cx="12192000" cy="6858000"/>
   <p:notesSz cx="6858000" cy="9144000"/>
@@ -268,7 +266,7 @@
       <p15:sldGuideLst xmlns:p15="http://schemas.microsoft.com/office/powerpoint/2012/main"/>
     </p:ext>
     <p:ext uri="http://customooxmlschemas.google.com/">
-      <go:slidesCustomData xmlns:go="http://customooxmlschemas.google.com/" xmlns:p15="http://schemas.microsoft.com/office/powerpoint/2012/main" xmlns:p14="http://schemas.microsoft.com/office/powerpoint/2010/main" xmlns:com="http://schemas.openxmlformats.org/drawingml/2006/compatibility" xmlns:pvml="urn:schemas-microsoft-com:office:powerpoint" xmlns:v="urn:schemas-microsoft-com:vml" xmlns:o="urn:schemas-microsoft-com:office:office" xmlns:dgm="http://schemas.openxmlformats.org/drawingml/2006/diagram" xmlns:c="http://schemas.openxmlformats.org/drawingml/2006/chart" xmlns:mv="urn:schemas-microsoft-com:mac:vml" xmlns:mc="http://schemas.openxmlformats.org/markup-compatibility/2006" xmlns="" r:id="rId30" roundtripDataSignature="AMtx7mjFyVUGRZWio+dc9dxzYsimUxNJbg=="/>
+      <go:slidesCustomData xmlns="" xmlns:mc="http://schemas.openxmlformats.org/markup-compatibility/2006" xmlns:mv="urn:schemas-microsoft-com:mac:vml" xmlns:c="http://schemas.openxmlformats.org/drawingml/2006/chart" xmlns:dgm="http://schemas.openxmlformats.org/drawingml/2006/diagram" xmlns:o="urn:schemas-microsoft-com:office:office" xmlns:v="urn:schemas-microsoft-com:vml" xmlns:pvml="urn:schemas-microsoft-com:office:powerpoint" xmlns:com="http://schemas.openxmlformats.org/drawingml/2006/compatibility" xmlns:p14="http://schemas.microsoft.com/office/powerpoint/2010/main" xmlns:p15="http://schemas.microsoft.com/office/powerpoint/2012/main" xmlns:go="http://customooxmlschemas.google.com/" r:id="rId30" roundtripDataSignature="AMtx7mjFyVUGRZWio+dc9dxzYsimUxNJbg=="/>
     </p:ext>
   </p:extLst>
 </p:presentation>
@@ -12086,7 +12084,7 @@
 </file>
 
 <file path=ppt/slides/slide10.xml><?xml version="1.0" encoding="utf-8"?>
-<p:sld xmlns:a="http://schemas.openxmlformats.org/drawingml/2006/main" xmlns:r="http://schemas.openxmlformats.org/officeDocument/2006/relationships" xmlns:p="http://schemas.openxmlformats.org/presentationml/2006/main" show="0">
+<p:sld xmlns:a="http://schemas.openxmlformats.org/drawingml/2006/main" xmlns:r="http://schemas.openxmlformats.org/officeDocument/2006/relationships" xmlns:p="http://schemas.openxmlformats.org/presentationml/2006/main">
   <p:cSld>
     <p:spTree>
       <p:nvGrpSpPr>
@@ -12120,7 +12118,7 @@
         </p:nvSpPr>
         <p:spPr>
           <a:xfrm>
-            <a:off x="415600" y="593367"/>
+            <a:off x="415650" y="29156"/>
             <a:ext cx="11360700" cy="763500"/>
           </a:xfrm>
         </p:spPr>
@@ -12130,13 +12128,23 @@
           <a:p>
             <a:r>
               <a:rPr lang="en-US" dirty="0"/>
-              <a:t>Class Infrastructure: Using </a:t>
+              <a:t>Class Infrastructure Elements:</a:t>
+            </a:r>
+            <a:br>
+              <a:rPr lang="en-US" dirty="0"/>
+            </a:br>
+            <a:r>
+              <a:rPr lang="en-US" dirty="0"/>
+              <a:t>When edit code with a </a:t>
             </a:r>
             <a:r>
-              <a:rPr lang="en-US" dirty="0" err="1"/>
-              <a:t>Jupyter</a:t>
+              <a:rPr lang="en-US" i="1" dirty="0"/>
+              <a:t>remote</a:t>
             </a:r>
-            <a:endParaRPr lang="en-US" dirty="0"/>
+            <a:r>
+              <a:rPr lang="en-US" dirty="0"/>
+              <a:t> text editor</a:t>
+            </a:r>
           </a:p>
         </p:txBody>
       </p:sp>
@@ -12169,7 +12177,7 @@
         </p:blipFill>
         <p:spPr bwMode="auto">
           <a:xfrm>
-            <a:off x="1218343" y="3444917"/>
+            <a:off x="1169003" y="3386457"/>
             <a:ext cx="1286274" cy="1192426"/>
           </a:xfrm>
           <a:prstGeom prst="rect">
@@ -12216,8 +12224,8 @@
         </p:blipFill>
         <p:spPr bwMode="auto">
           <a:xfrm>
-            <a:off x="4003588" y="1925658"/>
-            <a:ext cx="1533525" cy="1274741"/>
+            <a:off x="4538372" y="1921397"/>
+            <a:ext cx="1288100" cy="1070732"/>
           </a:xfrm>
           <a:prstGeom prst="rect">
             <a:avLst/>
@@ -12263,7 +12271,7 @@
         </p:blipFill>
         <p:spPr bwMode="auto">
           <a:xfrm>
-            <a:off x="10061659" y="3173955"/>
+            <a:off x="10181069" y="3303049"/>
             <a:ext cx="1231185" cy="1359243"/>
           </a:xfrm>
           <a:prstGeom prst="rect">
@@ -12310,7 +12318,7 @@
         </p:blipFill>
         <p:spPr bwMode="auto">
           <a:xfrm>
-            <a:off x="10245617" y="4533197"/>
+            <a:off x="10259463" y="2435330"/>
             <a:ext cx="1074395" cy="806496"/>
           </a:xfrm>
           <a:prstGeom prst="rect">
@@ -12357,7 +12365,7 @@
         </p:blipFill>
         <p:spPr bwMode="auto">
           <a:xfrm>
-            <a:off x="6903350" y="3173955"/>
+            <a:off x="7494640" y="3031386"/>
             <a:ext cx="1226500" cy="1643449"/>
           </a:xfrm>
           <a:prstGeom prst="rect">
@@ -12404,8 +12412,8 @@
         </p:blipFill>
         <p:spPr bwMode="auto">
           <a:xfrm>
-            <a:off x="4090733" y="4637343"/>
-            <a:ext cx="1226500" cy="1643449"/>
+            <a:off x="4639863" y="3471662"/>
+            <a:ext cx="951335" cy="1274741"/>
           </a:xfrm>
           <a:prstGeom prst="rect">
             <a:avLst/>
@@ -12451,8 +12459,8 @@
         </p:blipFill>
         <p:spPr bwMode="auto">
           <a:xfrm>
-            <a:off x="4602903" y="5459067"/>
-            <a:ext cx="604450" cy="604450"/>
+            <a:off x="4760503" y="3715202"/>
+            <a:ext cx="654337" cy="654337"/>
           </a:xfrm>
           <a:prstGeom prst="rect">
             <a:avLst/>
@@ -12483,7 +12491,7 @@
         </p:nvSpPr>
         <p:spPr>
           <a:xfrm>
-            <a:off x="4395186" y="6334780"/>
+            <a:off x="4609021" y="4728333"/>
             <a:ext cx="922047" cy="523220"/>
           </a:xfrm>
           <a:prstGeom prst="rect">
@@ -12506,10 +12514,166 @@
       </p:sp>
       <p:sp>
         <p:nvSpPr>
-          <p:cNvPr id="2" name="Freeform 1">
+          <p:cNvPr id="23" name="TextBox 22">
             <a:extLst>
               <a:ext uri="{FF2B5EF4-FFF2-40B4-BE49-F238E27FC236}">
-                <a16:creationId xmlns:a16="http://schemas.microsoft.com/office/drawing/2014/main" id="{B2085488-A8CD-6B48-9F08-F4D4CDDF8C85}"/>
+                <a16:creationId xmlns:a16="http://schemas.microsoft.com/office/drawing/2014/main" id="{90A19FE5-D1B7-8444-BA03-9B00197E8768}"/>
+              </a:ext>
+            </a:extLst>
+          </p:cNvPr>
+          <p:cNvSpPr txBox="1"/>
+          <p:nvPr/>
+        </p:nvSpPr>
+        <p:spPr>
+          <a:xfrm>
+            <a:off x="656597" y="4553615"/>
+            <a:ext cx="2145139" cy="523220"/>
+          </a:xfrm>
+          <a:prstGeom prst="rect">
+            <a:avLst/>
+          </a:prstGeom>
+          <a:noFill/>
+        </p:spPr>
+        <p:txBody>
+          <a:bodyPr wrap="none" rtlCol="0">
+            <a:spAutoFit/>
+          </a:bodyPr>
+          <a:lstStyle/>
+          <a:p>
+            <a:r>
+              <a:rPr lang="en-US" sz="2800" dirty="0"/>
+              <a:t>Your Laptop</a:t>
+            </a:r>
+          </a:p>
+        </p:txBody>
+      </p:sp>
+      <p:sp>
+        <p:nvSpPr>
+          <p:cNvPr id="24" name="TextBox 23">
+            <a:extLst>
+              <a:ext uri="{FF2B5EF4-FFF2-40B4-BE49-F238E27FC236}">
+                <a16:creationId xmlns:a16="http://schemas.microsoft.com/office/drawing/2014/main" id="{385C9E24-B1FC-5F4B-8AD9-0FAF4BC393C9}"/>
+              </a:ext>
+            </a:extLst>
+          </p:cNvPr>
+          <p:cNvSpPr txBox="1"/>
+          <p:nvPr/>
+        </p:nvSpPr>
+        <p:spPr>
+          <a:xfrm>
+            <a:off x="3991483" y="1465411"/>
+            <a:ext cx="2462534" cy="523220"/>
+          </a:xfrm>
+          <a:prstGeom prst="rect">
+            <a:avLst/>
+          </a:prstGeom>
+          <a:noFill/>
+        </p:spPr>
+        <p:txBody>
+          <a:bodyPr wrap="none" rtlCol="0">
+            <a:spAutoFit/>
+          </a:bodyPr>
+          <a:lstStyle/>
+          <a:p>
+            <a:r>
+              <a:rPr lang="en-US" sz="2800" dirty="0"/>
+              <a:t>GitHub Server</a:t>
+            </a:r>
+          </a:p>
+        </p:txBody>
+      </p:sp>
+      <p:sp>
+        <p:nvSpPr>
+          <p:cNvPr id="25" name="TextBox 24">
+            <a:extLst>
+              <a:ext uri="{FF2B5EF4-FFF2-40B4-BE49-F238E27FC236}">
+                <a16:creationId xmlns:a16="http://schemas.microsoft.com/office/drawing/2014/main" id="{11442DDD-98A9-3248-A356-17111CAD8F50}"/>
+              </a:ext>
+            </a:extLst>
+          </p:cNvPr>
+          <p:cNvSpPr txBox="1"/>
+          <p:nvPr/>
+        </p:nvSpPr>
+        <p:spPr>
+          <a:xfrm>
+            <a:off x="7051127" y="4673904"/>
+            <a:ext cx="2339102" cy="830997"/>
+          </a:xfrm>
+          <a:prstGeom prst="rect">
+            <a:avLst/>
+          </a:prstGeom>
+          <a:noFill/>
+        </p:spPr>
+        <p:txBody>
+          <a:bodyPr wrap="none" rtlCol="0">
+            <a:spAutoFit/>
+          </a:bodyPr>
+          <a:lstStyle/>
+          <a:p>
+            <a:r>
+              <a:rPr lang="en-US" sz="2800" dirty="0"/>
+              <a:t>Class Server</a:t>
+            </a:r>
+            <a:br>
+              <a:rPr lang="en-US" sz="2800" dirty="0"/>
+            </a:br>
+            <a:r>
+              <a:rPr lang="en-US" sz="2000" dirty="0" err="1"/>
+              <a:t>mlpolicylab.dssg.io</a:t>
+            </a:r>
+            <a:endParaRPr lang="en-US" sz="2800" dirty="0"/>
+          </a:p>
+        </p:txBody>
+      </p:sp>
+      <p:sp>
+        <p:nvSpPr>
+          <p:cNvPr id="26" name="TextBox 25">
+            <a:extLst>
+              <a:ext uri="{FF2B5EF4-FFF2-40B4-BE49-F238E27FC236}">
+                <a16:creationId xmlns:a16="http://schemas.microsoft.com/office/drawing/2014/main" id="{DBA3E5FF-0E29-6740-8D62-07DA934FBF9E}"/>
+              </a:ext>
+            </a:extLst>
+          </p:cNvPr>
+          <p:cNvSpPr txBox="1"/>
+          <p:nvPr/>
+        </p:nvSpPr>
+        <p:spPr>
+          <a:xfrm>
+            <a:off x="9477781" y="4676726"/>
+            <a:ext cx="2732146" cy="800219"/>
+          </a:xfrm>
+          <a:prstGeom prst="rect">
+            <a:avLst/>
+          </a:prstGeom>
+          <a:noFill/>
+        </p:spPr>
+        <p:txBody>
+          <a:bodyPr wrap="square" rtlCol="0">
+            <a:spAutoFit/>
+          </a:bodyPr>
+          <a:lstStyle/>
+          <a:p>
+            <a:r>
+              <a:rPr lang="en-US" sz="2800" dirty="0"/>
+              <a:t>Class Database</a:t>
+            </a:r>
+            <a:br>
+              <a:rPr lang="en-US" sz="2800" dirty="0"/>
+            </a:br>
+            <a:r>
+              <a:rPr lang="en-US" sz="1800" dirty="0" err="1"/>
+              <a:t>mlpolicylab.db.dssg.io</a:t>
+            </a:r>
+            <a:endParaRPr lang="en-US" sz="2800" dirty="0"/>
+          </a:p>
+        </p:txBody>
+      </p:sp>
+      <p:sp>
+        <p:nvSpPr>
+          <p:cNvPr id="2" name="Frame 1">
+            <a:extLst>
+              <a:ext uri="{FF2B5EF4-FFF2-40B4-BE49-F238E27FC236}">
+                <a16:creationId xmlns:a16="http://schemas.microsoft.com/office/drawing/2014/main" id="{498F7965-4EC1-0F44-BA4A-EB5F8FC49722}"/>
               </a:ext>
             </a:extLst>
           </p:cNvPr>
@@ -12518,68 +12682,17 @@
         </p:nvSpPr>
         <p:spPr>
           <a:xfrm>
-            <a:off x="2199503" y="3867003"/>
-            <a:ext cx="4633783" cy="1597285"/>
+            <a:off x="6874769" y="2054711"/>
+            <a:ext cx="5317231" cy="4226081"/>
           </a:xfrm>
-          <a:custGeom>
-            <a:avLst/>
-            <a:gdLst>
-              <a:gd name="connsiteX0" fmla="*/ 0 w 4633783"/>
-              <a:gd name="connsiteY0" fmla="*/ 532002 h 1597285"/>
-              <a:gd name="connsiteX1" fmla="*/ 2656702 w 4633783"/>
-              <a:gd name="connsiteY1" fmla="*/ 1594683 h 1597285"/>
-              <a:gd name="connsiteX2" fmla="*/ 3805881 w 4633783"/>
-              <a:gd name="connsiteY2" fmla="*/ 260154 h 1597285"/>
-              <a:gd name="connsiteX3" fmla="*/ 4633783 w 4633783"/>
-              <a:gd name="connsiteY3" fmla="*/ 662 h 1597285"/>
-            </a:gdLst>
-            <a:ahLst/>
-            <a:cxnLst>
-              <a:cxn ang="0">
-                <a:pos x="connsiteX0" y="connsiteY0"/>
-              </a:cxn>
-              <a:cxn ang="0">
-                <a:pos x="connsiteX1" y="connsiteY1"/>
-              </a:cxn>
-              <a:cxn ang="0">
-                <a:pos x="connsiteX2" y="connsiteY2"/>
-              </a:cxn>
-              <a:cxn ang="0">
-                <a:pos x="connsiteX3" y="connsiteY3"/>
-              </a:cxn>
-            </a:cxnLst>
-            <a:rect l="l" t="t" r="r" b="b"/>
-            <a:pathLst>
-              <a:path w="4633783" h="1597285">
-                <a:moveTo>
-                  <a:pt x="0" y="532002"/>
-                </a:moveTo>
-                <a:cubicBezTo>
-                  <a:pt x="1011194" y="1085996"/>
-                  <a:pt x="2022389" y="1639991"/>
-                  <a:pt x="2656702" y="1594683"/>
-                </a:cubicBezTo>
-                <a:cubicBezTo>
-                  <a:pt x="3291016" y="1549375"/>
-                  <a:pt x="3476368" y="525824"/>
-                  <a:pt x="3805881" y="260154"/>
-                </a:cubicBezTo>
-                <a:cubicBezTo>
-                  <a:pt x="4135394" y="-5516"/>
-                  <a:pt x="4384588" y="-2427"/>
-                  <a:pt x="4633783" y="662"/>
-                </a:cubicBezTo>
-              </a:path>
-            </a:pathLst>
-          </a:custGeom>
-          <a:noFill/>
-          <a:ln w="57150">
-            <a:solidFill>
-              <a:srgbClr val="7030A0"/>
-            </a:solidFill>
-            <a:headEnd type="triangle" w="med" len="med"/>
-            <a:tailEnd type="triangle" w="med" len="med"/>
-          </a:ln>
+          <a:prstGeom prst="frame">
+            <a:avLst>
+              <a:gd name="adj1" fmla="val 1300"/>
+            </a:avLst>
+          </a:prstGeom>
+          <a:solidFill>
+            <a:srgbClr val="C00000"/>
+          </a:solidFill>
         </p:spPr>
         <p:style>
           <a:lnRef idx="2">
@@ -12602,59 +12715,20 @@
           <a:lstStyle/>
           <a:p>
             <a:pPr algn="ctr"/>
-            <a:endParaRPr lang="en-US"/>
+            <a:endParaRPr lang="en-US">
+              <a:solidFill>
+                <a:schemeClr val="tx1"/>
+              </a:solidFill>
+            </a:endParaRPr>
           </a:p>
         </p:txBody>
       </p:sp>
-      <p:cxnSp>
-        <p:nvCxnSpPr>
-          <p:cNvPr id="4" name="Straight Arrow Connector 3">
-            <a:extLst>
-              <a:ext uri="{FF2B5EF4-FFF2-40B4-BE49-F238E27FC236}">
-                <a16:creationId xmlns:a16="http://schemas.microsoft.com/office/drawing/2014/main" id="{DB18314D-6663-9D4E-8768-0F20B025F300}"/>
-              </a:ext>
-            </a:extLst>
-          </p:cNvPr>
-          <p:cNvCxnSpPr/>
-          <p:nvPr/>
-        </p:nvCxnSpPr>
-        <p:spPr>
-          <a:xfrm>
-            <a:off x="8216349" y="3867003"/>
-            <a:ext cx="1755555" cy="0"/>
-          </a:xfrm>
-          <a:prstGeom prst="straightConnector1">
-            <a:avLst/>
-          </a:prstGeom>
-          <a:ln w="57150">
-            <a:solidFill>
-              <a:srgbClr val="7030A0"/>
-            </a:solidFill>
-            <a:headEnd type="triangle"/>
-            <a:tailEnd type="triangle"/>
-          </a:ln>
-        </p:spPr>
-        <p:style>
-          <a:lnRef idx="1">
-            <a:schemeClr val="accent1"/>
-          </a:lnRef>
-          <a:fillRef idx="0">
-            <a:schemeClr val="accent1"/>
-          </a:fillRef>
-          <a:effectRef idx="0">
-            <a:schemeClr val="accent1"/>
-          </a:effectRef>
-          <a:fontRef idx="minor">
-            <a:schemeClr val="tx1"/>
-          </a:fontRef>
-        </p:style>
-      </p:cxnSp>
       <p:sp>
         <p:nvSpPr>
-          <p:cNvPr id="16" name="TextBox 15">
+          <p:cNvPr id="3" name="TextBox 2">
             <a:extLst>
               <a:ext uri="{FF2B5EF4-FFF2-40B4-BE49-F238E27FC236}">
-                <a16:creationId xmlns:a16="http://schemas.microsoft.com/office/drawing/2014/main" id="{3F0FF22A-DD5E-E948-9DF3-CB65852AE243}"/>
+                <a16:creationId xmlns:a16="http://schemas.microsoft.com/office/drawing/2014/main" id="{4ADA3757-0F37-9947-A12B-9FCE6670AAD5}"/>
               </a:ext>
             </a:extLst>
           </p:cNvPr>
@@ -12663,149 +12737,8 @@
         </p:nvSpPr>
         <p:spPr>
           <a:xfrm>
-            <a:off x="6425605" y="4817404"/>
-            <a:ext cx="2523447" cy="954107"/>
-          </a:xfrm>
-          <a:prstGeom prst="rect">
-            <a:avLst/>
-          </a:prstGeom>
-          <a:noFill/>
-        </p:spPr>
-        <p:txBody>
-          <a:bodyPr wrap="none" rtlCol="0">
-            <a:spAutoFit/>
-          </a:bodyPr>
-          <a:lstStyle/>
-          <a:p>
-            <a:pPr algn="ctr"/>
-            <a:r>
-              <a:rPr lang="en-US" sz="2800" dirty="0"/>
-              <a:t>SSH Tunnel +</a:t>
-            </a:r>
-          </a:p>
-          <a:p>
-            <a:pPr algn="ctr"/>
-            <a:r>
-              <a:rPr lang="en-US" sz="2800" dirty="0" err="1"/>
-              <a:t>Jupyter</a:t>
-            </a:r>
-            <a:r>
-              <a:rPr lang="en-US" sz="2800" dirty="0"/>
-              <a:t> Server</a:t>
-            </a:r>
-          </a:p>
-        </p:txBody>
-      </p:sp>
-      <p:pic>
-        <p:nvPicPr>
-          <p:cNvPr id="3076" name="Picture 4">
-            <a:extLst>
-              <a:ext uri="{FF2B5EF4-FFF2-40B4-BE49-F238E27FC236}">
-                <a16:creationId xmlns:a16="http://schemas.microsoft.com/office/drawing/2014/main" id="{409615BD-ABCF-E54D-98C9-4B39EECB9C7D}"/>
-              </a:ext>
-            </a:extLst>
-          </p:cNvPr>
-          <p:cNvPicPr>
-            <a:picLocks noChangeAspect="1" noChangeArrowheads="1"/>
-          </p:cNvPicPr>
-          <p:nvPr/>
-        </p:nvPicPr>
-        <p:blipFill>
-          <a:blip r:embed="rId8">
-            <a:extLst>
-              <a:ext uri="{28A0092B-C50C-407E-A947-70E740481C1C}">
-                <a14:useLocalDpi xmlns:a14="http://schemas.microsoft.com/office/drawing/2010/main" val="0"/>
-              </a:ext>
-            </a:extLst>
-          </a:blip>
-          <a:srcRect/>
-          <a:stretch>
-            <a:fillRect/>
-          </a:stretch>
-        </p:blipFill>
-        <p:spPr bwMode="auto">
-          <a:xfrm>
-            <a:off x="7178743" y="5650625"/>
-            <a:ext cx="1017170" cy="1179011"/>
-          </a:xfrm>
-          <a:prstGeom prst="rect">
-            <a:avLst/>
-          </a:prstGeom>
-          <a:noFill/>
-          <a:extLst>
-            <a:ext uri="{909E8E84-426E-40DD-AFC4-6F175D3DCCD1}">
-              <a14:hiddenFill xmlns:a14="http://schemas.microsoft.com/office/drawing/2010/main">
-                <a:solidFill>
-                  <a:srgbClr val="FFFFFF"/>
-                </a:solidFill>
-              </a14:hiddenFill>
-            </a:ext>
-          </a:extLst>
-        </p:spPr>
-      </p:pic>
-      <p:pic>
-        <p:nvPicPr>
-          <p:cNvPr id="3078" name="Picture 6" descr="Netscape Navigator - Wikipedia">
-            <a:extLst>
-              <a:ext uri="{FF2B5EF4-FFF2-40B4-BE49-F238E27FC236}">
-                <a16:creationId xmlns:a16="http://schemas.microsoft.com/office/drawing/2014/main" id="{4E837AE9-10E7-EA4B-871E-DBBD1FF14E41}"/>
-              </a:ext>
-            </a:extLst>
-          </p:cNvPr>
-          <p:cNvPicPr>
-            <a:picLocks noChangeAspect="1" noChangeArrowheads="1"/>
-          </p:cNvPicPr>
-          <p:nvPr/>
-        </p:nvPicPr>
-        <p:blipFill>
-          <a:blip r:embed="rId9">
-            <a:extLst>
-              <a:ext uri="{28A0092B-C50C-407E-A947-70E740481C1C}">
-                <a14:useLocalDpi xmlns:a14="http://schemas.microsoft.com/office/drawing/2010/main" val="0"/>
-              </a:ext>
-            </a:extLst>
-          </a:blip>
-          <a:srcRect/>
-          <a:stretch>
-            <a:fillRect/>
-          </a:stretch>
-        </p:blipFill>
-        <p:spPr bwMode="auto">
-          <a:xfrm>
-            <a:off x="1147706" y="4830692"/>
-            <a:ext cx="955314" cy="955314"/>
-          </a:xfrm>
-          <a:prstGeom prst="rect">
-            <a:avLst/>
-          </a:prstGeom>
-          <a:noFill/>
-          <a:extLst>
-            <a:ext uri="{909E8E84-426E-40DD-AFC4-6F175D3DCCD1}">
-              <a14:hiddenFill xmlns:a14="http://schemas.microsoft.com/office/drawing/2010/main">
-                <a:solidFill>
-                  <a:srgbClr val="FFFFFF"/>
-                </a:solidFill>
-              </a14:hiddenFill>
-            </a:ext>
-          </a:extLst>
-        </p:spPr>
-      </p:pic>
-      <p:sp>
-        <p:nvSpPr>
-          <p:cNvPr id="19" name="TextBox 18">
-            <a:extLst>
-              <a:ext uri="{FF2B5EF4-FFF2-40B4-BE49-F238E27FC236}">
-                <a16:creationId xmlns:a16="http://schemas.microsoft.com/office/drawing/2014/main" id="{C55A6B00-8DB7-9944-93A2-732D230DD83E}"/>
-              </a:ext>
-            </a:extLst>
-          </p:cNvPr>
-          <p:cNvSpPr txBox="1"/>
-          <p:nvPr/>
-        </p:nvSpPr>
-        <p:spPr>
-          <a:xfrm>
-            <a:off x="878041" y="5741624"/>
-            <a:ext cx="1503938" cy="523220"/>
+            <a:off x="8220678" y="1647384"/>
+            <a:ext cx="2773516" cy="400110"/>
           </a:xfrm>
           <a:prstGeom prst="rect">
             <a:avLst/>
@@ -12819,499 +12752,18 @@
           <a:lstStyle/>
           <a:p>
             <a:r>
-              <a:rPr lang="en-US" sz="2800"/>
-              <a:t>Browser</a:t>
-            </a:r>
-            <a:endParaRPr lang="en-US" sz="2800" dirty="0"/>
-          </a:p>
-        </p:txBody>
-      </p:sp>
-    </p:spTree>
-    <p:extLst>
-      <p:ext uri="{BB962C8B-B14F-4D97-AF65-F5344CB8AC3E}">
-        <p14:creationId xmlns:p14="http://schemas.microsoft.com/office/powerpoint/2010/main" val="4234811144"/>
-      </p:ext>
-    </p:extLst>
-  </p:cSld>
-  <p:clrMapOvr>
-    <a:masterClrMapping/>
-  </p:clrMapOvr>
-</p:sld>
-</file>
-
-<file path=ppt/slides/slide11.xml><?xml version="1.0" encoding="utf-8"?>
-<p:sld xmlns:a="http://schemas.openxmlformats.org/drawingml/2006/main" xmlns:r="http://schemas.openxmlformats.org/officeDocument/2006/relationships" xmlns:p="http://schemas.openxmlformats.org/presentationml/2006/main">
-  <p:cSld>
-    <p:spTree>
-      <p:nvGrpSpPr>
-        <p:cNvPr id="1" name=""/>
-        <p:cNvGrpSpPr/>
-        <p:nvPr/>
-      </p:nvGrpSpPr>
-      <p:grpSpPr>
-        <a:xfrm>
-          <a:off x="0" y="0"/>
-          <a:ext cx="0" cy="0"/>
-          <a:chOff x="0" y="0"/>
-          <a:chExt cx="0" cy="0"/>
-        </a:xfrm>
-      </p:grpSpPr>
-      <p:sp>
-        <p:nvSpPr>
-          <p:cNvPr id="5" name="Title 2">
-            <a:extLst>
-              <a:ext uri="{FF2B5EF4-FFF2-40B4-BE49-F238E27FC236}">
-                <a16:creationId xmlns:a16="http://schemas.microsoft.com/office/drawing/2014/main" id="{273CE3F5-6629-DC4B-9BAD-BA93C484AC62}"/>
-              </a:ext>
-            </a:extLst>
-          </p:cNvPr>
-          <p:cNvSpPr>
-            <a:spLocks noGrp="1"/>
-          </p:cNvSpPr>
-          <p:nvPr>
-            <p:ph type="title"/>
-          </p:nvPr>
-        </p:nvSpPr>
-        <p:spPr>
-          <a:xfrm>
-            <a:off x="415600" y="593367"/>
-            <a:ext cx="11360700" cy="763500"/>
-          </a:xfrm>
-        </p:spPr>
-        <p:txBody>
-          <a:bodyPr/>
-          <a:lstStyle/>
-          <a:p>
-            <a:r>
-              <a:rPr lang="en-US" dirty="0"/>
-              <a:t>Class Infrastructure: Editing Code (local editor)</a:t>
+              <a:rPr lang="en-US" sz="2000" dirty="0"/>
+              <a:t>Amazon Web Services</a:t>
             </a:r>
           </a:p>
         </p:txBody>
       </p:sp>
-      <p:pic>
-        <p:nvPicPr>
-          <p:cNvPr id="1032" name="Picture 8">
-            <a:extLst>
-              <a:ext uri="{FF2B5EF4-FFF2-40B4-BE49-F238E27FC236}">
-                <a16:creationId xmlns:a16="http://schemas.microsoft.com/office/drawing/2014/main" id="{7FFCC008-BE14-4240-AB63-CD073C9A65D8}"/>
-              </a:ext>
-            </a:extLst>
-          </p:cNvPr>
-          <p:cNvPicPr>
-            <a:picLocks noChangeAspect="1" noChangeArrowheads="1"/>
-          </p:cNvPicPr>
-          <p:nvPr/>
-        </p:nvPicPr>
-        <p:blipFill>
-          <a:blip r:embed="rId2">
-            <a:extLst>
-              <a:ext uri="{28A0092B-C50C-407E-A947-70E740481C1C}">
-                <a14:useLocalDpi xmlns:a14="http://schemas.microsoft.com/office/drawing/2010/main" val="0"/>
-              </a:ext>
-            </a:extLst>
-          </a:blip>
-          <a:srcRect/>
-          <a:stretch>
-            <a:fillRect/>
-          </a:stretch>
-        </p:blipFill>
-        <p:spPr bwMode="auto">
-          <a:xfrm>
-            <a:off x="1218343" y="3444917"/>
-            <a:ext cx="1286274" cy="1192426"/>
-          </a:xfrm>
-          <a:prstGeom prst="rect">
-            <a:avLst/>
-          </a:prstGeom>
-          <a:noFill/>
-          <a:extLst>
-            <a:ext uri="{909E8E84-426E-40DD-AFC4-6F175D3DCCD1}">
-              <a14:hiddenFill xmlns:a14="http://schemas.microsoft.com/office/drawing/2010/main">
-                <a:solidFill>
-                  <a:srgbClr val="FFFFFF"/>
-                </a:solidFill>
-              </a14:hiddenFill>
-            </a:ext>
-          </a:extLst>
-        </p:spPr>
-      </p:pic>
-      <p:pic>
-        <p:nvPicPr>
-          <p:cNvPr id="1038" name="Picture 14" descr="GitHub Logos and Usage · GitHub">
-            <a:extLst>
-              <a:ext uri="{FF2B5EF4-FFF2-40B4-BE49-F238E27FC236}">
-                <a16:creationId xmlns:a16="http://schemas.microsoft.com/office/drawing/2014/main" id="{2DC858A7-A8CB-2A4F-84AC-26978E98F59C}"/>
-              </a:ext>
-            </a:extLst>
-          </p:cNvPr>
-          <p:cNvPicPr>
-            <a:picLocks noChangeAspect="1" noChangeArrowheads="1"/>
-          </p:cNvPicPr>
-          <p:nvPr/>
-        </p:nvPicPr>
-        <p:blipFill>
-          <a:blip r:embed="rId3">
-            <a:extLst>
-              <a:ext uri="{28A0092B-C50C-407E-A947-70E740481C1C}">
-                <a14:useLocalDpi xmlns:a14="http://schemas.microsoft.com/office/drawing/2010/main" val="0"/>
-              </a:ext>
-            </a:extLst>
-          </a:blip>
-          <a:srcRect/>
-          <a:stretch>
-            <a:fillRect/>
-          </a:stretch>
-        </p:blipFill>
-        <p:spPr bwMode="auto">
-          <a:xfrm>
-            <a:off x="4003588" y="1925658"/>
-            <a:ext cx="1533525" cy="1274741"/>
-          </a:xfrm>
-          <a:prstGeom prst="rect">
-            <a:avLst/>
-          </a:prstGeom>
-          <a:noFill/>
-          <a:extLst>
-            <a:ext uri="{909E8E84-426E-40DD-AFC4-6F175D3DCCD1}">
-              <a14:hiddenFill xmlns:a14="http://schemas.microsoft.com/office/drawing/2010/main">
-                <a:solidFill>
-                  <a:srgbClr val="FFFFFF"/>
-                </a:solidFill>
-              </a14:hiddenFill>
-            </a:ext>
-          </a:extLst>
-        </p:spPr>
-      </p:pic>
-      <p:pic>
-        <p:nvPicPr>
-          <p:cNvPr id="1050" name="Picture 26" descr="Database Symbol Vector Clipart image - Free stock photo - Public Domain  photo - CC0 Images">
-            <a:extLst>
-              <a:ext uri="{FF2B5EF4-FFF2-40B4-BE49-F238E27FC236}">
-                <a16:creationId xmlns:a16="http://schemas.microsoft.com/office/drawing/2014/main" id="{F4AF875F-9DFA-C641-8214-6B8B0B7A879D}"/>
-              </a:ext>
-            </a:extLst>
-          </p:cNvPr>
-          <p:cNvPicPr>
-            <a:picLocks noChangeAspect="1" noChangeArrowheads="1"/>
-          </p:cNvPicPr>
-          <p:nvPr/>
-        </p:nvPicPr>
-        <p:blipFill>
-          <a:blip r:embed="rId4">
-            <a:extLst>
-              <a:ext uri="{28A0092B-C50C-407E-A947-70E740481C1C}">
-                <a14:useLocalDpi xmlns:a14="http://schemas.microsoft.com/office/drawing/2010/main" val="0"/>
-              </a:ext>
-            </a:extLst>
-          </a:blip>
-          <a:srcRect/>
-          <a:stretch>
-            <a:fillRect/>
-          </a:stretch>
-        </p:blipFill>
-        <p:spPr bwMode="auto">
-          <a:xfrm>
-            <a:off x="10061659" y="3173955"/>
-            <a:ext cx="1231185" cy="1359243"/>
-          </a:xfrm>
-          <a:prstGeom prst="rect">
-            <a:avLst/>
-          </a:prstGeom>
-          <a:noFill/>
-          <a:extLst>
-            <a:ext uri="{909E8E84-426E-40DD-AFC4-6F175D3DCCD1}">
-              <a14:hiddenFill xmlns:a14="http://schemas.microsoft.com/office/drawing/2010/main">
-                <a:solidFill>
-                  <a:srgbClr val="FFFFFF"/>
-                </a:solidFill>
-              </a14:hiddenFill>
-            </a:ext>
-          </a:extLst>
-        </p:spPr>
-      </p:pic>
-      <p:pic>
-        <p:nvPicPr>
-          <p:cNvPr id="1044" name="Picture 20" descr="Has the time finally come for PostgreSQL? | ZDNet">
-            <a:extLst>
-              <a:ext uri="{FF2B5EF4-FFF2-40B4-BE49-F238E27FC236}">
-                <a16:creationId xmlns:a16="http://schemas.microsoft.com/office/drawing/2014/main" id="{E27CD6B6-02A1-0C40-B53B-629743542405}"/>
-              </a:ext>
-            </a:extLst>
-          </p:cNvPr>
-          <p:cNvPicPr>
-            <a:picLocks noChangeAspect="1" noChangeArrowheads="1"/>
-          </p:cNvPicPr>
-          <p:nvPr/>
-        </p:nvPicPr>
-        <p:blipFill>
-          <a:blip r:embed="rId5">
-            <a:extLst>
-              <a:ext uri="{28A0092B-C50C-407E-A947-70E740481C1C}">
-                <a14:useLocalDpi xmlns:a14="http://schemas.microsoft.com/office/drawing/2010/main" val="0"/>
-              </a:ext>
-            </a:extLst>
-          </a:blip>
-          <a:srcRect/>
-          <a:stretch>
-            <a:fillRect/>
-          </a:stretch>
-        </p:blipFill>
-        <p:spPr bwMode="auto">
-          <a:xfrm>
-            <a:off x="10245617" y="4533197"/>
-            <a:ext cx="1074395" cy="806496"/>
-          </a:xfrm>
-          <a:prstGeom prst="rect">
-            <a:avLst/>
-          </a:prstGeom>
-          <a:noFill/>
-          <a:extLst>
-            <a:ext uri="{909E8E84-426E-40DD-AFC4-6F175D3DCCD1}">
-              <a14:hiddenFill xmlns:a14="http://schemas.microsoft.com/office/drawing/2010/main">
-                <a:solidFill>
-                  <a:srgbClr val="FFFFFF"/>
-                </a:solidFill>
-              </a14:hiddenFill>
-            </a:ext>
-          </a:extLst>
-        </p:spPr>
-      </p:pic>
-      <p:pic>
-        <p:nvPicPr>
-          <p:cNvPr id="1052" name="Picture 28" descr="Free Clipart: Server Remix 1 | Merlin2525">
-            <a:extLst>
-              <a:ext uri="{FF2B5EF4-FFF2-40B4-BE49-F238E27FC236}">
-                <a16:creationId xmlns:a16="http://schemas.microsoft.com/office/drawing/2014/main" id="{A2BAED96-26D2-A74C-8B61-E60F50AE3E63}"/>
-              </a:ext>
-            </a:extLst>
-          </p:cNvPr>
-          <p:cNvPicPr>
-            <a:picLocks noChangeAspect="1" noChangeArrowheads="1"/>
-          </p:cNvPicPr>
-          <p:nvPr/>
-        </p:nvPicPr>
-        <p:blipFill>
-          <a:blip r:embed="rId6">
-            <a:extLst>
-              <a:ext uri="{28A0092B-C50C-407E-A947-70E740481C1C}">
-                <a14:useLocalDpi xmlns:a14="http://schemas.microsoft.com/office/drawing/2010/main" val="0"/>
-              </a:ext>
-            </a:extLst>
-          </a:blip>
-          <a:srcRect/>
-          <a:stretch>
-            <a:fillRect/>
-          </a:stretch>
-        </p:blipFill>
-        <p:spPr bwMode="auto">
-          <a:xfrm>
-            <a:off x="6903350" y="3173955"/>
-            <a:ext cx="1226500" cy="1643449"/>
-          </a:xfrm>
-          <a:prstGeom prst="rect">
-            <a:avLst/>
-          </a:prstGeom>
-          <a:noFill/>
-          <a:extLst>
-            <a:ext uri="{909E8E84-426E-40DD-AFC4-6F175D3DCCD1}">
-              <a14:hiddenFill xmlns:a14="http://schemas.microsoft.com/office/drawing/2010/main">
-                <a:solidFill>
-                  <a:srgbClr val="FFFFFF"/>
-                </a:solidFill>
-              </a14:hiddenFill>
-            </a:ext>
-          </a:extLst>
-        </p:spPr>
-      </p:pic>
-      <p:pic>
-        <p:nvPicPr>
-          <p:cNvPr id="21" name="Picture 28" descr="Free Clipart: Server Remix 1 | Merlin2525">
-            <a:extLst>
-              <a:ext uri="{FF2B5EF4-FFF2-40B4-BE49-F238E27FC236}">
-                <a16:creationId xmlns:a16="http://schemas.microsoft.com/office/drawing/2014/main" id="{2CBEE72F-2135-6244-BCC1-EB476654889E}"/>
-              </a:ext>
-            </a:extLst>
-          </p:cNvPr>
-          <p:cNvPicPr>
-            <a:picLocks noChangeAspect="1" noChangeArrowheads="1"/>
-          </p:cNvPicPr>
-          <p:nvPr/>
-        </p:nvPicPr>
-        <p:blipFill>
-          <a:blip r:embed="rId6">
-            <a:extLst>
-              <a:ext uri="{28A0092B-C50C-407E-A947-70E740481C1C}">
-                <a14:useLocalDpi xmlns:a14="http://schemas.microsoft.com/office/drawing/2010/main" val="0"/>
-              </a:ext>
-            </a:extLst>
-          </a:blip>
-          <a:srcRect/>
-          <a:stretch>
-            <a:fillRect/>
-          </a:stretch>
-        </p:blipFill>
-        <p:spPr bwMode="auto">
-          <a:xfrm>
-            <a:off x="4090733" y="4637343"/>
-            <a:ext cx="1226500" cy="1643449"/>
-          </a:xfrm>
-          <a:prstGeom prst="rect">
-            <a:avLst/>
-          </a:prstGeom>
-          <a:noFill/>
-          <a:extLst>
-            <a:ext uri="{909E8E84-426E-40DD-AFC4-6F175D3DCCD1}">
-              <a14:hiddenFill xmlns:a14="http://schemas.microsoft.com/office/drawing/2010/main">
-                <a:solidFill>
-                  <a:srgbClr val="FFFFFF"/>
-                </a:solidFill>
-              </a14:hiddenFill>
-            </a:ext>
-          </a:extLst>
-        </p:spPr>
-      </p:pic>
-      <p:pic>
-        <p:nvPicPr>
-          <p:cNvPr id="1036" name="Picture 12" descr="Wordmarks, Lettermark, Unitmarks - The CMU Brand - Carnegie Mellon  University">
-            <a:extLst>
-              <a:ext uri="{FF2B5EF4-FFF2-40B4-BE49-F238E27FC236}">
-                <a16:creationId xmlns:a16="http://schemas.microsoft.com/office/drawing/2014/main" id="{26E14EFE-1CBA-7640-8E76-987F457E08C9}"/>
-              </a:ext>
-            </a:extLst>
-          </p:cNvPr>
-          <p:cNvPicPr>
-            <a:picLocks noChangeAspect="1" noChangeArrowheads="1"/>
-          </p:cNvPicPr>
-          <p:nvPr/>
-        </p:nvPicPr>
-        <p:blipFill>
-          <a:blip r:embed="rId7">
-            <a:extLst>
-              <a:ext uri="{28A0092B-C50C-407E-A947-70E740481C1C}">
-                <a14:useLocalDpi xmlns:a14="http://schemas.microsoft.com/office/drawing/2010/main" val="0"/>
-              </a:ext>
-            </a:extLst>
-          </a:blip>
-          <a:srcRect/>
-          <a:stretch>
-            <a:fillRect/>
-          </a:stretch>
-        </p:blipFill>
-        <p:spPr bwMode="auto">
-          <a:xfrm>
-            <a:off x="4602903" y="5459067"/>
-            <a:ext cx="604450" cy="604450"/>
-          </a:xfrm>
-          <a:prstGeom prst="rect">
-            <a:avLst/>
-          </a:prstGeom>
-          <a:noFill/>
-          <a:extLst>
-            <a:ext uri="{909E8E84-426E-40DD-AFC4-6F175D3DCCD1}">
-              <a14:hiddenFill xmlns:a14="http://schemas.microsoft.com/office/drawing/2010/main">
-                <a:solidFill>
-                  <a:srgbClr val="FFFFFF"/>
-                </a:solidFill>
-              </a14:hiddenFill>
-            </a:ext>
-          </a:extLst>
-        </p:spPr>
-      </p:pic>
       <p:cxnSp>
         <p:nvCxnSpPr>
-          <p:cNvPr id="3" name="Straight Arrow Connector 2">
+          <p:cNvPr id="31" name="Straight Arrow Connector 30">
             <a:extLst>
               <a:ext uri="{FF2B5EF4-FFF2-40B4-BE49-F238E27FC236}">
-                <a16:creationId xmlns:a16="http://schemas.microsoft.com/office/drawing/2014/main" id="{5B4F062D-BB63-C142-9D13-52732F736002}"/>
-              </a:ext>
-            </a:extLst>
-          </p:cNvPr>
-          <p:cNvCxnSpPr>
-            <a:cxnSpLocks/>
-          </p:cNvCxnSpPr>
-          <p:nvPr/>
-        </p:nvCxnSpPr>
-        <p:spPr>
-          <a:xfrm flipV="1">
-            <a:off x="2326259" y="2563028"/>
-            <a:ext cx="1544595" cy="939114"/>
-          </a:xfrm>
-          <a:prstGeom prst="straightConnector1">
-            <a:avLst/>
-          </a:prstGeom>
-          <a:ln w="57150">
-            <a:solidFill>
-              <a:srgbClr val="7030A0"/>
-            </a:solidFill>
-            <a:tailEnd type="triangle"/>
-          </a:ln>
-        </p:spPr>
-        <p:style>
-          <a:lnRef idx="1">
-            <a:schemeClr val="accent1"/>
-          </a:lnRef>
-          <a:fillRef idx="0">
-            <a:schemeClr val="accent1"/>
-          </a:fillRef>
-          <a:effectRef idx="0">
-            <a:schemeClr val="accent1"/>
-          </a:effectRef>
-          <a:fontRef idx="minor">
-            <a:schemeClr val="tx1"/>
-          </a:fontRef>
-        </p:style>
-      </p:cxnSp>
-      <p:cxnSp>
-        <p:nvCxnSpPr>
-          <p:cNvPr id="17" name="Straight Arrow Connector 16">
-            <a:extLst>
-              <a:ext uri="{FF2B5EF4-FFF2-40B4-BE49-F238E27FC236}">
-                <a16:creationId xmlns:a16="http://schemas.microsoft.com/office/drawing/2014/main" id="{820AE4C3-3CB9-CC47-8CC2-4F34A58C8325}"/>
-              </a:ext>
-            </a:extLst>
-          </p:cNvPr>
-          <p:cNvCxnSpPr>
-            <a:cxnSpLocks/>
-          </p:cNvCxnSpPr>
-          <p:nvPr/>
-        </p:nvCxnSpPr>
-        <p:spPr>
-          <a:xfrm rot="10800000" flipV="1">
-            <a:off x="2504617" y="2661071"/>
-            <a:ext cx="1544595" cy="939114"/>
-          </a:xfrm>
-          <a:prstGeom prst="straightConnector1">
-            <a:avLst/>
-          </a:prstGeom>
-          <a:ln w="57150">
-            <a:solidFill>
-              <a:srgbClr val="7030A0"/>
-            </a:solidFill>
-            <a:tailEnd type="triangle"/>
-          </a:ln>
-        </p:spPr>
-        <p:style>
-          <a:lnRef idx="1">
-            <a:schemeClr val="accent1"/>
-          </a:lnRef>
-          <a:fillRef idx="0">
-            <a:schemeClr val="accent1"/>
-          </a:fillRef>
-          <a:effectRef idx="0">
-            <a:schemeClr val="accent1"/>
-          </a:effectRef>
-          <a:fontRef idx="minor">
-            <a:schemeClr val="tx1"/>
-          </a:fontRef>
-        </p:style>
-      </p:cxnSp>
-      <p:cxnSp>
-        <p:nvCxnSpPr>
-          <p:cNvPr id="18" name="Straight Arrow Connector 17">
-            <a:extLst>
-              <a:ext uri="{FF2B5EF4-FFF2-40B4-BE49-F238E27FC236}">
-                <a16:creationId xmlns:a16="http://schemas.microsoft.com/office/drawing/2014/main" id="{BBCDB258-D23F-D744-B9A7-D363BE1E2C93}"/>
+                <a16:creationId xmlns:a16="http://schemas.microsoft.com/office/drawing/2014/main" id="{8443E070-8DC3-2C48-BA3B-9C388215580A}"/>
               </a:ext>
             </a:extLst>
           </p:cNvPr>
@@ -13322,7 +12774,7 @@
         </p:nvCxnSpPr>
         <p:spPr>
           <a:xfrm flipH="1" flipV="1">
-            <a:off x="5317234" y="2595757"/>
+            <a:off x="5826472" y="2522920"/>
             <a:ext cx="1449326" cy="767928"/>
           </a:xfrm>
           <a:prstGeom prst="straightConnector1">
@@ -13352,10 +12804,10 @@
       </p:cxnSp>
       <p:cxnSp>
         <p:nvCxnSpPr>
-          <p:cNvPr id="23" name="Straight Arrow Connector 22">
+          <p:cNvPr id="32" name="Straight Arrow Connector 31">
             <a:extLst>
               <a:ext uri="{FF2B5EF4-FFF2-40B4-BE49-F238E27FC236}">
-                <a16:creationId xmlns:a16="http://schemas.microsoft.com/office/drawing/2014/main" id="{DECD6915-6B3A-EA44-A020-B80859C64D84}"/>
+                <a16:creationId xmlns:a16="http://schemas.microsoft.com/office/drawing/2014/main" id="{437F7A5A-A67F-894B-8A9F-42DDC9D12A21}"/>
               </a:ext>
             </a:extLst>
           </p:cNvPr>
@@ -13366,794 +12818,7 @@
         </p:nvCxnSpPr>
         <p:spPr>
           <a:xfrm rot="10800000" flipH="1" flipV="1">
-            <a:off x="5444870" y="2456734"/>
-            <a:ext cx="1449326" cy="767928"/>
-          </a:xfrm>
-          <a:prstGeom prst="straightConnector1">
-            <a:avLst/>
-          </a:prstGeom>
-          <a:ln w="57150">
-            <a:solidFill>
-              <a:srgbClr val="7030A0"/>
-            </a:solidFill>
-            <a:tailEnd type="triangle"/>
-          </a:ln>
-        </p:spPr>
-        <p:style>
-          <a:lnRef idx="1">
-            <a:schemeClr val="accent1"/>
-          </a:lnRef>
-          <a:fillRef idx="0">
-            <a:schemeClr val="accent1"/>
-          </a:fillRef>
-          <a:effectRef idx="0">
-            <a:schemeClr val="accent1"/>
-          </a:effectRef>
-          <a:fontRef idx="minor">
-            <a:schemeClr val="tx1"/>
-          </a:fontRef>
-        </p:style>
-      </p:cxnSp>
-      <p:pic>
-        <p:nvPicPr>
-          <p:cNvPr id="5122" name="Picture 2" descr="12 Most-Wanted Sublime Text Tips and Tricks - Hongkiat">
-            <a:extLst>
-              <a:ext uri="{FF2B5EF4-FFF2-40B4-BE49-F238E27FC236}">
-                <a16:creationId xmlns:a16="http://schemas.microsoft.com/office/drawing/2014/main" id="{9F980224-E727-0B4E-87F3-2EC038235475}"/>
-              </a:ext>
-            </a:extLst>
-          </p:cNvPr>
-          <p:cNvPicPr>
-            <a:picLocks noChangeAspect="1" noChangeArrowheads="1"/>
-          </p:cNvPicPr>
-          <p:nvPr/>
-        </p:nvPicPr>
-        <p:blipFill rotWithShape="1">
-          <a:blip r:embed="rId8">
-            <a:extLst>
-              <a:ext uri="{28A0092B-C50C-407E-A947-70E740481C1C}">
-                <a14:useLocalDpi xmlns:a14="http://schemas.microsoft.com/office/drawing/2010/main" val="0"/>
-              </a:ext>
-            </a:extLst>
-          </a:blip>
-          <a:srcRect r="46413" b="34524"/>
-          <a:stretch/>
-        </p:blipFill>
-        <p:spPr bwMode="auto">
-          <a:xfrm>
-            <a:off x="209508" y="4718645"/>
-            <a:ext cx="1417033" cy="969591"/>
-          </a:xfrm>
-          <a:prstGeom prst="rect">
-            <a:avLst/>
-          </a:prstGeom>
-          <a:noFill/>
-          <a:extLst>
-            <a:ext uri="{909E8E84-426E-40DD-AFC4-6F175D3DCCD1}">
-              <a14:hiddenFill xmlns:a14="http://schemas.microsoft.com/office/drawing/2010/main">
-                <a:solidFill>
-                  <a:srgbClr val="FFFFFF"/>
-                </a:solidFill>
-              </a14:hiddenFill>
-            </a:ext>
-          </a:extLst>
-        </p:spPr>
-      </p:pic>
-      <p:pic>
-        <p:nvPicPr>
-          <p:cNvPr id="5124" name="Picture 4" descr="Git - GUI Clients">
-            <a:extLst>
-              <a:ext uri="{FF2B5EF4-FFF2-40B4-BE49-F238E27FC236}">
-                <a16:creationId xmlns:a16="http://schemas.microsoft.com/office/drawing/2014/main" id="{9D824ED4-D9BD-7943-9FAC-7C6749980A37}"/>
-              </a:ext>
-            </a:extLst>
-          </p:cNvPr>
-          <p:cNvPicPr>
-            <a:picLocks noChangeAspect="1" noChangeArrowheads="1"/>
-          </p:cNvPicPr>
-          <p:nvPr/>
-        </p:nvPicPr>
-        <p:blipFill>
-          <a:blip r:embed="rId9">
-            <a:extLst>
-              <a:ext uri="{28A0092B-C50C-407E-A947-70E740481C1C}">
-                <a14:useLocalDpi xmlns:a14="http://schemas.microsoft.com/office/drawing/2010/main" val="0"/>
-              </a:ext>
-            </a:extLst>
-          </a:blip>
-          <a:srcRect/>
-          <a:stretch>
-            <a:fillRect/>
-          </a:stretch>
-        </p:blipFill>
-        <p:spPr bwMode="auto">
-          <a:xfrm>
-            <a:off x="1786195" y="4749121"/>
-            <a:ext cx="1661511" cy="939115"/>
-          </a:xfrm>
-          <a:prstGeom prst="rect">
-            <a:avLst/>
-          </a:prstGeom>
-          <a:noFill/>
-          <a:extLst>
-            <a:ext uri="{909E8E84-426E-40DD-AFC4-6F175D3DCCD1}">
-              <a14:hiddenFill xmlns:a14="http://schemas.microsoft.com/office/drawing/2010/main">
-                <a:solidFill>
-                  <a:srgbClr val="FFFFFF"/>
-                </a:solidFill>
-              </a14:hiddenFill>
-            </a:ext>
-          </a:extLst>
-        </p:spPr>
-      </p:pic>
-      <p:sp>
-        <p:nvSpPr>
-          <p:cNvPr id="26" name="TextBox 25">
-            <a:extLst>
-              <a:ext uri="{FF2B5EF4-FFF2-40B4-BE49-F238E27FC236}">
-                <a16:creationId xmlns:a16="http://schemas.microsoft.com/office/drawing/2014/main" id="{930FB989-9317-FC40-821E-9D1D4A49C10A}"/>
-              </a:ext>
-            </a:extLst>
-          </p:cNvPr>
-          <p:cNvSpPr txBox="1"/>
-          <p:nvPr/>
-        </p:nvSpPr>
-        <p:spPr>
-          <a:xfrm>
-            <a:off x="356011" y="5741059"/>
-            <a:ext cx="1124026" cy="954107"/>
-          </a:xfrm>
-          <a:prstGeom prst="rect">
-            <a:avLst/>
-          </a:prstGeom>
-          <a:noFill/>
-        </p:spPr>
-        <p:txBody>
-          <a:bodyPr wrap="none" rtlCol="0">
-            <a:spAutoFit/>
-          </a:bodyPr>
-          <a:lstStyle/>
-          <a:p>
-            <a:pPr algn="ctr"/>
-            <a:r>
-              <a:rPr lang="en-US" sz="2800" dirty="0"/>
-              <a:t>Text</a:t>
-            </a:r>
-          </a:p>
-          <a:p>
-            <a:pPr algn="ctr"/>
-            <a:r>
-              <a:rPr lang="en-US" sz="2800" dirty="0"/>
-              <a:t>Editor</a:t>
-            </a:r>
-          </a:p>
-        </p:txBody>
-      </p:sp>
-      <p:sp>
-        <p:nvSpPr>
-          <p:cNvPr id="27" name="TextBox 26">
-            <a:extLst>
-              <a:ext uri="{FF2B5EF4-FFF2-40B4-BE49-F238E27FC236}">
-                <a16:creationId xmlns:a16="http://schemas.microsoft.com/office/drawing/2014/main" id="{43069B13-A341-3C47-9A47-017E45F86D8C}"/>
-              </a:ext>
-            </a:extLst>
-          </p:cNvPr>
-          <p:cNvSpPr txBox="1"/>
-          <p:nvPr/>
-        </p:nvSpPr>
-        <p:spPr>
-          <a:xfrm>
-            <a:off x="2064556" y="5741059"/>
-            <a:ext cx="1104790" cy="954107"/>
-          </a:xfrm>
-          <a:prstGeom prst="rect">
-            <a:avLst/>
-          </a:prstGeom>
-          <a:noFill/>
-        </p:spPr>
-        <p:txBody>
-          <a:bodyPr wrap="none" rtlCol="0">
-            <a:spAutoFit/>
-          </a:bodyPr>
-          <a:lstStyle/>
-          <a:p>
-            <a:pPr algn="ctr"/>
-            <a:r>
-              <a:rPr lang="en-US" sz="2800" dirty="0"/>
-              <a:t>Git</a:t>
-            </a:r>
-          </a:p>
-          <a:p>
-            <a:pPr algn="ctr"/>
-            <a:r>
-              <a:rPr lang="en-US" sz="2800" dirty="0"/>
-              <a:t>Client</a:t>
-            </a:r>
-          </a:p>
-        </p:txBody>
-      </p:sp>
-      <p:sp>
-        <p:nvSpPr>
-          <p:cNvPr id="28" name="TextBox 27">
-            <a:extLst>
-              <a:ext uri="{FF2B5EF4-FFF2-40B4-BE49-F238E27FC236}">
-                <a16:creationId xmlns:a16="http://schemas.microsoft.com/office/drawing/2014/main" id="{009C4AE9-85F7-0045-AAF2-110C0A32C9C1}"/>
-              </a:ext>
-            </a:extLst>
-          </p:cNvPr>
-          <p:cNvSpPr txBox="1"/>
-          <p:nvPr/>
-        </p:nvSpPr>
-        <p:spPr>
-          <a:xfrm>
-            <a:off x="6865621" y="4936445"/>
-            <a:ext cx="1301959" cy="523220"/>
-          </a:xfrm>
-          <a:prstGeom prst="rect">
-            <a:avLst/>
-          </a:prstGeom>
-          <a:noFill/>
-        </p:spPr>
-        <p:txBody>
-          <a:bodyPr wrap="none" rtlCol="0">
-            <a:spAutoFit/>
-          </a:bodyPr>
-          <a:lstStyle/>
-          <a:p>
-            <a:pPr algn="ctr"/>
-            <a:r>
-              <a:rPr lang="en-US" sz="2800" dirty="0"/>
-              <a:t>Git CLI</a:t>
-            </a:r>
-          </a:p>
-        </p:txBody>
-      </p:sp>
-    </p:spTree>
-    <p:extLst>
-      <p:ext uri="{BB962C8B-B14F-4D97-AF65-F5344CB8AC3E}">
-        <p14:creationId xmlns:p14="http://schemas.microsoft.com/office/powerpoint/2010/main" val="53292544"/>
-      </p:ext>
-    </p:extLst>
-  </p:cSld>
-  <p:clrMapOvr>
-    <a:masterClrMapping/>
-  </p:clrMapOvr>
-</p:sld>
-</file>
-
-<file path=ppt/slides/slide12.xml><?xml version="1.0" encoding="utf-8"?>
-<p:sld xmlns:a="http://schemas.openxmlformats.org/drawingml/2006/main" xmlns:r="http://schemas.openxmlformats.org/officeDocument/2006/relationships" xmlns:p="http://schemas.openxmlformats.org/presentationml/2006/main">
-  <p:cSld>
-    <p:spTree>
-      <p:nvGrpSpPr>
-        <p:cNvPr id="1" name=""/>
-        <p:cNvGrpSpPr/>
-        <p:nvPr/>
-      </p:nvGrpSpPr>
-      <p:grpSpPr>
-        <a:xfrm>
-          <a:off x="0" y="0"/>
-          <a:ext cx="0" cy="0"/>
-          <a:chOff x="0" y="0"/>
-          <a:chExt cx="0" cy="0"/>
-        </a:xfrm>
-      </p:grpSpPr>
-      <p:sp>
-        <p:nvSpPr>
-          <p:cNvPr id="5" name="Title 2">
-            <a:extLst>
-              <a:ext uri="{FF2B5EF4-FFF2-40B4-BE49-F238E27FC236}">
-                <a16:creationId xmlns:a16="http://schemas.microsoft.com/office/drawing/2014/main" id="{273CE3F5-6629-DC4B-9BAD-BA93C484AC62}"/>
-              </a:ext>
-            </a:extLst>
-          </p:cNvPr>
-          <p:cNvSpPr>
-            <a:spLocks noGrp="1"/>
-          </p:cNvSpPr>
-          <p:nvPr>
-            <p:ph type="title"/>
-          </p:nvPr>
-        </p:nvSpPr>
-        <p:spPr>
-          <a:xfrm>
-            <a:off x="415600" y="593367"/>
-            <a:ext cx="11360700" cy="763500"/>
-          </a:xfrm>
-        </p:spPr>
-        <p:txBody>
-          <a:bodyPr/>
-          <a:lstStyle/>
-          <a:p>
-            <a:r>
-              <a:rPr lang="en-US" dirty="0"/>
-              <a:t>Class Infrastructure: Editing Code (remote editor)</a:t>
-            </a:r>
-          </a:p>
-        </p:txBody>
-      </p:sp>
-      <p:pic>
-        <p:nvPicPr>
-          <p:cNvPr id="1032" name="Picture 8">
-            <a:extLst>
-              <a:ext uri="{FF2B5EF4-FFF2-40B4-BE49-F238E27FC236}">
-                <a16:creationId xmlns:a16="http://schemas.microsoft.com/office/drawing/2014/main" id="{7FFCC008-BE14-4240-AB63-CD073C9A65D8}"/>
-              </a:ext>
-            </a:extLst>
-          </p:cNvPr>
-          <p:cNvPicPr>
-            <a:picLocks noChangeAspect="1" noChangeArrowheads="1"/>
-          </p:cNvPicPr>
-          <p:nvPr/>
-        </p:nvPicPr>
-        <p:blipFill>
-          <a:blip r:embed="rId2">
-            <a:extLst>
-              <a:ext uri="{28A0092B-C50C-407E-A947-70E740481C1C}">
-                <a14:useLocalDpi xmlns:a14="http://schemas.microsoft.com/office/drawing/2010/main" val="0"/>
-              </a:ext>
-            </a:extLst>
-          </a:blip>
-          <a:srcRect/>
-          <a:stretch>
-            <a:fillRect/>
-          </a:stretch>
-        </p:blipFill>
-        <p:spPr bwMode="auto">
-          <a:xfrm>
-            <a:off x="1218343" y="3444917"/>
-            <a:ext cx="1286274" cy="1192426"/>
-          </a:xfrm>
-          <a:prstGeom prst="rect">
-            <a:avLst/>
-          </a:prstGeom>
-          <a:noFill/>
-          <a:extLst>
-            <a:ext uri="{909E8E84-426E-40DD-AFC4-6F175D3DCCD1}">
-              <a14:hiddenFill xmlns:a14="http://schemas.microsoft.com/office/drawing/2010/main">
-                <a:solidFill>
-                  <a:srgbClr val="FFFFFF"/>
-                </a:solidFill>
-              </a14:hiddenFill>
-            </a:ext>
-          </a:extLst>
-        </p:spPr>
-      </p:pic>
-      <p:pic>
-        <p:nvPicPr>
-          <p:cNvPr id="1038" name="Picture 14" descr="GitHub Logos and Usage · GitHub">
-            <a:extLst>
-              <a:ext uri="{FF2B5EF4-FFF2-40B4-BE49-F238E27FC236}">
-                <a16:creationId xmlns:a16="http://schemas.microsoft.com/office/drawing/2014/main" id="{2DC858A7-A8CB-2A4F-84AC-26978E98F59C}"/>
-              </a:ext>
-            </a:extLst>
-          </p:cNvPr>
-          <p:cNvPicPr>
-            <a:picLocks noChangeAspect="1" noChangeArrowheads="1"/>
-          </p:cNvPicPr>
-          <p:nvPr/>
-        </p:nvPicPr>
-        <p:blipFill>
-          <a:blip r:embed="rId3">
-            <a:extLst>
-              <a:ext uri="{28A0092B-C50C-407E-A947-70E740481C1C}">
-                <a14:useLocalDpi xmlns:a14="http://schemas.microsoft.com/office/drawing/2010/main" val="0"/>
-              </a:ext>
-            </a:extLst>
-          </a:blip>
-          <a:srcRect/>
-          <a:stretch>
-            <a:fillRect/>
-          </a:stretch>
-        </p:blipFill>
-        <p:spPr bwMode="auto">
-          <a:xfrm>
-            <a:off x="4003588" y="1925658"/>
-            <a:ext cx="1533525" cy="1274741"/>
-          </a:xfrm>
-          <a:prstGeom prst="rect">
-            <a:avLst/>
-          </a:prstGeom>
-          <a:noFill/>
-          <a:extLst>
-            <a:ext uri="{909E8E84-426E-40DD-AFC4-6F175D3DCCD1}">
-              <a14:hiddenFill xmlns:a14="http://schemas.microsoft.com/office/drawing/2010/main">
-                <a:solidFill>
-                  <a:srgbClr val="FFFFFF"/>
-                </a:solidFill>
-              </a14:hiddenFill>
-            </a:ext>
-          </a:extLst>
-        </p:spPr>
-      </p:pic>
-      <p:pic>
-        <p:nvPicPr>
-          <p:cNvPr id="1050" name="Picture 26" descr="Database Symbol Vector Clipart image - Free stock photo - Public Domain  photo - CC0 Images">
-            <a:extLst>
-              <a:ext uri="{FF2B5EF4-FFF2-40B4-BE49-F238E27FC236}">
-                <a16:creationId xmlns:a16="http://schemas.microsoft.com/office/drawing/2014/main" id="{F4AF875F-9DFA-C641-8214-6B8B0B7A879D}"/>
-              </a:ext>
-            </a:extLst>
-          </p:cNvPr>
-          <p:cNvPicPr>
-            <a:picLocks noChangeAspect="1" noChangeArrowheads="1"/>
-          </p:cNvPicPr>
-          <p:nvPr/>
-        </p:nvPicPr>
-        <p:blipFill>
-          <a:blip r:embed="rId4">
-            <a:extLst>
-              <a:ext uri="{28A0092B-C50C-407E-A947-70E740481C1C}">
-                <a14:useLocalDpi xmlns:a14="http://schemas.microsoft.com/office/drawing/2010/main" val="0"/>
-              </a:ext>
-            </a:extLst>
-          </a:blip>
-          <a:srcRect/>
-          <a:stretch>
-            <a:fillRect/>
-          </a:stretch>
-        </p:blipFill>
-        <p:spPr bwMode="auto">
-          <a:xfrm>
-            <a:off x="10061659" y="3173955"/>
-            <a:ext cx="1231185" cy="1359243"/>
-          </a:xfrm>
-          <a:prstGeom prst="rect">
-            <a:avLst/>
-          </a:prstGeom>
-          <a:noFill/>
-          <a:extLst>
-            <a:ext uri="{909E8E84-426E-40DD-AFC4-6F175D3DCCD1}">
-              <a14:hiddenFill xmlns:a14="http://schemas.microsoft.com/office/drawing/2010/main">
-                <a:solidFill>
-                  <a:srgbClr val="FFFFFF"/>
-                </a:solidFill>
-              </a14:hiddenFill>
-            </a:ext>
-          </a:extLst>
-        </p:spPr>
-      </p:pic>
-      <p:pic>
-        <p:nvPicPr>
-          <p:cNvPr id="1044" name="Picture 20" descr="Has the time finally come for PostgreSQL? | ZDNet">
-            <a:extLst>
-              <a:ext uri="{FF2B5EF4-FFF2-40B4-BE49-F238E27FC236}">
-                <a16:creationId xmlns:a16="http://schemas.microsoft.com/office/drawing/2014/main" id="{E27CD6B6-02A1-0C40-B53B-629743542405}"/>
-              </a:ext>
-            </a:extLst>
-          </p:cNvPr>
-          <p:cNvPicPr>
-            <a:picLocks noChangeAspect="1" noChangeArrowheads="1"/>
-          </p:cNvPicPr>
-          <p:nvPr/>
-        </p:nvPicPr>
-        <p:blipFill>
-          <a:blip r:embed="rId5">
-            <a:extLst>
-              <a:ext uri="{28A0092B-C50C-407E-A947-70E740481C1C}">
-                <a14:useLocalDpi xmlns:a14="http://schemas.microsoft.com/office/drawing/2010/main" val="0"/>
-              </a:ext>
-            </a:extLst>
-          </a:blip>
-          <a:srcRect/>
-          <a:stretch>
-            <a:fillRect/>
-          </a:stretch>
-        </p:blipFill>
-        <p:spPr bwMode="auto">
-          <a:xfrm>
-            <a:off x="10245617" y="4533197"/>
-            <a:ext cx="1074395" cy="806496"/>
-          </a:xfrm>
-          <a:prstGeom prst="rect">
-            <a:avLst/>
-          </a:prstGeom>
-          <a:noFill/>
-          <a:extLst>
-            <a:ext uri="{909E8E84-426E-40DD-AFC4-6F175D3DCCD1}">
-              <a14:hiddenFill xmlns:a14="http://schemas.microsoft.com/office/drawing/2010/main">
-                <a:solidFill>
-                  <a:srgbClr val="FFFFFF"/>
-                </a:solidFill>
-              </a14:hiddenFill>
-            </a:ext>
-          </a:extLst>
-        </p:spPr>
-      </p:pic>
-      <p:pic>
-        <p:nvPicPr>
-          <p:cNvPr id="1052" name="Picture 28" descr="Free Clipart: Server Remix 1 | Merlin2525">
-            <a:extLst>
-              <a:ext uri="{FF2B5EF4-FFF2-40B4-BE49-F238E27FC236}">
-                <a16:creationId xmlns:a16="http://schemas.microsoft.com/office/drawing/2014/main" id="{A2BAED96-26D2-A74C-8B61-E60F50AE3E63}"/>
-              </a:ext>
-            </a:extLst>
-          </p:cNvPr>
-          <p:cNvPicPr>
-            <a:picLocks noChangeAspect="1" noChangeArrowheads="1"/>
-          </p:cNvPicPr>
-          <p:nvPr/>
-        </p:nvPicPr>
-        <p:blipFill>
-          <a:blip r:embed="rId6">
-            <a:extLst>
-              <a:ext uri="{28A0092B-C50C-407E-A947-70E740481C1C}">
-                <a14:useLocalDpi xmlns:a14="http://schemas.microsoft.com/office/drawing/2010/main" val="0"/>
-              </a:ext>
-            </a:extLst>
-          </a:blip>
-          <a:srcRect/>
-          <a:stretch>
-            <a:fillRect/>
-          </a:stretch>
-        </p:blipFill>
-        <p:spPr bwMode="auto">
-          <a:xfrm>
-            <a:off x="6903350" y="3173955"/>
-            <a:ext cx="1226500" cy="1643449"/>
-          </a:xfrm>
-          <a:prstGeom prst="rect">
-            <a:avLst/>
-          </a:prstGeom>
-          <a:noFill/>
-          <a:extLst>
-            <a:ext uri="{909E8E84-426E-40DD-AFC4-6F175D3DCCD1}">
-              <a14:hiddenFill xmlns:a14="http://schemas.microsoft.com/office/drawing/2010/main">
-                <a:solidFill>
-                  <a:srgbClr val="FFFFFF"/>
-                </a:solidFill>
-              </a14:hiddenFill>
-            </a:ext>
-          </a:extLst>
-        </p:spPr>
-      </p:pic>
-      <p:pic>
-        <p:nvPicPr>
-          <p:cNvPr id="21" name="Picture 28" descr="Free Clipart: Server Remix 1 | Merlin2525">
-            <a:extLst>
-              <a:ext uri="{FF2B5EF4-FFF2-40B4-BE49-F238E27FC236}">
-                <a16:creationId xmlns:a16="http://schemas.microsoft.com/office/drawing/2014/main" id="{2CBEE72F-2135-6244-BCC1-EB476654889E}"/>
-              </a:ext>
-            </a:extLst>
-          </p:cNvPr>
-          <p:cNvPicPr>
-            <a:picLocks noChangeAspect="1" noChangeArrowheads="1"/>
-          </p:cNvPicPr>
-          <p:nvPr/>
-        </p:nvPicPr>
-        <p:blipFill>
-          <a:blip r:embed="rId6">
-            <a:extLst>
-              <a:ext uri="{28A0092B-C50C-407E-A947-70E740481C1C}">
-                <a14:useLocalDpi xmlns:a14="http://schemas.microsoft.com/office/drawing/2010/main" val="0"/>
-              </a:ext>
-            </a:extLst>
-          </a:blip>
-          <a:srcRect/>
-          <a:stretch>
-            <a:fillRect/>
-          </a:stretch>
-        </p:blipFill>
-        <p:spPr bwMode="auto">
-          <a:xfrm>
-            <a:off x="4090733" y="4637343"/>
-            <a:ext cx="1226500" cy="1643449"/>
-          </a:xfrm>
-          <a:prstGeom prst="rect">
-            <a:avLst/>
-          </a:prstGeom>
-          <a:noFill/>
-          <a:extLst>
-            <a:ext uri="{909E8E84-426E-40DD-AFC4-6F175D3DCCD1}">
-              <a14:hiddenFill xmlns:a14="http://schemas.microsoft.com/office/drawing/2010/main">
-                <a:solidFill>
-                  <a:srgbClr val="FFFFFF"/>
-                </a:solidFill>
-              </a14:hiddenFill>
-            </a:ext>
-          </a:extLst>
-        </p:spPr>
-      </p:pic>
-      <p:pic>
-        <p:nvPicPr>
-          <p:cNvPr id="1036" name="Picture 12" descr="Wordmarks, Lettermark, Unitmarks - The CMU Brand - Carnegie Mellon  University">
-            <a:extLst>
-              <a:ext uri="{FF2B5EF4-FFF2-40B4-BE49-F238E27FC236}">
-                <a16:creationId xmlns:a16="http://schemas.microsoft.com/office/drawing/2014/main" id="{26E14EFE-1CBA-7640-8E76-987F457E08C9}"/>
-              </a:ext>
-            </a:extLst>
-          </p:cNvPr>
-          <p:cNvPicPr>
-            <a:picLocks noChangeAspect="1" noChangeArrowheads="1"/>
-          </p:cNvPicPr>
-          <p:nvPr/>
-        </p:nvPicPr>
-        <p:blipFill>
-          <a:blip r:embed="rId7">
-            <a:extLst>
-              <a:ext uri="{28A0092B-C50C-407E-A947-70E740481C1C}">
-                <a14:useLocalDpi xmlns:a14="http://schemas.microsoft.com/office/drawing/2010/main" val="0"/>
-              </a:ext>
-            </a:extLst>
-          </a:blip>
-          <a:srcRect/>
-          <a:stretch>
-            <a:fillRect/>
-          </a:stretch>
-        </p:blipFill>
-        <p:spPr bwMode="auto">
-          <a:xfrm>
-            <a:off x="4602903" y="5459067"/>
-            <a:ext cx="604450" cy="604450"/>
-          </a:xfrm>
-          <a:prstGeom prst="rect">
-            <a:avLst/>
-          </a:prstGeom>
-          <a:noFill/>
-          <a:extLst>
-            <a:ext uri="{909E8E84-426E-40DD-AFC4-6F175D3DCCD1}">
-              <a14:hiddenFill xmlns:a14="http://schemas.microsoft.com/office/drawing/2010/main">
-                <a:solidFill>
-                  <a:srgbClr val="FFFFFF"/>
-                </a:solidFill>
-              </a14:hiddenFill>
-            </a:ext>
-          </a:extLst>
-        </p:spPr>
-      </p:pic>
-      <p:sp>
-        <p:nvSpPr>
-          <p:cNvPr id="7" name="TextBox 6">
-            <a:extLst>
-              <a:ext uri="{FF2B5EF4-FFF2-40B4-BE49-F238E27FC236}">
-                <a16:creationId xmlns:a16="http://schemas.microsoft.com/office/drawing/2014/main" id="{C49A5720-E5C2-FB46-971B-2CBAA606B132}"/>
-              </a:ext>
-            </a:extLst>
-          </p:cNvPr>
-          <p:cNvSpPr txBox="1"/>
-          <p:nvPr/>
-        </p:nvSpPr>
-        <p:spPr>
-          <a:xfrm>
-            <a:off x="4395186" y="6334780"/>
-            <a:ext cx="922047" cy="523220"/>
-          </a:xfrm>
-          <a:prstGeom prst="rect">
-            <a:avLst/>
-          </a:prstGeom>
-          <a:noFill/>
-        </p:spPr>
-        <p:txBody>
-          <a:bodyPr wrap="none" rtlCol="0">
-            <a:spAutoFit/>
-          </a:bodyPr>
-          <a:lstStyle/>
-          <a:p>
-            <a:r>
-              <a:rPr lang="en-US" sz="2800" dirty="0"/>
-              <a:t>VPN</a:t>
-            </a:r>
-          </a:p>
-        </p:txBody>
-      </p:sp>
-      <p:sp>
-        <p:nvSpPr>
-          <p:cNvPr id="12" name="Freeform 11">
-            <a:extLst>
-              <a:ext uri="{FF2B5EF4-FFF2-40B4-BE49-F238E27FC236}">
-                <a16:creationId xmlns:a16="http://schemas.microsoft.com/office/drawing/2014/main" id="{4C00248F-EC52-2648-9408-962B0C55A512}"/>
-              </a:ext>
-            </a:extLst>
-          </p:cNvPr>
-          <p:cNvSpPr/>
-          <p:nvPr/>
-        </p:nvSpPr>
-        <p:spPr>
-          <a:xfrm>
-            <a:off x="2199503" y="3867003"/>
-            <a:ext cx="4633783" cy="1597285"/>
-          </a:xfrm>
-          <a:custGeom>
-            <a:avLst/>
-            <a:gdLst>
-              <a:gd name="connsiteX0" fmla="*/ 0 w 4633783"/>
-              <a:gd name="connsiteY0" fmla="*/ 532002 h 1597285"/>
-              <a:gd name="connsiteX1" fmla="*/ 2656702 w 4633783"/>
-              <a:gd name="connsiteY1" fmla="*/ 1594683 h 1597285"/>
-              <a:gd name="connsiteX2" fmla="*/ 3805881 w 4633783"/>
-              <a:gd name="connsiteY2" fmla="*/ 260154 h 1597285"/>
-              <a:gd name="connsiteX3" fmla="*/ 4633783 w 4633783"/>
-              <a:gd name="connsiteY3" fmla="*/ 662 h 1597285"/>
-            </a:gdLst>
-            <a:ahLst/>
-            <a:cxnLst>
-              <a:cxn ang="0">
-                <a:pos x="connsiteX0" y="connsiteY0"/>
-              </a:cxn>
-              <a:cxn ang="0">
-                <a:pos x="connsiteX1" y="connsiteY1"/>
-              </a:cxn>
-              <a:cxn ang="0">
-                <a:pos x="connsiteX2" y="connsiteY2"/>
-              </a:cxn>
-              <a:cxn ang="0">
-                <a:pos x="connsiteX3" y="connsiteY3"/>
-              </a:cxn>
-            </a:cxnLst>
-            <a:rect l="l" t="t" r="r" b="b"/>
-            <a:pathLst>
-              <a:path w="4633783" h="1597285">
-                <a:moveTo>
-                  <a:pt x="0" y="532002"/>
-                </a:moveTo>
-                <a:cubicBezTo>
-                  <a:pt x="1011194" y="1085996"/>
-                  <a:pt x="2022389" y="1639991"/>
-                  <a:pt x="2656702" y="1594683"/>
-                </a:cubicBezTo>
-                <a:cubicBezTo>
-                  <a:pt x="3291016" y="1549375"/>
-                  <a:pt x="3476368" y="525824"/>
-                  <a:pt x="3805881" y="260154"/>
-                </a:cubicBezTo>
-                <a:cubicBezTo>
-                  <a:pt x="4135394" y="-5516"/>
-                  <a:pt x="4384588" y="-2427"/>
-                  <a:pt x="4633783" y="662"/>
-                </a:cubicBezTo>
-              </a:path>
-            </a:pathLst>
-          </a:custGeom>
-          <a:noFill/>
-          <a:ln w="57150">
-            <a:solidFill>
-              <a:srgbClr val="7030A0"/>
-            </a:solidFill>
-            <a:headEnd type="triangle" w="med" len="med"/>
-            <a:tailEnd type="triangle" w="med" len="med"/>
-          </a:ln>
-        </p:spPr>
-        <p:style>
-          <a:lnRef idx="2">
-            <a:schemeClr val="accent1">
-              <a:shade val="50000"/>
-            </a:schemeClr>
-          </a:lnRef>
-          <a:fillRef idx="1">
-            <a:schemeClr val="accent1"/>
-          </a:fillRef>
-          <a:effectRef idx="0">
-            <a:schemeClr val="accent1"/>
-          </a:effectRef>
-          <a:fontRef idx="minor">
-            <a:schemeClr val="lt1"/>
-          </a:fontRef>
-        </p:style>
-        <p:txBody>
-          <a:bodyPr rtlCol="0" anchor="ctr"/>
-          <a:lstStyle/>
-          <a:p>
-            <a:pPr algn="ctr"/>
-            <a:endParaRPr lang="en-US"/>
-          </a:p>
-        </p:txBody>
-      </p:sp>
-      <p:cxnSp>
-        <p:nvCxnSpPr>
-          <p:cNvPr id="13" name="Straight Arrow Connector 12">
-            <a:extLst>
-              <a:ext uri="{FF2B5EF4-FFF2-40B4-BE49-F238E27FC236}">
-                <a16:creationId xmlns:a16="http://schemas.microsoft.com/office/drawing/2014/main" id="{DDE5D31F-3449-6045-9AA7-7839038C942E}"/>
-              </a:ext>
-            </a:extLst>
-          </p:cNvPr>
-          <p:cNvCxnSpPr>
-            <a:cxnSpLocks/>
-          </p:cNvCxnSpPr>
-          <p:nvPr/>
-        </p:nvCxnSpPr>
-        <p:spPr>
-          <a:xfrm flipH="1" flipV="1">
-            <a:off x="5329771" y="2634708"/>
+            <a:off x="5954108" y="2383897"/>
             <a:ext cx="1449326" cy="767928"/>
           </a:xfrm>
           <a:prstGeom prst="straightConnector1">
@@ -14183,10 +12848,52 @@
       </p:cxnSp>
       <p:cxnSp>
         <p:nvCxnSpPr>
-          <p:cNvPr id="14" name="Straight Arrow Connector 13">
+          <p:cNvPr id="33" name="Straight Arrow Connector 32">
             <a:extLst>
               <a:ext uri="{FF2B5EF4-FFF2-40B4-BE49-F238E27FC236}">
-                <a16:creationId xmlns:a16="http://schemas.microsoft.com/office/drawing/2014/main" id="{657EC94A-4EAA-7248-B766-BD82C2942567}"/>
+                <a16:creationId xmlns:a16="http://schemas.microsoft.com/office/drawing/2014/main" id="{E54EB0F3-BDCC-1F46-86C5-07A6336C092E}"/>
+              </a:ext>
+            </a:extLst>
+          </p:cNvPr>
+          <p:cNvCxnSpPr/>
+          <p:nvPr/>
+        </p:nvCxnSpPr>
+        <p:spPr>
+          <a:xfrm>
+            <a:off x="2801736" y="4167751"/>
+            <a:ext cx="1565869" cy="0"/>
+          </a:xfrm>
+          <a:prstGeom prst="straightConnector1">
+            <a:avLst/>
+          </a:prstGeom>
+          <a:ln w="57150">
+            <a:solidFill>
+              <a:schemeClr val="bg2"/>
+            </a:solidFill>
+            <a:tailEnd type="triangle"/>
+          </a:ln>
+        </p:spPr>
+        <p:style>
+          <a:lnRef idx="1">
+            <a:schemeClr val="accent1"/>
+          </a:lnRef>
+          <a:fillRef idx="0">
+            <a:schemeClr val="accent1"/>
+          </a:fillRef>
+          <a:effectRef idx="0">
+            <a:schemeClr val="accent1"/>
+          </a:effectRef>
+          <a:fontRef idx="minor">
+            <a:schemeClr val="tx1"/>
+          </a:fontRef>
+        </p:style>
+      </p:cxnSp>
+      <p:cxnSp>
+        <p:nvCxnSpPr>
+          <p:cNvPr id="34" name="Straight Arrow Connector 33">
+            <a:extLst>
+              <a:ext uri="{FF2B5EF4-FFF2-40B4-BE49-F238E27FC236}">
+                <a16:creationId xmlns:a16="http://schemas.microsoft.com/office/drawing/2014/main" id="{0554AB3B-B71D-BC44-967A-D29E81624166}"/>
               </a:ext>
             </a:extLst>
           </p:cNvPr>
@@ -14196,16 +12903,16 @@
           <p:nvPr/>
         </p:nvCxnSpPr>
         <p:spPr>
-          <a:xfrm rot="10800000" flipH="1" flipV="1">
-            <a:off x="5444870" y="2456734"/>
-            <a:ext cx="1449326" cy="767928"/>
+          <a:xfrm>
+            <a:off x="5816303" y="4167751"/>
+            <a:ext cx="1678337" cy="0"/>
           </a:xfrm>
           <a:prstGeom prst="straightConnector1">
             <a:avLst/>
           </a:prstGeom>
           <a:ln w="57150">
             <a:solidFill>
-              <a:srgbClr val="7030A0"/>
+              <a:schemeClr val="bg2"/>
             </a:solidFill>
             <a:tailEnd type="triangle"/>
           </a:ln>
@@ -14227,10 +12934,10 @@
       </p:cxnSp>
       <p:sp>
         <p:nvSpPr>
-          <p:cNvPr id="15" name="TextBox 14">
+          <p:cNvPr id="35" name="TextBox 34">
             <a:extLst>
               <a:ext uri="{FF2B5EF4-FFF2-40B4-BE49-F238E27FC236}">
-                <a16:creationId xmlns:a16="http://schemas.microsoft.com/office/drawing/2014/main" id="{C6EEC4FC-D8FB-294B-B62D-D52FC2C9201C}"/>
+                <a16:creationId xmlns:a16="http://schemas.microsoft.com/office/drawing/2014/main" id="{929258C6-D243-C74C-B906-886EBD3D4A28}"/>
               </a:ext>
             </a:extLst>
           </p:cNvPr>
@@ -14239,8 +12946,8 @@
         </p:nvSpPr>
         <p:spPr>
           <a:xfrm>
-            <a:off x="6766560" y="5967606"/>
-            <a:ext cx="1922321" cy="954107"/>
+            <a:off x="7512162" y="2360767"/>
+            <a:ext cx="1301959" cy="523220"/>
           </a:xfrm>
           <a:prstGeom prst="rect">
             <a:avLst/>
@@ -14256,24 +12963,17 @@
             <a:pPr algn="ctr"/>
             <a:r>
               <a:rPr lang="en-US" sz="2800" dirty="0"/>
-              <a:t>Git CLI +</a:t>
-            </a:r>
-          </a:p>
-          <a:p>
-            <a:pPr algn="ctr"/>
-            <a:r>
-              <a:rPr lang="en-US" sz="2800" dirty="0"/>
-              <a:t>Text Editor</a:t>
+              <a:t>Git CLI</a:t>
             </a:r>
           </a:p>
         </p:txBody>
       </p:sp>
       <p:pic>
         <p:nvPicPr>
-          <p:cNvPr id="6146" name="Picture 2" descr="The Emacs Web Wowser: Browsing and Searching the Web with Emacs – Emacs  Notes">
+          <p:cNvPr id="1026" name="Picture 2" descr="GitHub Logos and Usage · GitHub">
             <a:extLst>
               <a:ext uri="{FF2B5EF4-FFF2-40B4-BE49-F238E27FC236}">
-                <a16:creationId xmlns:a16="http://schemas.microsoft.com/office/drawing/2014/main" id="{468262C2-A974-F641-B37F-E2C634181E2E}"/>
+                <a16:creationId xmlns:a16="http://schemas.microsoft.com/office/drawing/2014/main" id="{CF322AE6-CAF4-1C4C-AC58-B06D0386C83A}"/>
               </a:ext>
             </a:extLst>
           </p:cNvPr>
@@ -14282,7 +12982,7 @@
           </p:cNvPicPr>
           <p:nvPr/>
         </p:nvPicPr>
-        <p:blipFill rotWithShape="1">
+        <p:blipFill>
           <a:blip r:embed="rId8">
             <a:extLst>
               <a:ext uri="{28A0092B-C50C-407E-A947-70E740481C1C}">
@@ -14290,13 +12990,15 @@
               </a:ext>
             </a:extLst>
           </a:blip>
-          <a:srcRect r="28810" b="29471"/>
-          <a:stretch/>
+          <a:srcRect/>
+          <a:stretch>
+            <a:fillRect/>
+          </a:stretch>
         </p:blipFill>
         <p:spPr bwMode="auto">
           <a:xfrm>
-            <a:off x="6576871" y="4879007"/>
-            <a:ext cx="1962158" cy="1088599"/>
+            <a:off x="7082196" y="2360767"/>
+            <a:ext cx="527403" cy="527403"/>
           </a:xfrm>
           <a:prstGeom prst="rect">
             <a:avLst/>
@@ -14313,10 +13015,106 @@
           </a:extLst>
         </p:spPr>
       </p:pic>
+      <p:pic>
+        <p:nvPicPr>
+          <p:cNvPr id="3074" name="Picture 2" descr="screenshots.debian.net">
+            <a:extLst>
+              <a:ext uri="{FF2B5EF4-FFF2-40B4-BE49-F238E27FC236}">
+                <a16:creationId xmlns:a16="http://schemas.microsoft.com/office/drawing/2014/main" id="{6ED67267-7F6E-C141-991C-224902416548}"/>
+              </a:ext>
+            </a:extLst>
+          </p:cNvPr>
+          <p:cNvPicPr>
+            <a:picLocks noChangeAspect="1" noChangeArrowheads="1"/>
+          </p:cNvPicPr>
+          <p:nvPr/>
+        </p:nvPicPr>
+        <p:blipFill>
+          <a:blip r:embed="rId9">
+            <a:extLst>
+              <a:ext uri="{28A0092B-C50C-407E-A947-70E740481C1C}">
+                <a14:useLocalDpi xmlns:a14="http://schemas.microsoft.com/office/drawing/2010/main" val="0"/>
+              </a:ext>
+            </a:extLst>
+          </a:blip>
+          <a:srcRect/>
+          <a:stretch>
+            <a:fillRect/>
+          </a:stretch>
+        </p:blipFill>
+        <p:spPr bwMode="auto">
+          <a:xfrm>
+            <a:off x="7639794" y="5483598"/>
+            <a:ext cx="936191" cy="549573"/>
+          </a:xfrm>
+          <a:prstGeom prst="rect">
+            <a:avLst/>
+          </a:prstGeom>
+          <a:noFill/>
+          <a:extLst>
+            <a:ext uri="{909E8E84-426E-40DD-AFC4-6F175D3DCCD1}">
+              <a14:hiddenFill xmlns:a14="http://schemas.microsoft.com/office/drawing/2010/main">
+                <a:solidFill>
+                  <a:srgbClr val="FFFFFF"/>
+                </a:solidFill>
+              </a14:hiddenFill>
+            </a:ext>
+          </a:extLst>
+        </p:spPr>
+      </p:pic>
+      <p:sp>
+        <p:nvSpPr>
+          <p:cNvPr id="38" name="TextBox 37">
+            <a:extLst>
+              <a:ext uri="{FF2B5EF4-FFF2-40B4-BE49-F238E27FC236}">
+                <a16:creationId xmlns:a16="http://schemas.microsoft.com/office/drawing/2014/main" id="{C18BF5E0-D29B-6B40-89A3-D2E8CE95A319}"/>
+              </a:ext>
+            </a:extLst>
+          </p:cNvPr>
+          <p:cNvSpPr txBox="1"/>
+          <p:nvPr/>
+        </p:nvSpPr>
+        <p:spPr>
+          <a:xfrm>
+            <a:off x="7505675" y="5841776"/>
+            <a:ext cx="1176925" cy="338554"/>
+          </a:xfrm>
+          <a:prstGeom prst="rect">
+            <a:avLst/>
+          </a:prstGeom>
+        </p:spPr>
+        <p:style>
+          <a:lnRef idx="1">
+            <a:schemeClr val="accent1"/>
+          </a:lnRef>
+          <a:fillRef idx="2">
+            <a:schemeClr val="accent1"/>
+          </a:fillRef>
+          <a:effectRef idx="1">
+            <a:schemeClr val="accent1"/>
+          </a:effectRef>
+          <a:fontRef idx="minor">
+            <a:schemeClr val="dk1"/>
+          </a:fontRef>
+        </p:style>
+        <p:txBody>
+          <a:bodyPr wrap="none" rtlCol="0">
+            <a:spAutoFit/>
+          </a:bodyPr>
+          <a:lstStyle/>
+          <a:p>
+            <a:pPr algn="ctr"/>
+            <a:r>
+              <a:rPr lang="en-US" sz="1600" dirty="0"/>
+              <a:t>Text Editor</a:t>
+            </a:r>
+          </a:p>
+        </p:txBody>
+      </p:sp>
     </p:spTree>
     <p:extLst>
       <p:ext uri="{BB962C8B-B14F-4D97-AF65-F5344CB8AC3E}">
-        <p14:creationId xmlns:p14="http://schemas.microsoft.com/office/powerpoint/2010/main" val="912507732"/>
+        <p14:creationId xmlns:p14="http://schemas.microsoft.com/office/powerpoint/2010/main" val="3381560024"/>
       </p:ext>
     </p:extLst>
   </p:cSld>
@@ -14326,7 +13124,7 @@
 </p:sld>
 </file>
 
-<file path=ppt/slides/slide13.xml><?xml version="1.0" encoding="utf-8"?>
+<file path=ppt/slides/slide11.xml><?xml version="1.0" encoding="utf-8"?>
 <p:sld xmlns:a="http://schemas.openxmlformats.org/drawingml/2006/main" xmlns:r="http://schemas.openxmlformats.org/officeDocument/2006/relationships" xmlns:p="http://schemas.openxmlformats.org/presentationml/2006/main">
   <p:cSld>
     <p:spTree>
@@ -14496,7 +13294,7 @@
 </p:sld>
 </file>
 
-<file path=ppt/slides/slide14.xml><?xml version="1.0" encoding="utf-8"?>
+<file path=ppt/slides/slide12.xml><?xml version="1.0" encoding="utf-8"?>
 <p:sld xmlns:a="http://schemas.openxmlformats.org/drawingml/2006/main" xmlns:r="http://schemas.openxmlformats.org/officeDocument/2006/relationships" xmlns:p="http://schemas.openxmlformats.org/presentationml/2006/main">
   <p:cSld>
     <p:spTree>
@@ -14631,7 +13429,7 @@
 </p:sld>
 </file>
 
-<file path=ppt/slides/slide15.xml><?xml version="1.0" encoding="utf-8"?>
+<file path=ppt/slides/slide13.xml><?xml version="1.0" encoding="utf-8"?>
 <p:sld xmlns:a="http://schemas.openxmlformats.org/drawingml/2006/main" xmlns:r="http://schemas.openxmlformats.org/officeDocument/2006/relationships" xmlns:p="http://schemas.openxmlformats.org/presentationml/2006/main">
   <p:cSld>
     <p:spTree>
@@ -14752,7 +13550,7 @@
 </p:sld>
 </file>
 
-<file path=ppt/slides/slide16.xml><?xml version="1.0" encoding="utf-8"?>
+<file path=ppt/slides/slide14.xml><?xml version="1.0" encoding="utf-8"?>
 <p:sld xmlns:a="http://schemas.openxmlformats.org/drawingml/2006/main" xmlns:r="http://schemas.openxmlformats.org/officeDocument/2006/relationships" xmlns:p="http://schemas.openxmlformats.org/presentationml/2006/main">
   <p:cSld>
     <p:spTree>
@@ -14910,7 +13708,7 @@
 </p:sld>
 </file>
 
-<file path=ppt/slides/slide17.xml><?xml version="1.0" encoding="utf-8"?>
+<file path=ppt/slides/slide15.xml><?xml version="1.0" encoding="utf-8"?>
 <p:sld xmlns:a="http://schemas.openxmlformats.org/drawingml/2006/main" xmlns:r="http://schemas.openxmlformats.org/officeDocument/2006/relationships" xmlns:p="http://schemas.openxmlformats.org/presentationml/2006/main">
   <p:cSld>
     <p:spTree>
@@ -15047,7 +13845,7 @@
 </p:sld>
 </file>
 
-<file path=ppt/slides/slide18.xml><?xml version="1.0" encoding="utf-8"?>
+<file path=ppt/slides/slide16.xml><?xml version="1.0" encoding="utf-8"?>
 <p:sld xmlns:a="http://schemas.openxmlformats.org/drawingml/2006/main" xmlns:r="http://schemas.openxmlformats.org/officeDocument/2006/relationships" xmlns:p="http://schemas.openxmlformats.org/presentationml/2006/main">
   <p:cSld>
     <p:spTree>
@@ -15161,7 +13959,7 @@
 </p:sld>
 </file>
 
-<file path=ppt/slides/slide19.xml><?xml version="1.0" encoding="utf-8"?>
+<file path=ppt/slides/slide17.xml><?xml version="1.0" encoding="utf-8"?>
 <p:sld xmlns:a="http://schemas.openxmlformats.org/drawingml/2006/main" xmlns:r="http://schemas.openxmlformats.org/officeDocument/2006/relationships" xmlns:p="http://schemas.openxmlformats.org/presentationml/2006/main">
   <p:cSld>
     <p:spTree>
@@ -15252,6 +14050,224 @@
     <p:extLst>
       <p:ext uri="{BB962C8B-B14F-4D97-AF65-F5344CB8AC3E}">
         <p14:creationId xmlns:p14="http://schemas.microsoft.com/office/powerpoint/2010/main" val="1608946016"/>
+      </p:ext>
+    </p:extLst>
+  </p:cSld>
+  <p:clrMapOvr>
+    <a:masterClrMapping/>
+  </p:clrMapOvr>
+</p:sld>
+</file>
+
+<file path=ppt/slides/slide18.xml><?xml version="1.0" encoding="utf-8"?>
+<p:sld xmlns:a="http://schemas.openxmlformats.org/drawingml/2006/main" xmlns:r="http://schemas.openxmlformats.org/officeDocument/2006/relationships" xmlns:p="http://schemas.openxmlformats.org/presentationml/2006/main">
+  <p:cSld>
+    <p:spTree>
+      <p:nvGrpSpPr>
+        <p:cNvPr id="1" name=""/>
+        <p:cNvGrpSpPr/>
+        <p:nvPr/>
+      </p:nvGrpSpPr>
+      <p:grpSpPr>
+        <a:xfrm>
+          <a:off x="0" y="0"/>
+          <a:ext cx="0" cy="0"/>
+          <a:chOff x="0" y="0"/>
+          <a:chExt cx="0" cy="0"/>
+        </a:xfrm>
+      </p:grpSpPr>
+      <p:sp>
+        <p:nvSpPr>
+          <p:cNvPr id="2" name="Title 1">
+            <a:extLst>
+              <a:ext uri="{FF2B5EF4-FFF2-40B4-BE49-F238E27FC236}">
+                <a16:creationId xmlns:a16="http://schemas.microsoft.com/office/drawing/2014/main" id="{5F81CBFF-347D-1E4D-A650-DB0EBD243F63}"/>
+              </a:ext>
+            </a:extLst>
+          </p:cNvPr>
+          <p:cNvSpPr>
+            <a:spLocks noGrp="1"/>
+          </p:cNvSpPr>
+          <p:nvPr>
+            <p:ph type="title"/>
+          </p:nvPr>
+        </p:nvSpPr>
+        <p:spPr/>
+        <p:txBody>
+          <a:bodyPr/>
+          <a:lstStyle/>
+          <a:p>
+            <a:r>
+              <a:rPr lang="en-US" dirty="0"/>
+              <a:t>Any questions from the video lecture?</a:t>
+            </a:r>
+          </a:p>
+        </p:txBody>
+      </p:sp>
+      <p:sp>
+        <p:nvSpPr>
+          <p:cNvPr id="3" name="Text Placeholder 2">
+            <a:extLst>
+              <a:ext uri="{FF2B5EF4-FFF2-40B4-BE49-F238E27FC236}">
+                <a16:creationId xmlns:a16="http://schemas.microsoft.com/office/drawing/2014/main" id="{0DD9360F-2F35-FE48-93CE-D9139F46E4C7}"/>
+              </a:ext>
+            </a:extLst>
+          </p:cNvPr>
+          <p:cNvSpPr>
+            <a:spLocks noGrp="1"/>
+          </p:cNvSpPr>
+          <p:nvPr>
+            <p:ph type="body" idx="1"/>
+          </p:nvPr>
+        </p:nvSpPr>
+        <p:spPr/>
+        <p:txBody>
+          <a:bodyPr/>
+          <a:lstStyle/>
+          <a:p>
+            <a:endParaRPr lang="en-US"/>
+          </a:p>
+        </p:txBody>
+      </p:sp>
+    </p:spTree>
+    <p:extLst>
+      <p:ext uri="{BB962C8B-B14F-4D97-AF65-F5344CB8AC3E}">
+        <p14:creationId xmlns:p14="http://schemas.microsoft.com/office/powerpoint/2010/main" val="2286089348"/>
+      </p:ext>
+    </p:extLst>
+  </p:cSld>
+  <p:clrMapOvr>
+    <a:masterClrMapping/>
+  </p:clrMapOvr>
+</p:sld>
+</file>
+
+<file path=ppt/slides/slide19.xml><?xml version="1.0" encoding="utf-8"?>
+<p:sld xmlns:a="http://schemas.openxmlformats.org/drawingml/2006/main" xmlns:r="http://schemas.openxmlformats.org/officeDocument/2006/relationships" xmlns:p="http://schemas.openxmlformats.org/presentationml/2006/main">
+  <p:cSld>
+    <p:spTree>
+      <p:nvGrpSpPr>
+        <p:cNvPr id="1" name=""/>
+        <p:cNvGrpSpPr/>
+        <p:nvPr/>
+      </p:nvGrpSpPr>
+      <p:grpSpPr>
+        <a:xfrm>
+          <a:off x="0" y="0"/>
+          <a:ext cx="0" cy="0"/>
+          <a:chOff x="0" y="0"/>
+          <a:chExt cx="0" cy="0"/>
+        </a:xfrm>
+      </p:grpSpPr>
+      <p:sp>
+        <p:nvSpPr>
+          <p:cNvPr id="4" name="Text Placeholder 3">
+            <a:extLst>
+              <a:ext uri="{FF2B5EF4-FFF2-40B4-BE49-F238E27FC236}">
+                <a16:creationId xmlns:a16="http://schemas.microsoft.com/office/drawing/2014/main" id="{5E600BA7-FA45-884F-9820-9E5F2CB7AA48}"/>
+              </a:ext>
+            </a:extLst>
+          </p:cNvPr>
+          <p:cNvSpPr>
+            <a:spLocks noGrp="1"/>
+          </p:cNvSpPr>
+          <p:nvPr>
+            <p:ph type="body" idx="1"/>
+          </p:nvPr>
+        </p:nvSpPr>
+        <p:spPr>
+          <a:xfrm>
+            <a:off x="415650" y="2131539"/>
+            <a:ext cx="11360700" cy="3539969"/>
+          </a:xfrm>
+        </p:spPr>
+        <p:txBody>
+          <a:bodyPr/>
+          <a:lstStyle/>
+          <a:p>
+            <a:pPr marL="76200" indent="0" algn="ctr">
+              <a:buNone/>
+            </a:pPr>
+            <a:r>
+              <a:rPr lang="en-US" sz="4800" dirty="0"/>
+              <a:t>What are some experiences </a:t>
+            </a:r>
+          </a:p>
+          <a:p>
+            <a:pPr marL="76200" indent="0" algn="ctr">
+              <a:buNone/>
+            </a:pPr>
+            <a:r>
+              <a:rPr lang="en-US" sz="4800" dirty="0"/>
+              <a:t>and challenges you’ve </a:t>
+            </a:r>
+          </a:p>
+          <a:p>
+            <a:pPr marL="76200" indent="0" algn="ctr">
+              <a:buNone/>
+            </a:pPr>
+            <a:r>
+              <a:rPr lang="en-US" sz="4800" dirty="0"/>
+              <a:t>encountered with acquiring data </a:t>
+            </a:r>
+          </a:p>
+          <a:p>
+            <a:pPr marL="76200" indent="0" algn="ctr">
+              <a:buNone/>
+            </a:pPr>
+            <a:r>
+              <a:rPr lang="en-US" sz="4800" dirty="0"/>
+              <a:t>(for research, consulting, </a:t>
+            </a:r>
+            <a:r>
+              <a:rPr lang="en-US" sz="4800" dirty="0" err="1"/>
+              <a:t>etc</a:t>
+            </a:r>
+            <a:r>
+              <a:rPr lang="en-US" sz="4800" dirty="0"/>
+              <a:t>)?</a:t>
+            </a:r>
+          </a:p>
+        </p:txBody>
+      </p:sp>
+      <p:sp>
+        <p:nvSpPr>
+          <p:cNvPr id="3" name="Title 1">
+            <a:extLst>
+              <a:ext uri="{FF2B5EF4-FFF2-40B4-BE49-F238E27FC236}">
+                <a16:creationId xmlns:a16="http://schemas.microsoft.com/office/drawing/2014/main" id="{9CDFC252-FA93-E641-BB21-4E80983D7592}"/>
+              </a:ext>
+            </a:extLst>
+          </p:cNvPr>
+          <p:cNvSpPr>
+            <a:spLocks noGrp="1"/>
+          </p:cNvSpPr>
+          <p:nvPr>
+            <p:ph type="title"/>
+          </p:nvPr>
+        </p:nvSpPr>
+        <p:spPr>
+          <a:xfrm>
+            <a:off x="415600" y="593367"/>
+            <a:ext cx="11360700" cy="763500"/>
+          </a:xfrm>
+        </p:spPr>
+        <p:txBody>
+          <a:bodyPr/>
+          <a:lstStyle/>
+          <a:p>
+            <a:pPr algn="ctr"/>
+            <a:r>
+              <a:rPr lang="en-US" dirty="0"/>
+              <a:t>DISCUSSION QUESTION</a:t>
+            </a:r>
+          </a:p>
+        </p:txBody>
+      </p:sp>
+    </p:spTree>
+    <p:extLst>
+      <p:ext uri="{BB962C8B-B14F-4D97-AF65-F5344CB8AC3E}">
+        <p14:creationId xmlns:p14="http://schemas.microsoft.com/office/powerpoint/2010/main" val="1461123831"/>
       </p:ext>
     </p:extLst>
   </p:cSld>
@@ -15346,224 +14362,6 @@
       </p:grpSpPr>
       <p:sp>
         <p:nvSpPr>
-          <p:cNvPr id="2" name="Title 1">
-            <a:extLst>
-              <a:ext uri="{FF2B5EF4-FFF2-40B4-BE49-F238E27FC236}">
-                <a16:creationId xmlns:a16="http://schemas.microsoft.com/office/drawing/2014/main" id="{5F81CBFF-347D-1E4D-A650-DB0EBD243F63}"/>
-              </a:ext>
-            </a:extLst>
-          </p:cNvPr>
-          <p:cNvSpPr>
-            <a:spLocks noGrp="1"/>
-          </p:cNvSpPr>
-          <p:nvPr>
-            <p:ph type="title"/>
-          </p:nvPr>
-        </p:nvSpPr>
-        <p:spPr/>
-        <p:txBody>
-          <a:bodyPr/>
-          <a:lstStyle/>
-          <a:p>
-            <a:r>
-              <a:rPr lang="en-US" dirty="0"/>
-              <a:t>Any questions from the video lecture?</a:t>
-            </a:r>
-          </a:p>
-        </p:txBody>
-      </p:sp>
-      <p:sp>
-        <p:nvSpPr>
-          <p:cNvPr id="3" name="Text Placeholder 2">
-            <a:extLst>
-              <a:ext uri="{FF2B5EF4-FFF2-40B4-BE49-F238E27FC236}">
-                <a16:creationId xmlns:a16="http://schemas.microsoft.com/office/drawing/2014/main" id="{0DD9360F-2F35-FE48-93CE-D9139F46E4C7}"/>
-              </a:ext>
-            </a:extLst>
-          </p:cNvPr>
-          <p:cNvSpPr>
-            <a:spLocks noGrp="1"/>
-          </p:cNvSpPr>
-          <p:nvPr>
-            <p:ph type="body" idx="1"/>
-          </p:nvPr>
-        </p:nvSpPr>
-        <p:spPr/>
-        <p:txBody>
-          <a:bodyPr/>
-          <a:lstStyle/>
-          <a:p>
-            <a:endParaRPr lang="en-US"/>
-          </a:p>
-        </p:txBody>
-      </p:sp>
-    </p:spTree>
-    <p:extLst>
-      <p:ext uri="{BB962C8B-B14F-4D97-AF65-F5344CB8AC3E}">
-        <p14:creationId xmlns:p14="http://schemas.microsoft.com/office/powerpoint/2010/main" val="2286089348"/>
-      </p:ext>
-    </p:extLst>
-  </p:cSld>
-  <p:clrMapOvr>
-    <a:masterClrMapping/>
-  </p:clrMapOvr>
-</p:sld>
-</file>
-
-<file path=ppt/slides/slide21.xml><?xml version="1.0" encoding="utf-8"?>
-<p:sld xmlns:a="http://schemas.openxmlformats.org/drawingml/2006/main" xmlns:r="http://schemas.openxmlformats.org/officeDocument/2006/relationships" xmlns:p="http://schemas.openxmlformats.org/presentationml/2006/main">
-  <p:cSld>
-    <p:spTree>
-      <p:nvGrpSpPr>
-        <p:cNvPr id="1" name=""/>
-        <p:cNvGrpSpPr/>
-        <p:nvPr/>
-      </p:nvGrpSpPr>
-      <p:grpSpPr>
-        <a:xfrm>
-          <a:off x="0" y="0"/>
-          <a:ext cx="0" cy="0"/>
-          <a:chOff x="0" y="0"/>
-          <a:chExt cx="0" cy="0"/>
-        </a:xfrm>
-      </p:grpSpPr>
-      <p:sp>
-        <p:nvSpPr>
-          <p:cNvPr id="4" name="Text Placeholder 3">
-            <a:extLst>
-              <a:ext uri="{FF2B5EF4-FFF2-40B4-BE49-F238E27FC236}">
-                <a16:creationId xmlns:a16="http://schemas.microsoft.com/office/drawing/2014/main" id="{5E600BA7-FA45-884F-9820-9E5F2CB7AA48}"/>
-              </a:ext>
-            </a:extLst>
-          </p:cNvPr>
-          <p:cNvSpPr>
-            <a:spLocks noGrp="1"/>
-          </p:cNvSpPr>
-          <p:nvPr>
-            <p:ph type="body" idx="1"/>
-          </p:nvPr>
-        </p:nvSpPr>
-        <p:spPr>
-          <a:xfrm>
-            <a:off x="415650" y="2131539"/>
-            <a:ext cx="11360700" cy="3539969"/>
-          </a:xfrm>
-        </p:spPr>
-        <p:txBody>
-          <a:bodyPr/>
-          <a:lstStyle/>
-          <a:p>
-            <a:pPr marL="76200" indent="0" algn="ctr">
-              <a:buNone/>
-            </a:pPr>
-            <a:r>
-              <a:rPr lang="en-US" sz="4800" dirty="0"/>
-              <a:t>What are some experiences </a:t>
-            </a:r>
-          </a:p>
-          <a:p>
-            <a:pPr marL="76200" indent="0" algn="ctr">
-              <a:buNone/>
-            </a:pPr>
-            <a:r>
-              <a:rPr lang="en-US" sz="4800" dirty="0"/>
-              <a:t>and challenges you’ve </a:t>
-            </a:r>
-          </a:p>
-          <a:p>
-            <a:pPr marL="76200" indent="0" algn="ctr">
-              <a:buNone/>
-            </a:pPr>
-            <a:r>
-              <a:rPr lang="en-US" sz="4800" dirty="0"/>
-              <a:t>encountered with acquiring data </a:t>
-            </a:r>
-          </a:p>
-          <a:p>
-            <a:pPr marL="76200" indent="0" algn="ctr">
-              <a:buNone/>
-            </a:pPr>
-            <a:r>
-              <a:rPr lang="en-US" sz="4800" dirty="0"/>
-              <a:t>(for research, consulting, </a:t>
-            </a:r>
-            <a:r>
-              <a:rPr lang="en-US" sz="4800" dirty="0" err="1"/>
-              <a:t>etc</a:t>
-            </a:r>
-            <a:r>
-              <a:rPr lang="en-US" sz="4800" dirty="0"/>
-              <a:t>)?</a:t>
-            </a:r>
-          </a:p>
-        </p:txBody>
-      </p:sp>
-      <p:sp>
-        <p:nvSpPr>
-          <p:cNvPr id="3" name="Title 1">
-            <a:extLst>
-              <a:ext uri="{FF2B5EF4-FFF2-40B4-BE49-F238E27FC236}">
-                <a16:creationId xmlns:a16="http://schemas.microsoft.com/office/drawing/2014/main" id="{9CDFC252-FA93-E641-BB21-4E80983D7592}"/>
-              </a:ext>
-            </a:extLst>
-          </p:cNvPr>
-          <p:cNvSpPr>
-            <a:spLocks noGrp="1"/>
-          </p:cNvSpPr>
-          <p:nvPr>
-            <p:ph type="title"/>
-          </p:nvPr>
-        </p:nvSpPr>
-        <p:spPr>
-          <a:xfrm>
-            <a:off x="415600" y="593367"/>
-            <a:ext cx="11360700" cy="763500"/>
-          </a:xfrm>
-        </p:spPr>
-        <p:txBody>
-          <a:bodyPr/>
-          <a:lstStyle/>
-          <a:p>
-            <a:pPr algn="ctr"/>
-            <a:r>
-              <a:rPr lang="en-US" dirty="0"/>
-              <a:t>DISCUSSION QUESTION</a:t>
-            </a:r>
-          </a:p>
-        </p:txBody>
-      </p:sp>
-    </p:spTree>
-    <p:extLst>
-      <p:ext uri="{BB962C8B-B14F-4D97-AF65-F5344CB8AC3E}">
-        <p14:creationId xmlns:p14="http://schemas.microsoft.com/office/powerpoint/2010/main" val="1461123831"/>
-      </p:ext>
-    </p:extLst>
-  </p:cSld>
-  <p:clrMapOvr>
-    <a:masterClrMapping/>
-  </p:clrMapOvr>
-</p:sld>
-</file>
-
-<file path=ppt/slides/slide22.xml><?xml version="1.0" encoding="utf-8"?>
-<p:sld xmlns:a="http://schemas.openxmlformats.org/drawingml/2006/main" xmlns:r="http://schemas.openxmlformats.org/officeDocument/2006/relationships" xmlns:p="http://schemas.openxmlformats.org/presentationml/2006/main">
-  <p:cSld>
-    <p:spTree>
-      <p:nvGrpSpPr>
-        <p:cNvPr id="1" name=""/>
-        <p:cNvGrpSpPr/>
-        <p:nvPr/>
-      </p:nvGrpSpPr>
-      <p:grpSpPr>
-        <a:xfrm>
-          <a:off x="0" y="0"/>
-          <a:ext cx="0" cy="0"/>
-          <a:chOff x="0" y="0"/>
-          <a:chExt cx="0" cy="0"/>
-        </a:xfrm>
-      </p:grpSpPr>
-      <p:sp>
-        <p:nvSpPr>
           <p:cNvPr id="4" name="Text Placeholder 3">
             <a:extLst>
               <a:ext uri="{FF2B5EF4-FFF2-40B4-BE49-F238E27FC236}">
@@ -15645,7 +14443,7 @@
 </p:sld>
 </file>
 
-<file path=ppt/slides/slide23.xml><?xml version="1.0" encoding="utf-8"?>
+<file path=ppt/slides/slide21.xml><?xml version="1.0" encoding="utf-8"?>
 <p:sld xmlns:a="http://schemas.openxmlformats.org/drawingml/2006/main" xmlns:r="http://schemas.openxmlformats.org/officeDocument/2006/relationships" xmlns:p="http://schemas.openxmlformats.org/presentationml/2006/main">
   <p:cSld>
     <p:spTree>
@@ -20214,7 +19012,7 @@
 </file>
 
 <file path=ppt/slides/slide9.xml><?xml version="1.0" encoding="utf-8"?>
-<p:sld xmlns:a="http://schemas.openxmlformats.org/drawingml/2006/main" xmlns:r="http://schemas.openxmlformats.org/officeDocument/2006/relationships" xmlns:p="http://schemas.openxmlformats.org/presentationml/2006/main" show="0">
+<p:sld xmlns:a="http://schemas.openxmlformats.org/drawingml/2006/main" xmlns:r="http://schemas.openxmlformats.org/officeDocument/2006/relationships" xmlns:p="http://schemas.openxmlformats.org/presentationml/2006/main">
   <p:cSld>
     <p:spTree>
       <p:nvGrpSpPr>
@@ -20248,7 +19046,7 @@
         </p:nvSpPr>
         <p:spPr>
           <a:xfrm>
-            <a:off x="415600" y="593367"/>
+            <a:off x="415650" y="29156"/>
             <a:ext cx="11360700" cy="763500"/>
           </a:xfrm>
         </p:spPr>
@@ -20258,13 +19056,23 @@
           <a:p>
             <a:r>
               <a:rPr lang="en-US" dirty="0"/>
-              <a:t>Class Infrastructure: Using </a:t>
+              <a:t>Class Infrastructure Elements:</a:t>
+            </a:r>
+            <a:br>
+              <a:rPr lang="en-US" dirty="0"/>
+            </a:br>
+            <a:r>
+              <a:rPr lang="en-US" dirty="0"/>
+              <a:t>When edit code with a </a:t>
             </a:r>
             <a:r>
-              <a:rPr lang="en-US" dirty="0" err="1"/>
-              <a:t>Jupyter</a:t>
+              <a:rPr lang="en-US" i="1" dirty="0"/>
+              <a:t>local</a:t>
             </a:r>
-            <a:endParaRPr lang="en-US" dirty="0"/>
+            <a:r>
+              <a:rPr lang="en-US" dirty="0"/>
+              <a:t> text editor</a:t>
+            </a:r>
           </a:p>
         </p:txBody>
       </p:sp>
@@ -20297,7 +19105,7 @@
         </p:blipFill>
         <p:spPr bwMode="auto">
           <a:xfrm>
-            <a:off x="1218343" y="3444917"/>
+            <a:off x="1169003" y="3386457"/>
             <a:ext cx="1286274" cy="1192426"/>
           </a:xfrm>
           <a:prstGeom prst="rect">
@@ -20344,8 +19152,8 @@
         </p:blipFill>
         <p:spPr bwMode="auto">
           <a:xfrm>
-            <a:off x="4003588" y="1925658"/>
-            <a:ext cx="1533525" cy="1274741"/>
+            <a:off x="4538372" y="1921397"/>
+            <a:ext cx="1288100" cy="1070732"/>
           </a:xfrm>
           <a:prstGeom prst="rect">
             <a:avLst/>
@@ -20391,7 +19199,7 @@
         </p:blipFill>
         <p:spPr bwMode="auto">
           <a:xfrm>
-            <a:off x="10061659" y="3173955"/>
+            <a:off x="10181069" y="3303049"/>
             <a:ext cx="1231185" cy="1359243"/>
           </a:xfrm>
           <a:prstGeom prst="rect">
@@ -20438,7 +19246,7 @@
         </p:blipFill>
         <p:spPr bwMode="auto">
           <a:xfrm>
-            <a:off x="10245617" y="4533197"/>
+            <a:off x="10259463" y="2435330"/>
             <a:ext cx="1074395" cy="806496"/>
           </a:xfrm>
           <a:prstGeom prst="rect">
@@ -20485,7 +19293,7 @@
         </p:blipFill>
         <p:spPr bwMode="auto">
           <a:xfrm>
-            <a:off x="6903350" y="3173955"/>
+            <a:off x="7494640" y="3031386"/>
             <a:ext cx="1226500" cy="1643449"/>
           </a:xfrm>
           <a:prstGeom prst="rect">
@@ -20532,8 +19340,8 @@
         </p:blipFill>
         <p:spPr bwMode="auto">
           <a:xfrm>
-            <a:off x="4090733" y="4637343"/>
-            <a:ext cx="1226500" cy="1643449"/>
+            <a:off x="4639863" y="3471662"/>
+            <a:ext cx="951335" cy="1274741"/>
           </a:xfrm>
           <a:prstGeom prst="rect">
             <a:avLst/>
@@ -20579,8 +19387,8 @@
         </p:blipFill>
         <p:spPr bwMode="auto">
           <a:xfrm>
-            <a:off x="4602903" y="5459067"/>
-            <a:ext cx="604450" cy="604450"/>
+            <a:off x="4760503" y="3715202"/>
+            <a:ext cx="654337" cy="654337"/>
           </a:xfrm>
           <a:prstGeom prst="rect">
             <a:avLst/>
@@ -20611,7 +19419,7 @@
         </p:nvSpPr>
         <p:spPr>
           <a:xfrm>
-            <a:off x="4395186" y="6334780"/>
+            <a:off x="4609021" y="4728333"/>
             <a:ext cx="922047" cy="523220"/>
           </a:xfrm>
           <a:prstGeom prst="rect">
@@ -20634,10 +19442,166 @@
       </p:sp>
       <p:sp>
         <p:nvSpPr>
-          <p:cNvPr id="2" name="Freeform 1">
+          <p:cNvPr id="23" name="TextBox 22">
             <a:extLst>
               <a:ext uri="{FF2B5EF4-FFF2-40B4-BE49-F238E27FC236}">
-                <a16:creationId xmlns:a16="http://schemas.microsoft.com/office/drawing/2014/main" id="{B2085488-A8CD-6B48-9F08-F4D4CDDF8C85}"/>
+                <a16:creationId xmlns:a16="http://schemas.microsoft.com/office/drawing/2014/main" id="{90A19FE5-D1B7-8444-BA03-9B00197E8768}"/>
+              </a:ext>
+            </a:extLst>
+          </p:cNvPr>
+          <p:cNvSpPr txBox="1"/>
+          <p:nvPr/>
+        </p:nvSpPr>
+        <p:spPr>
+          <a:xfrm>
+            <a:off x="656597" y="4553615"/>
+            <a:ext cx="2145139" cy="523220"/>
+          </a:xfrm>
+          <a:prstGeom prst="rect">
+            <a:avLst/>
+          </a:prstGeom>
+          <a:noFill/>
+        </p:spPr>
+        <p:txBody>
+          <a:bodyPr wrap="none" rtlCol="0">
+            <a:spAutoFit/>
+          </a:bodyPr>
+          <a:lstStyle/>
+          <a:p>
+            <a:r>
+              <a:rPr lang="en-US" sz="2800" dirty="0"/>
+              <a:t>Your Laptop</a:t>
+            </a:r>
+          </a:p>
+        </p:txBody>
+      </p:sp>
+      <p:sp>
+        <p:nvSpPr>
+          <p:cNvPr id="24" name="TextBox 23">
+            <a:extLst>
+              <a:ext uri="{FF2B5EF4-FFF2-40B4-BE49-F238E27FC236}">
+                <a16:creationId xmlns:a16="http://schemas.microsoft.com/office/drawing/2014/main" id="{385C9E24-B1FC-5F4B-8AD9-0FAF4BC393C9}"/>
+              </a:ext>
+            </a:extLst>
+          </p:cNvPr>
+          <p:cNvSpPr txBox="1"/>
+          <p:nvPr/>
+        </p:nvSpPr>
+        <p:spPr>
+          <a:xfrm>
+            <a:off x="3991483" y="1465411"/>
+            <a:ext cx="2462534" cy="523220"/>
+          </a:xfrm>
+          <a:prstGeom prst="rect">
+            <a:avLst/>
+          </a:prstGeom>
+          <a:noFill/>
+        </p:spPr>
+        <p:txBody>
+          <a:bodyPr wrap="none" rtlCol="0">
+            <a:spAutoFit/>
+          </a:bodyPr>
+          <a:lstStyle/>
+          <a:p>
+            <a:r>
+              <a:rPr lang="en-US" sz="2800" dirty="0"/>
+              <a:t>GitHub Server</a:t>
+            </a:r>
+          </a:p>
+        </p:txBody>
+      </p:sp>
+      <p:sp>
+        <p:nvSpPr>
+          <p:cNvPr id="25" name="TextBox 24">
+            <a:extLst>
+              <a:ext uri="{FF2B5EF4-FFF2-40B4-BE49-F238E27FC236}">
+                <a16:creationId xmlns:a16="http://schemas.microsoft.com/office/drawing/2014/main" id="{11442DDD-98A9-3248-A356-17111CAD8F50}"/>
+              </a:ext>
+            </a:extLst>
+          </p:cNvPr>
+          <p:cNvSpPr txBox="1"/>
+          <p:nvPr/>
+        </p:nvSpPr>
+        <p:spPr>
+          <a:xfrm>
+            <a:off x="7051127" y="4673904"/>
+            <a:ext cx="2339102" cy="830997"/>
+          </a:xfrm>
+          <a:prstGeom prst="rect">
+            <a:avLst/>
+          </a:prstGeom>
+          <a:noFill/>
+        </p:spPr>
+        <p:txBody>
+          <a:bodyPr wrap="none" rtlCol="0">
+            <a:spAutoFit/>
+          </a:bodyPr>
+          <a:lstStyle/>
+          <a:p>
+            <a:r>
+              <a:rPr lang="en-US" sz="2800" dirty="0"/>
+              <a:t>Class Server</a:t>
+            </a:r>
+            <a:br>
+              <a:rPr lang="en-US" sz="2800" dirty="0"/>
+            </a:br>
+            <a:r>
+              <a:rPr lang="en-US" sz="2000" dirty="0" err="1"/>
+              <a:t>mlpolicylab.dssg.io</a:t>
+            </a:r>
+            <a:endParaRPr lang="en-US" sz="2800" dirty="0"/>
+          </a:p>
+        </p:txBody>
+      </p:sp>
+      <p:sp>
+        <p:nvSpPr>
+          <p:cNvPr id="26" name="TextBox 25">
+            <a:extLst>
+              <a:ext uri="{FF2B5EF4-FFF2-40B4-BE49-F238E27FC236}">
+                <a16:creationId xmlns:a16="http://schemas.microsoft.com/office/drawing/2014/main" id="{DBA3E5FF-0E29-6740-8D62-07DA934FBF9E}"/>
+              </a:ext>
+            </a:extLst>
+          </p:cNvPr>
+          <p:cNvSpPr txBox="1"/>
+          <p:nvPr/>
+        </p:nvSpPr>
+        <p:spPr>
+          <a:xfrm>
+            <a:off x="9477781" y="4676726"/>
+            <a:ext cx="2732146" cy="800219"/>
+          </a:xfrm>
+          <a:prstGeom prst="rect">
+            <a:avLst/>
+          </a:prstGeom>
+          <a:noFill/>
+        </p:spPr>
+        <p:txBody>
+          <a:bodyPr wrap="square" rtlCol="0">
+            <a:spAutoFit/>
+          </a:bodyPr>
+          <a:lstStyle/>
+          <a:p>
+            <a:r>
+              <a:rPr lang="en-US" sz="2800" dirty="0"/>
+              <a:t>Class Database</a:t>
+            </a:r>
+            <a:br>
+              <a:rPr lang="en-US" sz="2800" dirty="0"/>
+            </a:br>
+            <a:r>
+              <a:rPr lang="en-US" sz="1800" dirty="0" err="1"/>
+              <a:t>mlpolicylab.db.dssg.io</a:t>
+            </a:r>
+            <a:endParaRPr lang="en-US" sz="2800" dirty="0"/>
+          </a:p>
+        </p:txBody>
+      </p:sp>
+      <p:sp>
+        <p:nvSpPr>
+          <p:cNvPr id="2" name="Frame 1">
+            <a:extLst>
+              <a:ext uri="{FF2B5EF4-FFF2-40B4-BE49-F238E27FC236}">
+                <a16:creationId xmlns:a16="http://schemas.microsoft.com/office/drawing/2014/main" id="{498F7965-4EC1-0F44-BA4A-EB5F8FC49722}"/>
               </a:ext>
             </a:extLst>
           </p:cNvPr>
@@ -20646,68 +19610,17 @@
         </p:nvSpPr>
         <p:spPr>
           <a:xfrm>
-            <a:off x="2199503" y="3867003"/>
-            <a:ext cx="4633783" cy="1597285"/>
+            <a:off x="6874769" y="2054711"/>
+            <a:ext cx="5317231" cy="4226081"/>
           </a:xfrm>
-          <a:custGeom>
-            <a:avLst/>
-            <a:gdLst>
-              <a:gd name="connsiteX0" fmla="*/ 0 w 4633783"/>
-              <a:gd name="connsiteY0" fmla="*/ 532002 h 1597285"/>
-              <a:gd name="connsiteX1" fmla="*/ 2656702 w 4633783"/>
-              <a:gd name="connsiteY1" fmla="*/ 1594683 h 1597285"/>
-              <a:gd name="connsiteX2" fmla="*/ 3805881 w 4633783"/>
-              <a:gd name="connsiteY2" fmla="*/ 260154 h 1597285"/>
-              <a:gd name="connsiteX3" fmla="*/ 4633783 w 4633783"/>
-              <a:gd name="connsiteY3" fmla="*/ 662 h 1597285"/>
-            </a:gdLst>
-            <a:ahLst/>
-            <a:cxnLst>
-              <a:cxn ang="0">
-                <a:pos x="connsiteX0" y="connsiteY0"/>
-              </a:cxn>
-              <a:cxn ang="0">
-                <a:pos x="connsiteX1" y="connsiteY1"/>
-              </a:cxn>
-              <a:cxn ang="0">
-                <a:pos x="connsiteX2" y="connsiteY2"/>
-              </a:cxn>
-              <a:cxn ang="0">
-                <a:pos x="connsiteX3" y="connsiteY3"/>
-              </a:cxn>
-            </a:cxnLst>
-            <a:rect l="l" t="t" r="r" b="b"/>
-            <a:pathLst>
-              <a:path w="4633783" h="1597285">
-                <a:moveTo>
-                  <a:pt x="0" y="532002"/>
-                </a:moveTo>
-                <a:cubicBezTo>
-                  <a:pt x="1011194" y="1085996"/>
-                  <a:pt x="2022389" y="1639991"/>
-                  <a:pt x="2656702" y="1594683"/>
-                </a:cubicBezTo>
-                <a:cubicBezTo>
-                  <a:pt x="3291016" y="1549375"/>
-                  <a:pt x="3476368" y="525824"/>
-                  <a:pt x="3805881" y="260154"/>
-                </a:cubicBezTo>
-                <a:cubicBezTo>
-                  <a:pt x="4135394" y="-5516"/>
-                  <a:pt x="4384588" y="-2427"/>
-                  <a:pt x="4633783" y="662"/>
-                </a:cubicBezTo>
-              </a:path>
-            </a:pathLst>
-          </a:custGeom>
-          <a:noFill/>
-          <a:ln w="57150">
-            <a:solidFill>
-              <a:srgbClr val="7030A0"/>
-            </a:solidFill>
-            <a:headEnd type="triangle" w="med" len="med"/>
-            <a:tailEnd type="triangle" w="med" len="med"/>
-          </a:ln>
+          <a:prstGeom prst="frame">
+            <a:avLst>
+              <a:gd name="adj1" fmla="val 1300"/>
+            </a:avLst>
+          </a:prstGeom>
+          <a:solidFill>
+            <a:srgbClr val="C00000"/>
+          </a:solidFill>
         </p:spPr>
         <p:style>
           <a:lnRef idx="2">
@@ -20730,26 +19643,67 @@
           <a:lstStyle/>
           <a:p>
             <a:pPr algn="ctr"/>
-            <a:endParaRPr lang="en-US"/>
+            <a:endParaRPr lang="en-US">
+              <a:solidFill>
+                <a:schemeClr val="tx1"/>
+              </a:solidFill>
+            </a:endParaRPr>
+          </a:p>
+        </p:txBody>
+      </p:sp>
+      <p:sp>
+        <p:nvSpPr>
+          <p:cNvPr id="3" name="TextBox 2">
+            <a:extLst>
+              <a:ext uri="{FF2B5EF4-FFF2-40B4-BE49-F238E27FC236}">
+                <a16:creationId xmlns:a16="http://schemas.microsoft.com/office/drawing/2014/main" id="{4ADA3757-0F37-9947-A12B-9FCE6670AAD5}"/>
+              </a:ext>
+            </a:extLst>
+          </p:cNvPr>
+          <p:cNvSpPr txBox="1"/>
+          <p:nvPr/>
+        </p:nvSpPr>
+        <p:spPr>
+          <a:xfrm>
+            <a:off x="8220678" y="1647384"/>
+            <a:ext cx="2773516" cy="400110"/>
+          </a:xfrm>
+          <a:prstGeom prst="rect">
+            <a:avLst/>
+          </a:prstGeom>
+          <a:noFill/>
+        </p:spPr>
+        <p:txBody>
+          <a:bodyPr wrap="none" rtlCol="0">
+            <a:spAutoFit/>
+          </a:bodyPr>
+          <a:lstStyle/>
+          <a:p>
+            <a:r>
+              <a:rPr lang="en-US" sz="2000" dirty="0"/>
+              <a:t>Amazon Web Services</a:t>
+            </a:r>
           </a:p>
         </p:txBody>
       </p:sp>
       <p:cxnSp>
         <p:nvCxnSpPr>
-          <p:cNvPr id="4" name="Straight Arrow Connector 3">
+          <p:cNvPr id="20" name="Straight Arrow Connector 19">
             <a:extLst>
               <a:ext uri="{FF2B5EF4-FFF2-40B4-BE49-F238E27FC236}">
-                <a16:creationId xmlns:a16="http://schemas.microsoft.com/office/drawing/2014/main" id="{DB18314D-6663-9D4E-8768-0F20B025F300}"/>
+                <a16:creationId xmlns:a16="http://schemas.microsoft.com/office/drawing/2014/main" id="{F818C365-0BFE-1843-832E-4CE1D9C65F99}"/>
               </a:ext>
             </a:extLst>
           </p:cNvPr>
-          <p:cNvCxnSpPr/>
+          <p:cNvCxnSpPr>
+            <a:cxnSpLocks/>
+          </p:cNvCxnSpPr>
           <p:nvPr/>
         </p:nvCxnSpPr>
         <p:spPr>
-          <a:xfrm>
-            <a:off x="8216349" y="3867003"/>
-            <a:ext cx="1755555" cy="0"/>
+          <a:xfrm flipV="1">
+            <a:off x="2597993" y="2463786"/>
+            <a:ext cx="1544595" cy="939114"/>
           </a:xfrm>
           <a:prstGeom prst="straightConnector1">
             <a:avLst/>
@@ -20758,7 +19712,402 @@
             <a:solidFill>
               <a:srgbClr val="7030A0"/>
             </a:solidFill>
-            <a:headEnd type="triangle"/>
+            <a:tailEnd type="triangle"/>
+          </a:ln>
+        </p:spPr>
+        <p:style>
+          <a:lnRef idx="1">
+            <a:schemeClr val="accent1"/>
+          </a:lnRef>
+          <a:fillRef idx="0">
+            <a:schemeClr val="accent1"/>
+          </a:fillRef>
+          <a:effectRef idx="0">
+            <a:schemeClr val="accent1"/>
+          </a:effectRef>
+          <a:fontRef idx="minor">
+            <a:schemeClr val="tx1"/>
+          </a:fontRef>
+        </p:style>
+      </p:cxnSp>
+      <p:cxnSp>
+        <p:nvCxnSpPr>
+          <p:cNvPr id="22" name="Straight Arrow Connector 21">
+            <a:extLst>
+              <a:ext uri="{FF2B5EF4-FFF2-40B4-BE49-F238E27FC236}">
+                <a16:creationId xmlns:a16="http://schemas.microsoft.com/office/drawing/2014/main" id="{F80E131E-CE52-F441-8E60-721ADF5E0BFF}"/>
+              </a:ext>
+            </a:extLst>
+          </p:cNvPr>
+          <p:cNvCxnSpPr>
+            <a:cxnSpLocks/>
+          </p:cNvCxnSpPr>
+          <p:nvPr/>
+        </p:nvCxnSpPr>
+        <p:spPr>
+          <a:xfrm rot="10800000" flipV="1">
+            <a:off x="2776351" y="2561829"/>
+            <a:ext cx="1544595" cy="939114"/>
+          </a:xfrm>
+          <a:prstGeom prst="straightConnector1">
+            <a:avLst/>
+          </a:prstGeom>
+          <a:ln w="57150">
+            <a:solidFill>
+              <a:srgbClr val="7030A0"/>
+            </a:solidFill>
+            <a:tailEnd type="triangle"/>
+          </a:ln>
+        </p:spPr>
+        <p:style>
+          <a:lnRef idx="1">
+            <a:schemeClr val="accent1"/>
+          </a:lnRef>
+          <a:fillRef idx="0">
+            <a:schemeClr val="accent1"/>
+          </a:fillRef>
+          <a:effectRef idx="0">
+            <a:schemeClr val="accent1"/>
+          </a:effectRef>
+          <a:fontRef idx="minor">
+            <a:schemeClr val="tx1"/>
+          </a:fontRef>
+        </p:style>
+      </p:cxnSp>
+      <p:pic>
+        <p:nvPicPr>
+          <p:cNvPr id="27" name="Picture 2" descr="12 Most-Wanted Sublime Text Tips and Tricks - Hongkiat">
+            <a:extLst>
+              <a:ext uri="{FF2B5EF4-FFF2-40B4-BE49-F238E27FC236}">
+                <a16:creationId xmlns:a16="http://schemas.microsoft.com/office/drawing/2014/main" id="{49BA50F0-2454-324A-B801-49BEB71C0CC3}"/>
+              </a:ext>
+            </a:extLst>
+          </p:cNvPr>
+          <p:cNvPicPr>
+            <a:picLocks noChangeAspect="1" noChangeArrowheads="1"/>
+          </p:cNvPicPr>
+          <p:nvPr/>
+        </p:nvPicPr>
+        <p:blipFill rotWithShape="1">
+          <a:blip r:embed="rId8">
+            <a:extLst>
+              <a:ext uri="{28A0092B-C50C-407E-A947-70E740481C1C}">
+                <a14:useLocalDpi xmlns:a14="http://schemas.microsoft.com/office/drawing/2010/main" val="0"/>
+              </a:ext>
+            </a:extLst>
+          </a:blip>
+          <a:srcRect r="46413" b="34524"/>
+          <a:stretch/>
+        </p:blipFill>
+        <p:spPr bwMode="auto">
+          <a:xfrm>
+            <a:off x="93844" y="5159915"/>
+            <a:ext cx="1417033" cy="969591"/>
+          </a:xfrm>
+          <a:prstGeom prst="rect">
+            <a:avLst/>
+          </a:prstGeom>
+          <a:noFill/>
+          <a:extLst>
+            <a:ext uri="{909E8E84-426E-40DD-AFC4-6F175D3DCCD1}">
+              <a14:hiddenFill xmlns:a14="http://schemas.microsoft.com/office/drawing/2010/main">
+                <a:solidFill>
+                  <a:srgbClr val="FFFFFF"/>
+                </a:solidFill>
+              </a14:hiddenFill>
+            </a:ext>
+          </a:extLst>
+        </p:spPr>
+      </p:pic>
+      <p:pic>
+        <p:nvPicPr>
+          <p:cNvPr id="28" name="Picture 4" descr="Git - GUI Clients">
+            <a:extLst>
+              <a:ext uri="{FF2B5EF4-FFF2-40B4-BE49-F238E27FC236}">
+                <a16:creationId xmlns:a16="http://schemas.microsoft.com/office/drawing/2014/main" id="{48B809A5-1537-7D4C-BF7E-155374BEFFBC}"/>
+              </a:ext>
+            </a:extLst>
+          </p:cNvPr>
+          <p:cNvPicPr>
+            <a:picLocks noChangeAspect="1" noChangeArrowheads="1"/>
+          </p:cNvPicPr>
+          <p:nvPr/>
+        </p:nvPicPr>
+        <p:blipFill>
+          <a:blip r:embed="rId9">
+            <a:extLst>
+              <a:ext uri="{28A0092B-C50C-407E-A947-70E740481C1C}">
+                <a14:useLocalDpi xmlns:a14="http://schemas.microsoft.com/office/drawing/2010/main" val="0"/>
+              </a:ext>
+            </a:extLst>
+          </a:blip>
+          <a:srcRect/>
+          <a:stretch>
+            <a:fillRect/>
+          </a:stretch>
+        </p:blipFill>
+        <p:spPr bwMode="auto">
+          <a:xfrm>
+            <a:off x="1834641" y="5190391"/>
+            <a:ext cx="1661511" cy="939115"/>
+          </a:xfrm>
+          <a:prstGeom prst="rect">
+            <a:avLst/>
+          </a:prstGeom>
+          <a:noFill/>
+          <a:extLst>
+            <a:ext uri="{909E8E84-426E-40DD-AFC4-6F175D3DCCD1}">
+              <a14:hiddenFill xmlns:a14="http://schemas.microsoft.com/office/drawing/2010/main">
+                <a:solidFill>
+                  <a:srgbClr val="FFFFFF"/>
+                </a:solidFill>
+              </a14:hiddenFill>
+            </a:ext>
+          </a:extLst>
+        </p:spPr>
+      </p:pic>
+      <p:sp>
+        <p:nvSpPr>
+          <p:cNvPr id="29" name="TextBox 28">
+            <a:extLst>
+              <a:ext uri="{FF2B5EF4-FFF2-40B4-BE49-F238E27FC236}">
+                <a16:creationId xmlns:a16="http://schemas.microsoft.com/office/drawing/2014/main" id="{9BA6334A-1DEE-3A49-A358-5E73DE00BC70}"/>
+              </a:ext>
+            </a:extLst>
+          </p:cNvPr>
+          <p:cNvSpPr txBox="1"/>
+          <p:nvPr/>
+        </p:nvSpPr>
+        <p:spPr>
+          <a:xfrm>
+            <a:off x="341336" y="6129506"/>
+            <a:ext cx="922047" cy="769441"/>
+          </a:xfrm>
+          <a:prstGeom prst="rect">
+            <a:avLst/>
+          </a:prstGeom>
+          <a:noFill/>
+        </p:spPr>
+        <p:txBody>
+          <a:bodyPr wrap="none" rtlCol="0">
+            <a:spAutoFit/>
+          </a:bodyPr>
+          <a:lstStyle/>
+          <a:p>
+            <a:pPr algn="ctr"/>
+            <a:r>
+              <a:rPr lang="en-US" sz="2200" dirty="0"/>
+              <a:t>Text</a:t>
+            </a:r>
+          </a:p>
+          <a:p>
+            <a:pPr algn="ctr"/>
+            <a:r>
+              <a:rPr lang="en-US" sz="2200" dirty="0"/>
+              <a:t>Editor</a:t>
+            </a:r>
+          </a:p>
+        </p:txBody>
+      </p:sp>
+      <p:sp>
+        <p:nvSpPr>
+          <p:cNvPr id="30" name="TextBox 29">
+            <a:extLst>
+              <a:ext uri="{FF2B5EF4-FFF2-40B4-BE49-F238E27FC236}">
+                <a16:creationId xmlns:a16="http://schemas.microsoft.com/office/drawing/2014/main" id="{5569B781-3267-094F-88B2-4C93195CEC75}"/>
+              </a:ext>
+            </a:extLst>
+          </p:cNvPr>
+          <p:cNvSpPr txBox="1"/>
+          <p:nvPr/>
+        </p:nvSpPr>
+        <p:spPr>
+          <a:xfrm>
+            <a:off x="2146090" y="6094745"/>
+            <a:ext cx="906017" cy="769441"/>
+          </a:xfrm>
+          <a:prstGeom prst="rect">
+            <a:avLst/>
+          </a:prstGeom>
+          <a:noFill/>
+        </p:spPr>
+        <p:txBody>
+          <a:bodyPr wrap="none" rtlCol="0">
+            <a:spAutoFit/>
+          </a:bodyPr>
+          <a:lstStyle/>
+          <a:p>
+            <a:pPr algn="ctr"/>
+            <a:r>
+              <a:rPr lang="en-US" sz="2200" dirty="0"/>
+              <a:t>Git</a:t>
+            </a:r>
+          </a:p>
+          <a:p>
+            <a:pPr algn="ctr"/>
+            <a:r>
+              <a:rPr lang="en-US" sz="2200" dirty="0"/>
+              <a:t>Client</a:t>
+            </a:r>
+          </a:p>
+        </p:txBody>
+      </p:sp>
+      <p:cxnSp>
+        <p:nvCxnSpPr>
+          <p:cNvPr id="31" name="Straight Arrow Connector 30">
+            <a:extLst>
+              <a:ext uri="{FF2B5EF4-FFF2-40B4-BE49-F238E27FC236}">
+                <a16:creationId xmlns:a16="http://schemas.microsoft.com/office/drawing/2014/main" id="{8443E070-8DC3-2C48-BA3B-9C388215580A}"/>
+              </a:ext>
+            </a:extLst>
+          </p:cNvPr>
+          <p:cNvCxnSpPr>
+            <a:cxnSpLocks/>
+          </p:cNvCxnSpPr>
+          <p:nvPr/>
+        </p:nvCxnSpPr>
+        <p:spPr>
+          <a:xfrm flipH="1" flipV="1">
+            <a:off x="5826472" y="2522920"/>
+            <a:ext cx="1449326" cy="767928"/>
+          </a:xfrm>
+          <a:prstGeom prst="straightConnector1">
+            <a:avLst/>
+          </a:prstGeom>
+          <a:ln w="57150">
+            <a:solidFill>
+              <a:srgbClr val="7030A0"/>
+            </a:solidFill>
+            <a:tailEnd type="triangle"/>
+          </a:ln>
+        </p:spPr>
+        <p:style>
+          <a:lnRef idx="1">
+            <a:schemeClr val="accent1"/>
+          </a:lnRef>
+          <a:fillRef idx="0">
+            <a:schemeClr val="accent1"/>
+          </a:fillRef>
+          <a:effectRef idx="0">
+            <a:schemeClr val="accent1"/>
+          </a:effectRef>
+          <a:fontRef idx="minor">
+            <a:schemeClr val="tx1"/>
+          </a:fontRef>
+        </p:style>
+      </p:cxnSp>
+      <p:cxnSp>
+        <p:nvCxnSpPr>
+          <p:cNvPr id="32" name="Straight Arrow Connector 31">
+            <a:extLst>
+              <a:ext uri="{FF2B5EF4-FFF2-40B4-BE49-F238E27FC236}">
+                <a16:creationId xmlns:a16="http://schemas.microsoft.com/office/drawing/2014/main" id="{437F7A5A-A67F-894B-8A9F-42DDC9D12A21}"/>
+              </a:ext>
+            </a:extLst>
+          </p:cNvPr>
+          <p:cNvCxnSpPr>
+            <a:cxnSpLocks/>
+          </p:cNvCxnSpPr>
+          <p:nvPr/>
+        </p:nvCxnSpPr>
+        <p:spPr>
+          <a:xfrm rot="10800000" flipH="1" flipV="1">
+            <a:off x="5954108" y="2383897"/>
+            <a:ext cx="1449326" cy="767928"/>
+          </a:xfrm>
+          <a:prstGeom prst="straightConnector1">
+            <a:avLst/>
+          </a:prstGeom>
+          <a:ln w="57150">
+            <a:solidFill>
+              <a:srgbClr val="7030A0"/>
+            </a:solidFill>
+            <a:tailEnd type="triangle"/>
+          </a:ln>
+        </p:spPr>
+        <p:style>
+          <a:lnRef idx="1">
+            <a:schemeClr val="accent1"/>
+          </a:lnRef>
+          <a:fillRef idx="0">
+            <a:schemeClr val="accent1"/>
+          </a:fillRef>
+          <a:effectRef idx="0">
+            <a:schemeClr val="accent1"/>
+          </a:effectRef>
+          <a:fontRef idx="minor">
+            <a:schemeClr val="tx1"/>
+          </a:fontRef>
+        </p:style>
+      </p:cxnSp>
+      <p:cxnSp>
+        <p:nvCxnSpPr>
+          <p:cNvPr id="33" name="Straight Arrow Connector 32">
+            <a:extLst>
+              <a:ext uri="{FF2B5EF4-FFF2-40B4-BE49-F238E27FC236}">
+                <a16:creationId xmlns:a16="http://schemas.microsoft.com/office/drawing/2014/main" id="{E54EB0F3-BDCC-1F46-86C5-07A6336C092E}"/>
+              </a:ext>
+            </a:extLst>
+          </p:cNvPr>
+          <p:cNvCxnSpPr/>
+          <p:nvPr/>
+        </p:nvCxnSpPr>
+        <p:spPr>
+          <a:xfrm>
+            <a:off x="2801736" y="4167751"/>
+            <a:ext cx="1565869" cy="0"/>
+          </a:xfrm>
+          <a:prstGeom prst="straightConnector1">
+            <a:avLst/>
+          </a:prstGeom>
+          <a:ln w="57150">
+            <a:solidFill>
+              <a:schemeClr val="bg2"/>
+            </a:solidFill>
+            <a:tailEnd type="triangle"/>
+          </a:ln>
+        </p:spPr>
+        <p:style>
+          <a:lnRef idx="1">
+            <a:schemeClr val="accent1"/>
+          </a:lnRef>
+          <a:fillRef idx="0">
+            <a:schemeClr val="accent1"/>
+          </a:fillRef>
+          <a:effectRef idx="0">
+            <a:schemeClr val="accent1"/>
+          </a:effectRef>
+          <a:fontRef idx="minor">
+            <a:schemeClr val="tx1"/>
+          </a:fontRef>
+        </p:style>
+      </p:cxnSp>
+      <p:cxnSp>
+        <p:nvCxnSpPr>
+          <p:cNvPr id="34" name="Straight Arrow Connector 33">
+            <a:extLst>
+              <a:ext uri="{FF2B5EF4-FFF2-40B4-BE49-F238E27FC236}">
+                <a16:creationId xmlns:a16="http://schemas.microsoft.com/office/drawing/2014/main" id="{0554AB3B-B71D-BC44-967A-D29E81624166}"/>
+              </a:ext>
+            </a:extLst>
+          </p:cNvPr>
+          <p:cNvCxnSpPr>
+            <a:cxnSpLocks/>
+          </p:cNvCxnSpPr>
+          <p:nvPr/>
+        </p:nvCxnSpPr>
+        <p:spPr>
+          <a:xfrm>
+            <a:off x="5816303" y="4167751"/>
+            <a:ext cx="1678337" cy="0"/>
+          </a:xfrm>
+          <a:prstGeom prst="straightConnector1">
+            <a:avLst/>
+          </a:prstGeom>
+          <a:ln w="57150">
+            <a:solidFill>
+              <a:schemeClr val="bg2"/>
+            </a:solidFill>
             <a:tailEnd type="triangle"/>
           </a:ln>
         </p:spPr>
@@ -20779,10 +20128,10 @@
       </p:cxnSp>
       <p:sp>
         <p:nvSpPr>
-          <p:cNvPr id="16" name="TextBox 15">
+          <p:cNvPr id="36" name="TextBox 35">
             <a:extLst>
               <a:ext uri="{FF2B5EF4-FFF2-40B4-BE49-F238E27FC236}">
-                <a16:creationId xmlns:a16="http://schemas.microsoft.com/office/drawing/2014/main" id="{3F0FF22A-DD5E-E948-9DF3-CB65852AE243}"/>
+                <a16:creationId xmlns:a16="http://schemas.microsoft.com/office/drawing/2014/main" id="{B22A4163-32F5-5D4C-AE63-DCEBC9F2CFB5}"/>
               </a:ext>
             </a:extLst>
           </p:cNvPr>
@@ -20791,8 +20140,8 @@
         </p:nvSpPr>
         <p:spPr>
           <a:xfrm>
-            <a:off x="6703705" y="6130892"/>
-            <a:ext cx="1864613" cy="523220"/>
+            <a:off x="7512162" y="2360767"/>
+            <a:ext cx="1301959" cy="523220"/>
           </a:xfrm>
           <a:prstGeom prst="rect">
             <a:avLst/>
@@ -20807,22 +20156,18 @@
           <a:p>
             <a:pPr algn="ctr"/>
             <a:r>
-              <a:rPr lang="en-US" sz="2800" dirty="0" err="1"/>
-              <a:t>psql</a:t>
-            </a:r>
-            <a:r>
               <a:rPr lang="en-US" sz="2800" dirty="0"/>
-              <a:t> Client</a:t>
+              <a:t>Git CLI</a:t>
             </a:r>
           </a:p>
         </p:txBody>
       </p:sp>
       <p:pic>
         <p:nvPicPr>
-          <p:cNvPr id="7170" name="Picture 2" descr="How to Use the PostgreSQL Update | ObjectRocket">
+          <p:cNvPr id="37" name="Picture 2" descr="GitHub Logos and Usage · GitHub">
             <a:extLst>
               <a:ext uri="{FF2B5EF4-FFF2-40B4-BE49-F238E27FC236}">
-                <a16:creationId xmlns:a16="http://schemas.microsoft.com/office/drawing/2014/main" id="{F1C38B22-02A2-DF47-B416-6231E453E3C8}"/>
+                <a16:creationId xmlns:a16="http://schemas.microsoft.com/office/drawing/2014/main" id="{D3DFEEB8-FE83-6444-8C7F-F29D790D8D18}"/>
               </a:ext>
             </a:extLst>
           </p:cNvPr>
@@ -20832,7 +20177,7 @@
           <p:nvPr/>
         </p:nvPicPr>
         <p:blipFill>
-          <a:blip r:embed="rId8">
+          <a:blip r:embed="rId10">
             <a:extLst>
               <a:ext uri="{28A0092B-C50C-407E-A947-70E740481C1C}">
                 <a14:useLocalDpi xmlns:a14="http://schemas.microsoft.com/office/drawing/2010/main" val="0"/>
@@ -20846,8 +20191,8 @@
         </p:blipFill>
         <p:spPr bwMode="auto">
           <a:xfrm>
-            <a:off x="6764232" y="4845816"/>
-            <a:ext cx="1755555" cy="1270117"/>
+            <a:off x="7082196" y="2360767"/>
+            <a:ext cx="527403" cy="527403"/>
           </a:xfrm>
           <a:prstGeom prst="rect">
             <a:avLst/>
@@ -20867,7 +20212,7 @@
     </p:spTree>
     <p:extLst>
       <p:ext uri="{BB962C8B-B14F-4D97-AF65-F5344CB8AC3E}">
-        <p14:creationId xmlns:p14="http://schemas.microsoft.com/office/powerpoint/2010/main" val="1973588382"/>
+        <p14:creationId xmlns:p14="http://schemas.microsoft.com/office/powerpoint/2010/main" val="3583904474"/>
       </p:ext>
     </p:extLst>
   </p:cSld>

</xml_diff>

<commit_message>
edited data discussion slides
</commit_message>
<xml_diff>
--- a/02 - Case Studies and Acquiring Data/data -- discussion.pptx
+++ b/02 - Case Studies and Acquiring Data/data -- discussion.pptx
@@ -266,7 +266,7 @@
       <p15:sldGuideLst xmlns:p15="http://schemas.microsoft.com/office/powerpoint/2012/main"/>
     </p:ext>
     <p:ext uri="http://customooxmlschemas.google.com/">
-      <go:slidesCustomData xmlns="" xmlns:mc="http://schemas.openxmlformats.org/markup-compatibility/2006" xmlns:mv="urn:schemas-microsoft-com:mac:vml" xmlns:c="http://schemas.openxmlformats.org/drawingml/2006/chart" xmlns:dgm="http://schemas.openxmlformats.org/drawingml/2006/diagram" xmlns:o="urn:schemas-microsoft-com:office:office" xmlns:v="urn:schemas-microsoft-com:vml" xmlns:pvml="urn:schemas-microsoft-com:office:powerpoint" xmlns:com="http://schemas.openxmlformats.org/drawingml/2006/compatibility" xmlns:p14="http://schemas.microsoft.com/office/powerpoint/2010/main" xmlns:p15="http://schemas.microsoft.com/office/powerpoint/2012/main" xmlns:go="http://customooxmlschemas.google.com/" r:id="rId30" roundtripDataSignature="AMtx7mjFyVUGRZWio+dc9dxzYsimUxNJbg=="/>
+      <go:slidesCustomData xmlns:go="http://customooxmlschemas.google.com/" xmlns:p15="http://schemas.microsoft.com/office/powerpoint/2012/main" xmlns:p14="http://schemas.microsoft.com/office/powerpoint/2010/main" xmlns:com="http://schemas.openxmlformats.org/drawingml/2006/compatibility" xmlns:pvml="urn:schemas-microsoft-com:office:powerpoint" xmlns:v="urn:schemas-microsoft-com:vml" xmlns:o="urn:schemas-microsoft-com:office:office" xmlns:dgm="http://schemas.openxmlformats.org/drawingml/2006/diagram" xmlns:c="http://schemas.openxmlformats.org/drawingml/2006/chart" xmlns:mv="urn:schemas-microsoft-com:mac:vml" xmlns:mc="http://schemas.openxmlformats.org/markup-compatibility/2006" xmlns="" r:id="rId30" roundtripDataSignature="AMtx7mjFyVUGRZWio+dc9dxzYsimUxNJbg=="/>
     </p:ext>
   </p:extLst>
 </p:presentation>
@@ -13469,7 +13469,7 @@
           <a:p>
             <a:r>
               <a:rPr lang="en-US" dirty="0"/>
-              <a:t>Plan for today</a:t>
+              <a:t>Plan for the rest of today</a:t>
             </a:r>
           </a:p>
         </p:txBody>

</xml_diff>